<commit_message>
update syllabus for 2025
</commit_message>
<xml_diff>
--- a/Lecture10_BehavioralHealthEcon/L10Slides_BehavioralHealth_2023W.pptx
+++ b/Lecture10_BehavioralHealthEcon/L10Slides_BehavioralHealth_2023W.pptx
@@ -5,7 +5,7 @@
     <p:sldMasterId id="2147483738" r:id="rId1"/>
   </p:sldMasterIdLst>
   <p:notesMasterIdLst>
-    <p:notesMasterId r:id="rId39"/>
+    <p:notesMasterId r:id="rId43"/>
   </p:notesMasterIdLst>
   <p:sldIdLst>
     <p:sldId id="256" r:id="rId2"/>
@@ -30,21 +30,25 @@
     <p:sldId id="501" r:id="rId21"/>
     <p:sldId id="502" r:id="rId22"/>
     <p:sldId id="503" r:id="rId23"/>
-    <p:sldId id="505" r:id="rId24"/>
-    <p:sldId id="504" r:id="rId25"/>
-    <p:sldId id="507" r:id="rId26"/>
-    <p:sldId id="506" r:id="rId27"/>
-    <p:sldId id="508" r:id="rId28"/>
-    <p:sldId id="509" r:id="rId29"/>
-    <p:sldId id="341" r:id="rId30"/>
-    <p:sldId id="510" r:id="rId31"/>
-    <p:sldId id="511" r:id="rId32"/>
-    <p:sldId id="512" r:id="rId33"/>
-    <p:sldId id="513" r:id="rId34"/>
-    <p:sldId id="514" r:id="rId35"/>
-    <p:sldId id="515" r:id="rId36"/>
-    <p:sldId id="516" r:id="rId37"/>
-    <p:sldId id="414" r:id="rId38"/>
+    <p:sldId id="518" r:id="rId24"/>
+    <p:sldId id="517" r:id="rId25"/>
+    <p:sldId id="505" r:id="rId26"/>
+    <p:sldId id="504" r:id="rId27"/>
+    <p:sldId id="507" r:id="rId28"/>
+    <p:sldId id="506" r:id="rId29"/>
+    <p:sldId id="519" r:id="rId30"/>
+    <p:sldId id="508" r:id="rId31"/>
+    <p:sldId id="509" r:id="rId32"/>
+    <p:sldId id="520" r:id="rId33"/>
+    <p:sldId id="341" r:id="rId34"/>
+    <p:sldId id="510" r:id="rId35"/>
+    <p:sldId id="511" r:id="rId36"/>
+    <p:sldId id="512" r:id="rId37"/>
+    <p:sldId id="513" r:id="rId38"/>
+    <p:sldId id="514" r:id="rId39"/>
+    <p:sldId id="515" r:id="rId40"/>
+    <p:sldId id="516" r:id="rId41"/>
+    <p:sldId id="414" r:id="rId42"/>
   </p:sldIdLst>
   <p:sldSz cx="12192000" cy="6858000"/>
   <p:notesSz cx="7010400" cy="9296400"/>
@@ -244,7 +248,7 @@
           <a:p>
             <a:fld id="{EF911157-0FC2-4F06-8D61-FD647FE4E19D}" type="datetimeFigureOut">
               <a:rPr lang="en-US" smtClean="0"/>
-              <a:t>11/6/2023</a:t>
+              <a:t>3/26/2024</a:t>
             </a:fld>
             <a:endParaRPr lang="en-US"/>
           </a:p>
@@ -565,10 +569,9 @@
               <a:buNone/>
             </a:pPr>
             <a:r>
-              <a:rPr lang="en-US"/>
+              <a:rPr lang="en-US" dirty="0"/>
               <a:t>To include: https://www.instagram.com/reel/Cx_YvsWsBBO/?igshid=YzE4YTliZjNlMA==</a:t>
             </a:r>
-            <a:endParaRPr lang="en-US" dirty="0"/>
           </a:p>
         </p:txBody>
       </p:sp>
@@ -1780,7 +1783,66 @@
           <a:bodyPr/>
           <a:lstStyle/>
           <a:p>
-            <a:endParaRPr lang="en-US" dirty="0"/>
+            <a:r>
+              <a:rPr lang="en-US" dirty="0"/>
+              <a:t>Setting: </a:t>
+            </a:r>
+          </a:p>
+          <a:p>
+            <a:pPr marL="171450" indent="-171450">
+              <a:buFont typeface="Arial" panose="020B0604020202020204" pitchFamily="34" charset="0"/>
+              <a:buChar char="•"/>
+            </a:pPr>
+            <a:r>
+              <a:rPr lang="en-US" dirty="0"/>
+              <a:t>employees at the firm choose between two primary health insurance options a PPO option with generous first dollar coverage and a high-deductible health plan (HDHP) with a linked health savings account (HSA).</a:t>
+            </a:r>
+          </a:p>
+          <a:p>
+            <a:pPr marL="171450" indent="-171450">
+              <a:buFont typeface="Arial" panose="020B0604020202020204" pitchFamily="34" charset="0"/>
+              <a:buChar char="•"/>
+            </a:pPr>
+            <a:r>
+              <a:rPr lang="en-US" dirty="0"/>
+              <a:t>2009-2012 (HDHP introduced in 2009, PPO existed long before that)</a:t>
+            </a:r>
+          </a:p>
+          <a:p>
+            <a:pPr marL="171450" indent="-171450">
+              <a:buFont typeface="Arial" panose="020B0604020202020204" pitchFamily="34" charset="0"/>
+              <a:buChar char="•"/>
+            </a:pPr>
+            <a:r>
+              <a:rPr lang="en-US" dirty="0"/>
+              <a:t>The PPO plan charges no up front premium while the HDHP provides an up-front subsidy equal to $1500 for an individual, $3000 for a couple and $3750 for a family. This subsidy should be interpreted as the primary premium for the PPO relative to the HDHP. The HDHP subsidy is deposited into the health savings account (HSA) linked to that plan and, thus, can be used for medical expenditures on a pre-tax basis in both the short-run and the long-run.</a:t>
+            </a:r>
+          </a:p>
+          <a:p>
+            <a:r>
+              <a:rPr lang="en-US" dirty="0"/>
+              <a:t>Figure 1 depicts the financial returns to selecting the HDHP option relative to the PPO option for an employee in the family tier. Initial slope is 1 with the deductible, then the coinsurance rate, then 0. What should rational consumers choose?</a:t>
+            </a:r>
+          </a:p>
+          <a:p>
+            <a:pPr marL="171450" indent="-171450">
+              <a:buFont typeface="Arial" panose="020B0604020202020204" pitchFamily="34" charset="0"/>
+              <a:buChar char="•"/>
+            </a:pPr>
+            <a:r>
+              <a:rPr lang="en-US" dirty="0"/>
+              <a:t>Authors estimate between 35-60 % of employees should choose HDHP</a:t>
+            </a:r>
+          </a:p>
+          <a:p>
+            <a:pPr marL="171450" indent="-171450">
+              <a:buFont typeface="Arial" panose="020B0604020202020204" pitchFamily="34" charset="0"/>
+              <a:buChar char="•"/>
+            </a:pPr>
+            <a:r>
+              <a:rPr lang="en-US" dirty="0"/>
+              <a:t>Observed 11%</a:t>
+            </a:r>
           </a:p>
         </p:txBody>
       </p:sp>
@@ -1810,7 +1872,7 @@
     </p:spTree>
     <p:extLst>
       <p:ext uri="{BB962C8B-B14F-4D97-AF65-F5344CB8AC3E}">
-        <p14:creationId xmlns:p14="http://schemas.microsoft.com/office/powerpoint/2010/main" val="3737531476"/>
+        <p14:creationId xmlns:p14="http://schemas.microsoft.com/office/powerpoint/2010/main" val="4184085517"/>
       </p:ext>
     </p:extLst>
   </p:cSld>
@@ -1866,7 +1928,7 @@
           <a:p>
             <a:r>
               <a:rPr lang="en-US" dirty="0"/>
-              <a:t>Note that this happens after running a survey – Handel (2013) is the switching cost, Handel &amp; Kolstad (2015) is the HDHP dummy</a:t>
+              <a:t>Nice survey section</a:t>
             </a:r>
           </a:p>
         </p:txBody>
@@ -1897,7 +1959,7 @@
     </p:spTree>
     <p:extLst>
       <p:ext uri="{BB962C8B-B14F-4D97-AF65-F5344CB8AC3E}">
-        <p14:creationId xmlns:p14="http://schemas.microsoft.com/office/powerpoint/2010/main" val="1509118623"/>
+        <p14:creationId xmlns:p14="http://schemas.microsoft.com/office/powerpoint/2010/main" val="3792314825"/>
       </p:ext>
     </p:extLst>
   </p:cSld>
@@ -1981,7 +2043,7 @@
     </p:spTree>
     <p:extLst>
       <p:ext uri="{BB962C8B-B14F-4D97-AF65-F5344CB8AC3E}">
-        <p14:creationId xmlns:p14="http://schemas.microsoft.com/office/powerpoint/2010/main" val="3546068720"/>
+        <p14:creationId xmlns:p14="http://schemas.microsoft.com/office/powerpoint/2010/main" val="3737531476"/>
       </p:ext>
     </p:extLst>
   </p:cSld>
@@ -2037,7 +2099,61 @@
           <a:p>
             <a:r>
               <a:rPr lang="en-US" dirty="0"/>
-              <a:t>Note that this happens after running a survey – Handel (2013) is the switching cost, Handel &amp; Kolstad (2015) is the HDHP dummy</a:t>
+              <a:t>Note that this happens after running a survey – Handel (2013) is the switching cost, Handel &amp; Kolstad (2015) is the HDHP dummy. </a:t>
+            </a:r>
+          </a:p>
+          <a:p>
+            <a:pPr marL="171450" indent="-171450">
+              <a:buFont typeface="Arial" panose="020B0604020202020204" pitchFamily="34" charset="0"/>
+              <a:buChar char="•"/>
+            </a:pPr>
+            <a:r>
+              <a:rPr lang="en-US" dirty="0"/>
+              <a:t>We include these variables as observable measures of consumer information and perceived hassle costs that imply shifts in value for the HDHP relative to the PPO. </a:t>
+            </a:r>
+          </a:p>
+          <a:p>
+            <a:pPr marL="171450" indent="-171450">
+              <a:buFont typeface="Arial" panose="020B0604020202020204" pitchFamily="34" charset="0"/>
+              <a:buChar char="•"/>
+            </a:pPr>
+            <a:r>
+              <a:rPr lang="en-US" dirty="0"/>
+              <a:t>For each friction, one category (corresponding to ‘no friction’, e.g., ‘informed’) is excluded so that the value shift for the HDHP plan is relative to a frictionless consumer for the measure in question. </a:t>
+            </a:r>
+          </a:p>
+          <a:p>
+            <a:pPr marL="171450" indent="-171450">
+              <a:buFont typeface="Arial" panose="020B0604020202020204" pitchFamily="34" charset="0"/>
+              <a:buChar char="•"/>
+            </a:pPr>
+            <a:r>
+              <a:rPr lang="en-US" dirty="0"/>
+              <a:t>Specifically, each included friction variable, denoted </a:t>
+            </a:r>
+            <a:r>
+              <a:rPr lang="en-US" dirty="0" err="1"/>
+              <a:t>Zf</a:t>
+            </a:r>
+            <a:r>
+              <a:rPr lang="en-US" dirty="0"/>
+              <a:t> from vector Z, shifts the money at stake for each plan, </a:t>
+            </a:r>
+            <a:r>
+              <a:rPr lang="en-US" dirty="0" err="1"/>
+              <a:t>xj</a:t>
+            </a:r>
+            <a:r>
+              <a:rPr lang="en-US" dirty="0"/>
+              <a:t> , by an amount β</a:t>
+            </a:r>
+            <a:r>
+              <a:rPr lang="en-US" dirty="0" err="1"/>
+              <a:t>fZf</a:t>
+            </a:r>
+            <a:r>
+              <a:rPr lang="en-US" dirty="0"/>
+              <a:t> that is assumed constant across all potential health state realizations s from Fj (·):</a:t>
             </a:r>
           </a:p>
         </p:txBody>
@@ -2068,7 +2184,7 @@
     </p:spTree>
     <p:extLst>
       <p:ext uri="{BB962C8B-B14F-4D97-AF65-F5344CB8AC3E}">
-        <p14:creationId xmlns:p14="http://schemas.microsoft.com/office/powerpoint/2010/main" val="2229022973"/>
+        <p14:creationId xmlns:p14="http://schemas.microsoft.com/office/powerpoint/2010/main" val="1509118623"/>
       </p:ext>
     </p:extLst>
   </p:cSld>
@@ -2122,10 +2238,7 @@
           <a:bodyPr/>
           <a:lstStyle/>
           <a:p>
-            <a:r>
-              <a:rPr lang="en-US" dirty="0"/>
-              <a:t>How do we feel about this ethically? Does the framing matter? </a:t>
-            </a:r>
+            <a:endParaRPr lang="en-US" dirty="0"/>
           </a:p>
         </p:txBody>
       </p:sp>
@@ -2155,7 +2268,7 @@
     </p:spTree>
     <p:extLst>
       <p:ext uri="{BB962C8B-B14F-4D97-AF65-F5344CB8AC3E}">
-        <p14:creationId xmlns:p14="http://schemas.microsoft.com/office/powerpoint/2010/main" val="3643160121"/>
+        <p14:creationId xmlns:p14="http://schemas.microsoft.com/office/powerpoint/2010/main" val="3546068720"/>
       </p:ext>
     </p:extLst>
   </p:cSld>
@@ -2211,7 +2324,7 @@
           <a:p>
             <a:r>
               <a:rPr lang="en-US" dirty="0"/>
-              <a:t>What do you take away from this figure? How did it change your reading of the paper? (Is it the right counterfactual?)</a:t>
+              <a:t>Note that this happens after running a survey – Handel (2013) is the switching cost, Handel &amp; Kolstad (2015) is the HDHP dummy</a:t>
             </a:r>
           </a:p>
         </p:txBody>
@@ -2242,7 +2355,7 @@
     </p:spTree>
     <p:extLst>
       <p:ext uri="{BB962C8B-B14F-4D97-AF65-F5344CB8AC3E}">
-        <p14:creationId xmlns:p14="http://schemas.microsoft.com/office/powerpoint/2010/main" val="1946695046"/>
+        <p14:creationId xmlns:p14="http://schemas.microsoft.com/office/powerpoint/2010/main" val="2229022973"/>
       </p:ext>
     </p:extLst>
   </p:cSld>
@@ -2281,28 +2394,208 @@
         </p:nvSpPr>
         <p:spPr/>
       </p:sp>
-      <p:sp>
-        <p:nvSpPr>
-          <p:cNvPr id="3" name="Notes Placeholder 2"/>
-          <p:cNvSpPr>
-            <a:spLocks noGrp="1"/>
-          </p:cNvSpPr>
-          <p:nvPr>
-            <p:ph type="body" idx="1"/>
-          </p:nvPr>
-        </p:nvSpPr>
-        <p:spPr/>
-        <p:txBody>
-          <a:bodyPr/>
-          <a:lstStyle/>
-          <a:p>
-            <a:r>
-              <a:rPr lang="en-CA" dirty="0"/>
-              <a:t>Now we’ll switch to thinking about patient choices!</a:t>
-            </a:r>
-          </a:p>
-        </p:txBody>
-      </p:sp>
+      <mc:AlternateContent xmlns:mc="http://schemas.openxmlformats.org/markup-compatibility/2006">
+        <mc:Choice xmlns:a14="http://schemas.microsoft.com/office/drawing/2010/main" Requires="a14">
+          <p:sp>
+            <p:nvSpPr>
+              <p:cNvPr id="3" name="Notes Placeholder 2"/>
+              <p:cNvSpPr>
+                <a:spLocks noGrp="1"/>
+              </p:cNvSpPr>
+              <p:nvPr>
+                <p:ph type="body" idx="1"/>
+              </p:nvPr>
+            </p:nvSpPr>
+            <p:spPr/>
+            <p:txBody>
+              <a:bodyPr/>
+              <a:lstStyle/>
+              <a:p>
+                <a:r>
+                  <a:rPr lang="en-US" dirty="0"/>
+                  <a:t>Violations and impact: </a:t>
+                </a:r>
+              </a:p>
+              <a:p>
+                <a:pPr marL="228600" indent="-228600">
+                  <a:buAutoNum type="arabicPeriod"/>
+                </a:pPr>
+                <a:r>
+                  <a:rPr lang="en-US" dirty="0"/>
+                  <a:t>If consumers that are more risk averse give more effort to acquire information, γ will be positively correlated with better information (If this assumption is violated, the risk aversion parameters for fully informed consumers will be appropriately identified, but they will be biased for consumers with frictions and that bias will be captured in the parameters β)</a:t>
+                </a:r>
+              </a:p>
+              <a:p>
+                <a:pPr marL="228600" indent="-228600">
+                  <a:buAutoNum type="arabicPeriod"/>
+                </a:pPr>
+                <a:r>
+                  <a:rPr lang="en-US" sz="1200" dirty="0"/>
+                  <a:t>someone who believes the PPO plan grants access to more providers believes that lack of access in the HDHP will decrease utility specifically in states where he has a bad health shock (so should be captured in </a:t>
+                </a:r>
+                <a14:m>
+                  <m:oMath xmlns:m="http://schemas.openxmlformats.org/officeDocument/2006/math">
+                    <m:r>
+                      <a:rPr lang="en-CA" sz="1200" b="0" i="1" smtClean="0">
+                        <a:latin typeface="Cambria Math" panose="02040503050406030204" pitchFamily="18" charset="0"/>
+                      </a:rPr>
+                      <m:t>𝛽</m:t>
+                    </m:r>
+                    <m:r>
+                      <a:rPr lang="en-CA" sz="1200" b="0" i="1" smtClean="0">
+                        <a:latin typeface="Cambria Math" panose="02040503050406030204" pitchFamily="18" charset="0"/>
+                      </a:rPr>
+                      <m:t>)</m:t>
+                    </m:r>
+                  </m:oMath>
+                </a14:m>
+                <a:endParaRPr lang="en-US" dirty="0"/>
+              </a:p>
+              <a:p>
+                <a:pPr marL="228600" marR="0" lvl="0" indent="-228600" algn="l" defTabSz="914400" rtl="0" eaLnBrk="1" fontAlgn="auto" latinLnBrk="0" hangingPunct="1">
+                  <a:lnSpc>
+                    <a:spcPct val="100000"/>
+                  </a:lnSpc>
+                  <a:spcBef>
+                    <a:spcPts val="0"/>
+                  </a:spcBef>
+                  <a:spcAft>
+                    <a:spcPts val="0"/>
+                  </a:spcAft>
+                  <a:buClrTx/>
+                  <a:buSzTx/>
+                  <a:buFontTx/>
+                  <a:buAutoNum type="arabicPeriod"/>
+                  <a:tabLst/>
+                  <a:defRPr/>
+                </a:pPr>
+                <a:r>
+                  <a:rPr lang="en-US" dirty="0"/>
+                  <a:t>Why are they ignoring this one? Seems important. (</a:t>
+                </a:r>
+                <a:r>
+                  <a:rPr lang="en-US" sz="1200" dirty="0"/>
+                  <a:t>While prior work (e.g., Cohen and </a:t>
+                </a:r>
+                <a:r>
+                  <a:rPr lang="en-US" sz="1200" dirty="0" err="1"/>
+                  <a:t>Einav</a:t>
+                </a:r>
+                <a:r>
+                  <a:rPr lang="en-US" sz="1200" dirty="0"/>
+                  <a:t> (2007) and </a:t>
+                </a:r>
+                <a:r>
+                  <a:rPr lang="en-US" sz="1200" dirty="0" err="1"/>
+                  <a:t>Einav</a:t>
+                </a:r>
+                <a:r>
+                  <a:rPr lang="en-US" sz="1200" dirty="0"/>
+                  <a:t> et al. (2013)) has illustrated this can be important, especially when thinking about questions related to adverse selection, our primary objective is to estimate shifts in the level of risk preferences when additional frictions are incorporated)</a:t>
+                </a:r>
+                <a:endParaRPr lang="en-US" sz="1200" dirty="0">
+                  <a:cs typeface="Times New Roman" panose="02020603050405020304" pitchFamily="18" charset="0"/>
+                </a:endParaRPr>
+              </a:p>
+            </p:txBody>
+          </p:sp>
+        </mc:Choice>
+        <mc:Fallback>
+          <p:sp>
+            <p:nvSpPr>
+              <p:cNvPr id="3" name="Notes Placeholder 2"/>
+              <p:cNvSpPr>
+                <a:spLocks noGrp="1"/>
+              </p:cNvSpPr>
+              <p:nvPr>
+                <p:ph type="body" idx="1"/>
+              </p:nvPr>
+            </p:nvSpPr>
+            <p:spPr/>
+            <p:txBody>
+              <a:bodyPr/>
+              <a:lstStyle/>
+              <a:p>
+                <a:r>
+                  <a:rPr lang="en-US" dirty="0"/>
+                  <a:t>Violations and impact: </a:t>
+                </a:r>
+              </a:p>
+              <a:p>
+                <a:pPr marL="228600" indent="-228600">
+                  <a:buAutoNum type="arabicPeriod"/>
+                </a:pPr>
+                <a:r>
+                  <a:rPr lang="en-US" dirty="0"/>
+                  <a:t>If consumers that are more risk averse give more effort to acquire information, γ will be positively correlated with better information (If this assumption is violated, the risk aversion parameters for fully informed consumers will be appropriately identified, but they will be biased for consumers with frictions and that bias will be captured in the parameters β)</a:t>
+                </a:r>
+              </a:p>
+              <a:p>
+                <a:pPr marL="228600" indent="-228600">
+                  <a:buAutoNum type="arabicPeriod"/>
+                </a:pPr>
+                <a:r>
+                  <a:rPr lang="en-US" sz="1200" dirty="0"/>
+                  <a:t>someone who believes the PPO plan grants access to more providers believes that lack of access in the HDHP will decrease utility specifically in states where he has a bad health shock (so should be captured in </a:t>
+                </a:r>
+                <a:r>
+                  <a:rPr lang="en-CA" sz="1200" b="0" i="0">
+                    <a:latin typeface="Cambria Math" panose="02040503050406030204" pitchFamily="18" charset="0"/>
+                  </a:rPr>
+                  <a:t>𝛽)</a:t>
+                </a:r>
+                <a:endParaRPr lang="en-US" dirty="0"/>
+              </a:p>
+              <a:p>
+                <a:pPr marL="228600" marR="0" lvl="0" indent="-228600" algn="l" defTabSz="914400" rtl="0" eaLnBrk="1" fontAlgn="auto" latinLnBrk="0" hangingPunct="1">
+                  <a:lnSpc>
+                    <a:spcPct val="100000"/>
+                  </a:lnSpc>
+                  <a:spcBef>
+                    <a:spcPts val="0"/>
+                  </a:spcBef>
+                  <a:spcAft>
+                    <a:spcPts val="0"/>
+                  </a:spcAft>
+                  <a:buClrTx/>
+                  <a:buSzTx/>
+                  <a:buFontTx/>
+                  <a:buAutoNum type="arabicPeriod"/>
+                  <a:tabLst/>
+                  <a:defRPr/>
+                </a:pPr>
+                <a:r>
+                  <a:rPr lang="en-US" dirty="0"/>
+                  <a:t>Why are they ignoring this one? Seems important. (</a:t>
+                </a:r>
+                <a:r>
+                  <a:rPr lang="en-US" sz="1200" dirty="0"/>
+                  <a:t>While prior work (e.g., Cohen and </a:t>
+                </a:r>
+                <a:r>
+                  <a:rPr lang="en-US" sz="1200" dirty="0" err="1"/>
+                  <a:t>Einav</a:t>
+                </a:r>
+                <a:r>
+                  <a:rPr lang="en-US" sz="1200" dirty="0"/>
+                  <a:t> (2007) and </a:t>
+                </a:r>
+                <a:r>
+                  <a:rPr lang="en-US" sz="1200" dirty="0" err="1"/>
+                  <a:t>Einav</a:t>
+                </a:r>
+                <a:r>
+                  <a:rPr lang="en-US" sz="1200" dirty="0"/>
+                  <a:t> et al. (2013)) has illustrated this can be important, especially when thinking about questions related to adverse selection, our primary objective is to estimate shifts in the level of risk preferences when additional frictions are incorporated)</a:t>
+                </a:r>
+                <a:endParaRPr lang="en-US" sz="1200" dirty="0">
+                  <a:cs typeface="Times New Roman" panose="02020603050405020304" pitchFamily="18" charset="0"/>
+                </a:endParaRPr>
+              </a:p>
+            </p:txBody>
+          </p:sp>
+        </mc:Fallback>
+      </mc:AlternateContent>
       <p:sp>
         <p:nvSpPr>
           <p:cNvPr id="4" name="Slide Number Placeholder 3"/>
@@ -2329,7 +2622,7 @@
     </p:spTree>
     <p:extLst>
       <p:ext uri="{BB962C8B-B14F-4D97-AF65-F5344CB8AC3E}">
-        <p14:creationId xmlns:p14="http://schemas.microsoft.com/office/powerpoint/2010/main" val="1527946518"/>
+        <p14:creationId xmlns:p14="http://schemas.microsoft.com/office/powerpoint/2010/main" val="2976584332"/>
       </p:ext>
     </p:extLst>
   </p:cSld>
@@ -2383,7 +2676,10 @@
           <a:bodyPr/>
           <a:lstStyle/>
           <a:p>
-            <a:endParaRPr lang="en-US" dirty="0"/>
+            <a:r>
+              <a:rPr lang="en-US" dirty="0"/>
+              <a:t>How do we feel about this ethically? Does the framing matter? </a:t>
+            </a:r>
           </a:p>
         </p:txBody>
       </p:sp>
@@ -2413,7 +2709,7 @@
     </p:spTree>
     <p:extLst>
       <p:ext uri="{BB962C8B-B14F-4D97-AF65-F5344CB8AC3E}">
-        <p14:creationId xmlns:p14="http://schemas.microsoft.com/office/powerpoint/2010/main" val="1683367961"/>
+        <p14:creationId xmlns:p14="http://schemas.microsoft.com/office/powerpoint/2010/main" val="3643160121"/>
       </p:ext>
     </p:extLst>
   </p:cSld>
@@ -2551,7 +2847,10 @@
           <a:bodyPr/>
           <a:lstStyle/>
           <a:p>
-            <a:endParaRPr lang="en-US" dirty="0"/>
+            <a:r>
+              <a:rPr lang="en-US" dirty="0"/>
+              <a:t>What do you take away from this figure? How did it change your reading of the paper? (Is it the right counterfactual?)</a:t>
+            </a:r>
           </a:p>
         </p:txBody>
       </p:sp>
@@ -2581,7 +2880,7 @@
     </p:spTree>
     <p:extLst>
       <p:ext uri="{BB962C8B-B14F-4D97-AF65-F5344CB8AC3E}">
-        <p14:creationId xmlns:p14="http://schemas.microsoft.com/office/powerpoint/2010/main" val="3378949448"/>
+        <p14:creationId xmlns:p14="http://schemas.microsoft.com/office/powerpoint/2010/main" val="1946695046"/>
       </p:ext>
     </p:extLst>
   </p:cSld>
@@ -2637,7 +2936,7 @@
           <a:p>
             <a:r>
               <a:rPr lang="en-US" dirty="0"/>
-              <a:t>Think about negative as non-adherence and positive as low-value care consumption </a:t>
+              <a:t>What do you take away from this figure? How did it change your reading of the paper? (Is it the right counterfactual?)</a:t>
             </a:r>
           </a:p>
         </p:txBody>
@@ -2668,7 +2967,7 @@
     </p:spTree>
     <p:extLst>
       <p:ext uri="{BB962C8B-B14F-4D97-AF65-F5344CB8AC3E}">
-        <p14:creationId xmlns:p14="http://schemas.microsoft.com/office/powerpoint/2010/main" val="639259559"/>
+        <p14:creationId xmlns:p14="http://schemas.microsoft.com/office/powerpoint/2010/main" val="3410173153"/>
       </p:ext>
     </p:extLst>
   </p:cSld>
@@ -2723,8 +3022,8 @@
           <a:lstStyle/>
           <a:p>
             <a:r>
-              <a:rPr lang="en-US" dirty="0"/>
-              <a:t>Think about negative as non-adherence (between 60% and 80% for Type II diabetics, not filling supplies, etc.)</a:t>
+              <a:rPr lang="en-CA" dirty="0"/>
+              <a:t>Now we’ll switch to thinking about patient choices!</a:t>
             </a:r>
           </a:p>
         </p:txBody>
@@ -2755,7 +3054,7 @@
     </p:spTree>
     <p:extLst>
       <p:ext uri="{BB962C8B-B14F-4D97-AF65-F5344CB8AC3E}">
-        <p14:creationId xmlns:p14="http://schemas.microsoft.com/office/powerpoint/2010/main" val="1679186666"/>
+        <p14:creationId xmlns:p14="http://schemas.microsoft.com/office/powerpoint/2010/main" val="1527946518"/>
       </p:ext>
     </p:extLst>
   </p:cSld>
@@ -2809,10 +3108,7 @@
           <a:bodyPr/>
           <a:lstStyle/>
           <a:p>
-            <a:r>
-              <a:rPr lang="en-US" dirty="0"/>
-              <a:t>Think about positive as low-value care consumption (over-treatment of back pain, etc.)</a:t>
-            </a:r>
+            <a:endParaRPr lang="en-US" dirty="0"/>
           </a:p>
         </p:txBody>
       </p:sp>
@@ -2842,7 +3138,7 @@
     </p:spTree>
     <p:extLst>
       <p:ext uri="{BB962C8B-B14F-4D97-AF65-F5344CB8AC3E}">
-        <p14:creationId xmlns:p14="http://schemas.microsoft.com/office/powerpoint/2010/main" val="573033517"/>
+        <p14:creationId xmlns:p14="http://schemas.microsoft.com/office/powerpoint/2010/main" val="1683367961"/>
       </p:ext>
     </p:extLst>
   </p:cSld>
@@ -2896,10 +3192,7 @@
           <a:bodyPr/>
           <a:lstStyle/>
           <a:p>
-            <a:r>
-              <a:rPr lang="en-US" dirty="0"/>
-              <a:t>Do this one after going through the model </a:t>
-            </a:r>
+            <a:endParaRPr lang="en-US" dirty="0"/>
           </a:p>
         </p:txBody>
       </p:sp>
@@ -2929,7 +3222,7 @@
     </p:spTree>
     <p:extLst>
       <p:ext uri="{BB962C8B-B14F-4D97-AF65-F5344CB8AC3E}">
-        <p14:creationId xmlns:p14="http://schemas.microsoft.com/office/powerpoint/2010/main" val="3800157635"/>
+        <p14:creationId xmlns:p14="http://schemas.microsoft.com/office/powerpoint/2010/main" val="3378949448"/>
       </p:ext>
     </p:extLst>
   </p:cSld>
@@ -2985,7 +3278,7 @@
           <a:p>
             <a:r>
               <a:rPr lang="en-US" dirty="0"/>
-              <a:t>Consider differences between demand and MPB that lead to under-utilization (adherence). Vertical differences here are epsilon. Reducing copay to 0 might in a typical model lead to welfare loss from over-utilization, but here the behavioral hazard effects swamp that (and in this stylized example, would get welfare gain). 1. There’s a treatment wedge. 2. is the graph. 3. is like a LATE from an IV – who is the responder to a policy? Maybe that’s who is affected by behavioral hazard. </a:t>
+              <a:t>Think about negative as non-adherence and positive as low-value care consumption </a:t>
             </a:r>
           </a:p>
         </p:txBody>
@@ -3016,7 +3309,7 @@
     </p:spTree>
     <p:extLst>
       <p:ext uri="{BB962C8B-B14F-4D97-AF65-F5344CB8AC3E}">
-        <p14:creationId xmlns:p14="http://schemas.microsoft.com/office/powerpoint/2010/main" val="3540030215"/>
+        <p14:creationId xmlns:p14="http://schemas.microsoft.com/office/powerpoint/2010/main" val="639259559"/>
       </p:ext>
     </p:extLst>
   </p:cSld>
@@ -3070,7 +3363,10 @@
           <a:bodyPr/>
           <a:lstStyle/>
           <a:p>
-            <a:endParaRPr lang="en-CA" dirty="0"/>
+            <a:r>
+              <a:rPr lang="en-US" dirty="0"/>
+              <a:t>Think about negative as non-adherence (between 60% and 80% for Type II diabetics, not filling supplies, etc.)</a:t>
+            </a:r>
           </a:p>
         </p:txBody>
       </p:sp>
@@ -3100,7 +3396,268 @@
     </p:spTree>
     <p:extLst>
       <p:ext uri="{BB962C8B-B14F-4D97-AF65-F5344CB8AC3E}">
-        <p14:creationId xmlns:p14="http://schemas.microsoft.com/office/powerpoint/2010/main" val="591619401"/>
+        <p14:creationId xmlns:p14="http://schemas.microsoft.com/office/powerpoint/2010/main" val="1679186666"/>
+      </p:ext>
+    </p:extLst>
+  </p:cSld>
+  <p:clrMapOvr>
+    <a:masterClrMapping/>
+  </p:clrMapOvr>
+</p:notes>
+</file>
+
+<file path=ppt/notesSlides/notesSlide37.xml><?xml version="1.0" encoding="utf-8"?>
+<p:notes xmlns:a="http://schemas.openxmlformats.org/drawingml/2006/main" xmlns:r="http://schemas.openxmlformats.org/officeDocument/2006/relationships" xmlns:p="http://schemas.openxmlformats.org/presentationml/2006/main">
+  <p:cSld>
+    <p:spTree>
+      <p:nvGrpSpPr>
+        <p:cNvPr id="1" name=""/>
+        <p:cNvGrpSpPr/>
+        <p:nvPr/>
+      </p:nvGrpSpPr>
+      <p:grpSpPr>
+        <a:xfrm>
+          <a:off x="0" y="0"/>
+          <a:ext cx="0" cy="0"/>
+          <a:chOff x="0" y="0"/>
+          <a:chExt cx="0" cy="0"/>
+        </a:xfrm>
+      </p:grpSpPr>
+      <p:sp>
+        <p:nvSpPr>
+          <p:cNvPr id="2" name="Slide Image Placeholder 1"/>
+          <p:cNvSpPr>
+            <a:spLocks noGrp="1" noRot="1" noChangeAspect="1"/>
+          </p:cNvSpPr>
+          <p:nvPr>
+            <p:ph type="sldImg"/>
+          </p:nvPr>
+        </p:nvSpPr>
+        <p:spPr/>
+      </p:sp>
+      <p:sp>
+        <p:nvSpPr>
+          <p:cNvPr id="3" name="Notes Placeholder 2"/>
+          <p:cNvSpPr>
+            <a:spLocks noGrp="1"/>
+          </p:cNvSpPr>
+          <p:nvPr>
+            <p:ph type="body" idx="1"/>
+          </p:nvPr>
+        </p:nvSpPr>
+        <p:spPr/>
+        <p:txBody>
+          <a:bodyPr/>
+          <a:lstStyle/>
+          <a:p>
+            <a:r>
+              <a:rPr lang="en-US" dirty="0"/>
+              <a:t>Think about positive as low-value care consumption (over-treatment of back pain, etc.)</a:t>
+            </a:r>
+          </a:p>
+        </p:txBody>
+      </p:sp>
+      <p:sp>
+        <p:nvSpPr>
+          <p:cNvPr id="4" name="Slide Number Placeholder 3"/>
+          <p:cNvSpPr>
+            <a:spLocks noGrp="1"/>
+          </p:cNvSpPr>
+          <p:nvPr>
+            <p:ph type="sldNum" sz="quarter" idx="5"/>
+          </p:nvPr>
+        </p:nvSpPr>
+        <p:spPr/>
+        <p:txBody>
+          <a:bodyPr/>
+          <a:lstStyle/>
+          <a:p>
+            <a:fld id="{4AF79E1B-2C51-4B9B-8EA4-26DE9E345AFF}" type="slidenum">
+              <a:rPr lang="en-US" smtClean="0"/>
+              <a:t>38</a:t>
+            </a:fld>
+            <a:endParaRPr lang="en-US"/>
+          </a:p>
+        </p:txBody>
+      </p:sp>
+    </p:spTree>
+    <p:extLst>
+      <p:ext uri="{BB962C8B-B14F-4D97-AF65-F5344CB8AC3E}">
+        <p14:creationId xmlns:p14="http://schemas.microsoft.com/office/powerpoint/2010/main" val="573033517"/>
+      </p:ext>
+    </p:extLst>
+  </p:cSld>
+  <p:clrMapOvr>
+    <a:masterClrMapping/>
+  </p:clrMapOvr>
+</p:notes>
+</file>
+
+<file path=ppt/notesSlides/notesSlide38.xml><?xml version="1.0" encoding="utf-8"?>
+<p:notes xmlns:a="http://schemas.openxmlformats.org/drawingml/2006/main" xmlns:r="http://schemas.openxmlformats.org/officeDocument/2006/relationships" xmlns:p="http://schemas.openxmlformats.org/presentationml/2006/main">
+  <p:cSld>
+    <p:spTree>
+      <p:nvGrpSpPr>
+        <p:cNvPr id="1" name=""/>
+        <p:cNvGrpSpPr/>
+        <p:nvPr/>
+      </p:nvGrpSpPr>
+      <p:grpSpPr>
+        <a:xfrm>
+          <a:off x="0" y="0"/>
+          <a:ext cx="0" cy="0"/>
+          <a:chOff x="0" y="0"/>
+          <a:chExt cx="0" cy="0"/>
+        </a:xfrm>
+      </p:grpSpPr>
+      <p:sp>
+        <p:nvSpPr>
+          <p:cNvPr id="2" name="Slide Image Placeholder 1"/>
+          <p:cNvSpPr>
+            <a:spLocks noGrp="1" noRot="1" noChangeAspect="1"/>
+          </p:cNvSpPr>
+          <p:nvPr>
+            <p:ph type="sldImg"/>
+          </p:nvPr>
+        </p:nvSpPr>
+        <p:spPr/>
+      </p:sp>
+      <p:sp>
+        <p:nvSpPr>
+          <p:cNvPr id="3" name="Notes Placeholder 2"/>
+          <p:cNvSpPr>
+            <a:spLocks noGrp="1"/>
+          </p:cNvSpPr>
+          <p:nvPr>
+            <p:ph type="body" idx="1"/>
+          </p:nvPr>
+        </p:nvSpPr>
+        <p:spPr/>
+        <p:txBody>
+          <a:bodyPr/>
+          <a:lstStyle/>
+          <a:p>
+            <a:r>
+              <a:rPr lang="en-US" dirty="0"/>
+              <a:t>Do this one after going through the model </a:t>
+            </a:r>
+          </a:p>
+        </p:txBody>
+      </p:sp>
+      <p:sp>
+        <p:nvSpPr>
+          <p:cNvPr id="4" name="Slide Number Placeholder 3"/>
+          <p:cNvSpPr>
+            <a:spLocks noGrp="1"/>
+          </p:cNvSpPr>
+          <p:nvPr>
+            <p:ph type="sldNum" sz="quarter" idx="5"/>
+          </p:nvPr>
+        </p:nvSpPr>
+        <p:spPr/>
+        <p:txBody>
+          <a:bodyPr/>
+          <a:lstStyle/>
+          <a:p>
+            <a:fld id="{4AF79E1B-2C51-4B9B-8EA4-26DE9E345AFF}" type="slidenum">
+              <a:rPr lang="en-US" smtClean="0"/>
+              <a:t>39</a:t>
+            </a:fld>
+            <a:endParaRPr lang="en-US"/>
+          </a:p>
+        </p:txBody>
+      </p:sp>
+    </p:spTree>
+    <p:extLst>
+      <p:ext uri="{BB962C8B-B14F-4D97-AF65-F5344CB8AC3E}">
+        <p14:creationId xmlns:p14="http://schemas.microsoft.com/office/powerpoint/2010/main" val="3800157635"/>
+      </p:ext>
+    </p:extLst>
+  </p:cSld>
+  <p:clrMapOvr>
+    <a:masterClrMapping/>
+  </p:clrMapOvr>
+</p:notes>
+</file>
+
+<file path=ppt/notesSlides/notesSlide39.xml><?xml version="1.0" encoding="utf-8"?>
+<p:notes xmlns:a="http://schemas.openxmlformats.org/drawingml/2006/main" xmlns:r="http://schemas.openxmlformats.org/officeDocument/2006/relationships" xmlns:p="http://schemas.openxmlformats.org/presentationml/2006/main">
+  <p:cSld>
+    <p:spTree>
+      <p:nvGrpSpPr>
+        <p:cNvPr id="1" name=""/>
+        <p:cNvGrpSpPr/>
+        <p:nvPr/>
+      </p:nvGrpSpPr>
+      <p:grpSpPr>
+        <a:xfrm>
+          <a:off x="0" y="0"/>
+          <a:ext cx="0" cy="0"/>
+          <a:chOff x="0" y="0"/>
+          <a:chExt cx="0" cy="0"/>
+        </a:xfrm>
+      </p:grpSpPr>
+      <p:sp>
+        <p:nvSpPr>
+          <p:cNvPr id="2" name="Slide Image Placeholder 1"/>
+          <p:cNvSpPr>
+            <a:spLocks noGrp="1" noRot="1" noChangeAspect="1"/>
+          </p:cNvSpPr>
+          <p:nvPr>
+            <p:ph type="sldImg"/>
+          </p:nvPr>
+        </p:nvSpPr>
+        <p:spPr/>
+      </p:sp>
+      <p:sp>
+        <p:nvSpPr>
+          <p:cNvPr id="3" name="Notes Placeholder 2"/>
+          <p:cNvSpPr>
+            <a:spLocks noGrp="1"/>
+          </p:cNvSpPr>
+          <p:nvPr>
+            <p:ph type="body" idx="1"/>
+          </p:nvPr>
+        </p:nvSpPr>
+        <p:spPr/>
+        <p:txBody>
+          <a:bodyPr/>
+          <a:lstStyle/>
+          <a:p>
+            <a:r>
+              <a:rPr lang="en-US" dirty="0"/>
+              <a:t>Consider differences between demand and MPB that lead to under-utilization (adherence). Vertical differences here are epsilon. Reducing copay to 0 might in a typical model lead to welfare loss from over-utilization, but here the behavioral hazard effects swamp that (and in this stylized example, would get welfare gain). 1. There’s a treatment wedge. 2. is the graph. 3. is like a LATE from an IV – who is the responder to a policy? Maybe that’s who is affected by behavioral hazard. </a:t>
+            </a:r>
+          </a:p>
+        </p:txBody>
+      </p:sp>
+      <p:sp>
+        <p:nvSpPr>
+          <p:cNvPr id="4" name="Slide Number Placeholder 3"/>
+          <p:cNvSpPr>
+            <a:spLocks noGrp="1"/>
+          </p:cNvSpPr>
+          <p:nvPr>
+            <p:ph type="sldNum" sz="quarter" idx="5"/>
+          </p:nvPr>
+        </p:nvSpPr>
+        <p:spPr/>
+        <p:txBody>
+          <a:bodyPr/>
+          <a:lstStyle/>
+          <a:p>
+            <a:fld id="{4AF79E1B-2C51-4B9B-8EA4-26DE9E345AFF}" type="slidenum">
+              <a:rPr lang="en-US" smtClean="0"/>
+              <a:t>40</a:t>
+            </a:fld>
+            <a:endParaRPr lang="en-US"/>
+          </a:p>
+        </p:txBody>
+      </p:sp>
+    </p:spTree>
+    <p:extLst>
+      <p:ext uri="{BB962C8B-B14F-4D97-AF65-F5344CB8AC3E}">
+        <p14:creationId xmlns:p14="http://schemas.microsoft.com/office/powerpoint/2010/main" val="3540030215"/>
       </p:ext>
     </p:extLst>
   </p:cSld>
@@ -3246,6 +3803,90 @@
     <p:extLst>
       <p:ext uri="{BB962C8B-B14F-4D97-AF65-F5344CB8AC3E}">
         <p14:creationId xmlns:p14="http://schemas.microsoft.com/office/powerpoint/2010/main" val="965659017"/>
+      </p:ext>
+    </p:extLst>
+  </p:cSld>
+  <p:clrMapOvr>
+    <a:masterClrMapping/>
+  </p:clrMapOvr>
+</p:notes>
+</file>
+
+<file path=ppt/notesSlides/notesSlide40.xml><?xml version="1.0" encoding="utf-8"?>
+<p:notes xmlns:a="http://schemas.openxmlformats.org/drawingml/2006/main" xmlns:r="http://schemas.openxmlformats.org/officeDocument/2006/relationships" xmlns:p="http://schemas.openxmlformats.org/presentationml/2006/main">
+  <p:cSld>
+    <p:spTree>
+      <p:nvGrpSpPr>
+        <p:cNvPr id="1" name=""/>
+        <p:cNvGrpSpPr/>
+        <p:nvPr/>
+      </p:nvGrpSpPr>
+      <p:grpSpPr>
+        <a:xfrm>
+          <a:off x="0" y="0"/>
+          <a:ext cx="0" cy="0"/>
+          <a:chOff x="0" y="0"/>
+          <a:chExt cx="0" cy="0"/>
+        </a:xfrm>
+      </p:grpSpPr>
+      <p:sp>
+        <p:nvSpPr>
+          <p:cNvPr id="2" name="Slide Image Placeholder 1"/>
+          <p:cNvSpPr>
+            <a:spLocks noGrp="1" noRot="1" noChangeAspect="1"/>
+          </p:cNvSpPr>
+          <p:nvPr>
+            <p:ph type="sldImg"/>
+          </p:nvPr>
+        </p:nvSpPr>
+        <p:spPr/>
+      </p:sp>
+      <p:sp>
+        <p:nvSpPr>
+          <p:cNvPr id="3" name="Notes Placeholder 2"/>
+          <p:cNvSpPr>
+            <a:spLocks noGrp="1"/>
+          </p:cNvSpPr>
+          <p:nvPr>
+            <p:ph type="body" idx="1"/>
+          </p:nvPr>
+        </p:nvSpPr>
+        <p:spPr/>
+        <p:txBody>
+          <a:bodyPr/>
+          <a:lstStyle/>
+          <a:p>
+            <a:endParaRPr lang="en-CA" dirty="0"/>
+          </a:p>
+        </p:txBody>
+      </p:sp>
+      <p:sp>
+        <p:nvSpPr>
+          <p:cNvPr id="4" name="Slide Number Placeholder 3"/>
+          <p:cNvSpPr>
+            <a:spLocks noGrp="1"/>
+          </p:cNvSpPr>
+          <p:nvPr>
+            <p:ph type="sldNum" sz="quarter" idx="5"/>
+          </p:nvPr>
+        </p:nvSpPr>
+        <p:spPr/>
+        <p:txBody>
+          <a:bodyPr/>
+          <a:lstStyle/>
+          <a:p>
+            <a:fld id="{4AF79E1B-2C51-4B9B-8EA4-26DE9E345AFF}" type="slidenum">
+              <a:rPr lang="en-US" smtClean="0"/>
+              <a:t>41</a:t>
+            </a:fld>
+            <a:endParaRPr lang="en-US"/>
+          </a:p>
+        </p:txBody>
+      </p:sp>
+    </p:spTree>
+    <p:extLst>
+      <p:ext uri="{BB962C8B-B14F-4D97-AF65-F5344CB8AC3E}">
+        <p14:creationId xmlns:p14="http://schemas.microsoft.com/office/powerpoint/2010/main" val="591619401"/>
       </p:ext>
     </p:extLst>
   </p:cSld>
@@ -3859,7 +4500,7 @@
             <a:fld id="{0972D05C-DCFB-4BB6-B49C-AC126BF3ED2C}" type="datetimeFigureOut">
               <a:rPr lang="en-US" smtClean="0"/>
               <a:pPr/>
-              <a:t>11/6/2023</a:t>
+              <a:t>3/26/2024</a:t>
             </a:fld>
             <a:endParaRPr lang="en-US"/>
           </a:p>
@@ -4089,7 +4730,7 @@
             <a:fld id="{0972D05C-DCFB-4BB6-B49C-AC126BF3ED2C}" type="datetimeFigureOut">
               <a:rPr lang="en-US" smtClean="0"/>
               <a:pPr/>
-              <a:t>11/6/2023</a:t>
+              <a:t>3/26/2024</a:t>
             </a:fld>
             <a:endParaRPr lang="en-US"/>
           </a:p>
@@ -4271,7 +4912,7 @@
             <a:fld id="{0972D05C-DCFB-4BB6-B49C-AC126BF3ED2C}" type="datetimeFigureOut">
               <a:rPr lang="en-US" smtClean="0"/>
               <a:pPr/>
-              <a:t>11/6/2023</a:t>
+              <a:t>3/26/2024</a:t>
             </a:fld>
             <a:endParaRPr lang="en-US"/>
           </a:p>
@@ -4443,7 +5084,7 @@
             <a:fld id="{0972D05C-DCFB-4BB6-B49C-AC126BF3ED2C}" type="datetimeFigureOut">
               <a:rPr lang="en-US" smtClean="0"/>
               <a:pPr/>
-              <a:t>11/6/2023</a:t>
+              <a:t>3/26/2024</a:t>
             </a:fld>
             <a:endParaRPr lang="en-US"/>
           </a:p>
@@ -4699,7 +5340,7 @@
             <a:fld id="{0972D05C-DCFB-4BB6-B49C-AC126BF3ED2C}" type="datetimeFigureOut">
               <a:rPr lang="en-US" smtClean="0"/>
               <a:pPr/>
-              <a:t>11/6/2023</a:t>
+              <a:t>3/26/2024</a:t>
             </a:fld>
             <a:endParaRPr lang="en-US"/>
           </a:p>
@@ -5027,7 +5668,7 @@
             <a:fld id="{0972D05C-DCFB-4BB6-B49C-AC126BF3ED2C}" type="datetimeFigureOut">
               <a:rPr lang="en-US" smtClean="0"/>
               <a:pPr/>
-              <a:t>11/6/2023</a:t>
+              <a:t>3/26/2024</a:t>
             </a:fld>
             <a:endParaRPr lang="en-US"/>
           </a:p>
@@ -5480,7 +6121,7 @@
             <a:fld id="{0972D05C-DCFB-4BB6-B49C-AC126BF3ED2C}" type="datetimeFigureOut">
               <a:rPr lang="en-US" smtClean="0"/>
               <a:pPr/>
-              <a:t>11/6/2023</a:t>
+              <a:t>3/26/2024</a:t>
             </a:fld>
             <a:endParaRPr lang="en-US"/>
           </a:p>
@@ -5600,7 +6241,7 @@
             <a:fld id="{0972D05C-DCFB-4BB6-B49C-AC126BF3ED2C}" type="datetimeFigureOut">
               <a:rPr lang="en-US" smtClean="0"/>
               <a:pPr/>
-              <a:t>11/6/2023</a:t>
+              <a:t>3/26/2024</a:t>
             </a:fld>
             <a:endParaRPr lang="en-US"/>
           </a:p>
@@ -5697,7 +6338,7 @@
             <a:fld id="{0972D05C-DCFB-4BB6-B49C-AC126BF3ED2C}" type="datetimeFigureOut">
               <a:rPr lang="en-US" smtClean="0"/>
               <a:pPr/>
-              <a:t>11/6/2023</a:t>
+              <a:t>3/26/2024</a:t>
             </a:fld>
             <a:endParaRPr lang="en-US"/>
           </a:p>
@@ -5986,7 +6627,7 @@
             <a:fld id="{0972D05C-DCFB-4BB6-B49C-AC126BF3ED2C}" type="datetimeFigureOut">
               <a:rPr lang="en-US" smtClean="0"/>
               <a:pPr/>
-              <a:t>11/6/2023</a:t>
+              <a:t>3/26/2024</a:t>
             </a:fld>
             <a:endParaRPr lang="en-US"/>
           </a:p>
@@ -6310,7 +6951,7 @@
             <a:fld id="{0972D05C-DCFB-4BB6-B49C-AC126BF3ED2C}" type="datetimeFigureOut">
               <a:rPr lang="en-US" smtClean="0"/>
               <a:pPr/>
-              <a:t>11/6/2023</a:t>
+              <a:t>3/26/2024</a:t>
             </a:fld>
             <a:endParaRPr lang="en-US"/>
           </a:p>
@@ -6565,7 +7206,7 @@
             <a:fld id="{0972D05C-DCFB-4BB6-B49C-AC126BF3ED2C}" type="datetimeFigureOut">
               <a:rPr lang="en-US" smtClean="0"/>
               <a:pPr/>
-              <a:t>11/6/2023</a:t>
+              <a:t>3/26/2024</a:t>
             </a:fld>
             <a:endParaRPr lang="en-US" dirty="0"/>
           </a:p>
@@ -7115,7 +7756,7 @@
           <a:p>
             <a:r>
               <a:rPr lang="en-US" sz="2400" dirty="0"/>
-              <a:t>March 22, 2023</a:t>
+              <a:t>March 27, 2024</a:t>
             </a:r>
           </a:p>
           <a:p>
@@ -11054,8 +11695,8 @@
           <a:chExt cx="0" cy="0"/>
         </a:xfrm>
       </p:grpSpPr>
-      <mc:AlternateContent xmlns:mc="http://schemas.openxmlformats.org/markup-compatibility/2006" xmlns:a14="http://schemas.microsoft.com/office/drawing/2010/main">
-        <mc:Choice Requires="a14">
+      <mc:AlternateContent xmlns:mc="http://schemas.openxmlformats.org/markup-compatibility/2006">
+        <mc:Choice xmlns:a14="http://schemas.microsoft.com/office/drawing/2010/main" Requires="a14">
           <p:sp>
             <p:nvSpPr>
               <p:cNvPr id="3" name="Content Placeholder 2"/>
@@ -11094,7 +11735,31 @@
                   <a:rPr lang="en-US" sz="2400" dirty="0">
                     <a:cs typeface="Times New Roman" panose="02020603050405020304" pitchFamily="18" charset="0"/>
                   </a:rPr>
-                  <a:t>with (potentially &gt;2) plans</a:t>
+                  <a:t>with </a:t>
+                </a:r>
+                <a14:m>
+                  <m:oMath xmlns:m="http://schemas.openxmlformats.org/officeDocument/2006/math">
+                    <m:r>
+                      <a:rPr lang="en-CA" sz="2400" b="0" i="1" smtClean="0">
+                        <a:latin typeface="Cambria Math" panose="02040503050406030204" pitchFamily="18" charset="0"/>
+                        <a:cs typeface="Times New Roman" panose="02020603050405020304" pitchFamily="18" charset="0"/>
+                      </a:rPr>
+                      <m:t>𝒥</m:t>
+                    </m:r>
+                    <m:r>
+                      <a:rPr lang="en-CA" sz="2400" b="0" i="1" smtClean="0">
+                        <a:latin typeface="Cambria Math" panose="02040503050406030204" pitchFamily="18" charset="0"/>
+                        <a:cs typeface="Times New Roman" panose="02020603050405020304" pitchFamily="18" charset="0"/>
+                      </a:rPr>
+                      <m:t>≥2</m:t>
+                    </m:r>
+                  </m:oMath>
+                </a14:m>
+                <a:r>
+                  <a:rPr lang="en-US" sz="2400" dirty="0">
+                    <a:cs typeface="Times New Roman" panose="02020603050405020304" pitchFamily="18" charset="0"/>
+                  </a:rPr>
+                  <a:t> plans</a:t>
                 </a:r>
               </a:p>
               <a:p>
@@ -11376,7 +12041,7 @@
             </p:txBody>
           </p:sp>
         </mc:Choice>
-        <mc:Fallback xmlns="">
+        <mc:Fallback>
           <p:sp>
             <p:nvSpPr>
               <p:cNvPr id="3" name="Content Placeholder 2"/>
@@ -11404,7 +12069,7 @@
               <a:lstStyle/>
               <a:p>
                 <a:r>
-                  <a:rPr lang="en-US">
+                  <a:rPr lang="en-CA">
                     <a:noFill/>
                   </a:rPr>
                   <a:t> </a:t>
@@ -11525,8 +12190,8 @@
           <a:chExt cx="0" cy="0"/>
         </a:xfrm>
       </p:grpSpPr>
-      <mc:AlternateContent xmlns:mc="http://schemas.openxmlformats.org/markup-compatibility/2006" xmlns:a14="http://schemas.microsoft.com/office/drawing/2010/main">
-        <mc:Choice Requires="a14">
+      <mc:AlternateContent xmlns:mc="http://schemas.openxmlformats.org/markup-compatibility/2006">
+        <mc:Choice xmlns:a14="http://schemas.microsoft.com/office/drawing/2010/main" Requires="a14">
           <p:sp>
             <p:nvSpPr>
               <p:cNvPr id="3" name="Content Placeholder 2"/>
@@ -11565,7 +12230,31 @@
                   <a:rPr lang="en-US" sz="2400" dirty="0">
                     <a:cs typeface="Times New Roman" panose="02020603050405020304" pitchFamily="18" charset="0"/>
                   </a:rPr>
-                  <a:t>with (potentially &gt;2) plans</a:t>
+                  <a:t>with </a:t>
+                </a:r>
+                <a14:m>
+                  <m:oMath xmlns:m="http://schemas.openxmlformats.org/officeDocument/2006/math">
+                    <m:r>
+                      <a:rPr lang="en-CA" sz="2400" b="0" i="1" smtClean="0">
+                        <a:latin typeface="Cambria Math" panose="02040503050406030204" pitchFamily="18" charset="0"/>
+                        <a:cs typeface="Times New Roman" panose="02020603050405020304" pitchFamily="18" charset="0"/>
+                      </a:rPr>
+                      <m:t>𝒥</m:t>
+                    </m:r>
+                    <m:r>
+                      <a:rPr lang="en-CA" sz="2400" b="0" i="1" smtClean="0">
+                        <a:latin typeface="Cambria Math" panose="02040503050406030204" pitchFamily="18" charset="0"/>
+                        <a:cs typeface="Times New Roman" panose="02020603050405020304" pitchFamily="18" charset="0"/>
+                      </a:rPr>
+                      <m:t>≥2</m:t>
+                    </m:r>
+                  </m:oMath>
+                </a14:m>
+                <a:r>
+                  <a:rPr lang="en-US" sz="2400" dirty="0">
+                    <a:cs typeface="Times New Roman" panose="02020603050405020304" pitchFamily="18" charset="0"/>
+                  </a:rPr>
+                  <a:t> plans</a:t>
                 </a:r>
               </a:p>
               <a:p>
@@ -12263,7 +12952,7 @@
             </p:txBody>
           </p:sp>
         </mc:Choice>
-        <mc:Fallback xmlns="">
+        <mc:Fallback>
           <p:sp>
             <p:nvSpPr>
               <p:cNvPr id="3" name="Content Placeholder 2"/>
@@ -12291,7 +12980,7 @@
               <a:lstStyle/>
               <a:p>
                 <a:r>
-                  <a:rPr lang="en-US">
+                  <a:rPr lang="en-CA">
                     <a:noFill/>
                   </a:rPr>
                   <a:t> </a:t>
@@ -13308,6 +13997,413 @@
     </p:spTree>
     <p:extLst>
       <p:ext uri="{BB962C8B-B14F-4D97-AF65-F5344CB8AC3E}">
+        <p14:creationId xmlns:p14="http://schemas.microsoft.com/office/powerpoint/2010/main" val="1236572704"/>
+      </p:ext>
+    </p:extLst>
+  </p:cSld>
+  <p:clrMapOvr>
+    <a:masterClrMapping/>
+  </p:clrMapOvr>
+</p:sld>
+</file>
+
+<file path=ppt/slides/slide24.xml><?xml version="1.0" encoding="utf-8"?>
+<p:sld xmlns:a="http://schemas.openxmlformats.org/drawingml/2006/main" xmlns:r="http://schemas.openxmlformats.org/officeDocument/2006/relationships" xmlns:p="http://schemas.openxmlformats.org/presentationml/2006/main">
+  <p:cSld>
+    <p:spTree>
+      <p:nvGrpSpPr>
+        <p:cNvPr id="1" name=""/>
+        <p:cNvGrpSpPr/>
+        <p:nvPr/>
+      </p:nvGrpSpPr>
+      <p:grpSpPr>
+        <a:xfrm>
+          <a:off x="0" y="0"/>
+          <a:ext cx="0" cy="0"/>
+          <a:chOff x="0" y="0"/>
+          <a:chExt cx="0" cy="0"/>
+        </a:xfrm>
+      </p:grpSpPr>
+      <p:sp>
+        <p:nvSpPr>
+          <p:cNvPr id="4" name="Slide Number Placeholder 3"/>
+          <p:cNvSpPr>
+            <a:spLocks noGrp="1"/>
+          </p:cNvSpPr>
+          <p:nvPr>
+            <p:ph type="sldNum" sz="quarter" idx="12"/>
+          </p:nvPr>
+        </p:nvSpPr>
+        <p:spPr/>
+        <p:txBody>
+          <a:bodyPr>
+            <a:normAutofit lnSpcReduction="10000"/>
+          </a:bodyPr>
+          <a:lstStyle/>
+          <a:p>
+            <a:fld id="{3DAF9783-BC0E-C649-838D-61F838C67253}" type="slidenum">
+              <a:rPr lang="en-US" smtClean="0"/>
+              <a:t>24</a:t>
+            </a:fld>
+            <a:endParaRPr lang="en-US"/>
+          </a:p>
+        </p:txBody>
+      </p:sp>
+      <p:sp>
+        <p:nvSpPr>
+          <p:cNvPr id="5" name="Title 1">
+            <a:extLst>
+              <a:ext uri="{FF2B5EF4-FFF2-40B4-BE49-F238E27FC236}">
+                <a16:creationId xmlns:a16="http://schemas.microsoft.com/office/drawing/2014/main" id="{3AC41146-1857-1400-EE30-AE66F64DCE11}"/>
+              </a:ext>
+            </a:extLst>
+          </p:cNvPr>
+          <p:cNvSpPr txBox="1">
+            <a:spLocks/>
+          </p:cNvSpPr>
+          <p:nvPr/>
+        </p:nvSpPr>
+        <p:spPr>
+          <a:xfrm>
+            <a:off x="609600" y="677863"/>
+            <a:ext cx="10439400" cy="624840"/>
+          </a:xfrm>
+          <a:prstGeom prst="rect">
+            <a:avLst/>
+          </a:prstGeom>
+        </p:spPr>
+        <p:txBody>
+          <a:bodyPr vert="horz" lIns="91440" tIns="45720" rIns="91440" bIns="45720" rtlCol="0" anchor="b">
+            <a:noAutofit/>
+          </a:bodyPr>
+          <a:lstStyle>
+            <a:lvl1pPr algn="l" defTabSz="914400" rtl="0" eaLnBrk="1" latinLnBrk="0" hangingPunct="1">
+              <a:lnSpc>
+                <a:spcPct val="90000"/>
+              </a:lnSpc>
+              <a:spcBef>
+                <a:spcPct val="0"/>
+              </a:spcBef>
+              <a:buNone/>
+              <a:defRPr sz="4400" kern="1200" spc="-50" baseline="0">
+                <a:solidFill>
+                  <a:schemeClr val="tx1"/>
+                </a:solidFill>
+                <a:latin typeface="Times New Roman" panose="02020603050405020304" pitchFamily="18" charset="0"/>
+                <a:ea typeface="+mj-ea"/>
+                <a:cs typeface="+mj-cs"/>
+              </a:defRPr>
+            </a:lvl1pPr>
+          </a:lstStyle>
+          <a:p>
+            <a:r>
+              <a:rPr lang="en-US" sz="3600" dirty="0">
+                <a:cs typeface="Times New Roman" panose="02020603050405020304" pitchFamily="18" charset="0"/>
+              </a:rPr>
+              <a:t>Descriptive </a:t>
+            </a:r>
+          </a:p>
+          <a:p>
+            <a:r>
+              <a:rPr lang="en-US" sz="3600" dirty="0">
+                <a:cs typeface="Times New Roman" panose="02020603050405020304" pitchFamily="18" charset="0"/>
+              </a:rPr>
+              <a:t>Evidence</a:t>
+            </a:r>
+          </a:p>
+        </p:txBody>
+      </p:sp>
+      <p:sp>
+        <p:nvSpPr>
+          <p:cNvPr id="3" name="Content Placeholder 2">
+            <a:extLst>
+              <a:ext uri="{FF2B5EF4-FFF2-40B4-BE49-F238E27FC236}">
+                <a16:creationId xmlns:a16="http://schemas.microsoft.com/office/drawing/2014/main" id="{D9D02346-36B9-1322-04CB-0AA371D3CFD8}"/>
+              </a:ext>
+            </a:extLst>
+          </p:cNvPr>
+          <p:cNvSpPr>
+            <a:spLocks noGrp="1"/>
+          </p:cNvSpPr>
+          <p:nvPr>
+            <p:ph idx="1"/>
+          </p:nvPr>
+        </p:nvSpPr>
+        <p:spPr/>
+        <p:txBody>
+          <a:bodyPr/>
+          <a:lstStyle/>
+          <a:p>
+            <a:endParaRPr lang="en-CA"/>
+          </a:p>
+        </p:txBody>
+      </p:sp>
+      <p:pic>
+        <p:nvPicPr>
+          <p:cNvPr id="8" name="Picture 7">
+            <a:extLst>
+              <a:ext uri="{FF2B5EF4-FFF2-40B4-BE49-F238E27FC236}">
+                <a16:creationId xmlns:a16="http://schemas.microsoft.com/office/drawing/2014/main" id="{9CAB983C-1893-679A-8409-95C722A0FBA1}"/>
+              </a:ext>
+            </a:extLst>
+          </p:cNvPr>
+          <p:cNvPicPr>
+            <a:picLocks noChangeAspect="1"/>
+          </p:cNvPicPr>
+          <p:nvPr/>
+        </p:nvPicPr>
+        <p:blipFill>
+          <a:blip r:embed="rId3"/>
+          <a:stretch>
+            <a:fillRect/>
+          </a:stretch>
+        </p:blipFill>
+        <p:spPr>
+          <a:xfrm>
+            <a:off x="3544380" y="0"/>
+            <a:ext cx="7732511" cy="6858000"/>
+          </a:xfrm>
+          <a:prstGeom prst="rect">
+            <a:avLst/>
+          </a:prstGeom>
+        </p:spPr>
+      </p:pic>
+    </p:spTree>
+    <p:extLst>
+      <p:ext uri="{BB962C8B-B14F-4D97-AF65-F5344CB8AC3E}">
+        <p14:creationId xmlns:p14="http://schemas.microsoft.com/office/powerpoint/2010/main" val="673619028"/>
+      </p:ext>
+    </p:extLst>
+  </p:cSld>
+  <p:clrMapOvr>
+    <a:masterClrMapping/>
+  </p:clrMapOvr>
+</p:sld>
+</file>
+
+<file path=ppt/slides/slide25.xml><?xml version="1.0" encoding="utf-8"?>
+<p:sld xmlns:a="http://schemas.openxmlformats.org/drawingml/2006/main" xmlns:r="http://schemas.openxmlformats.org/officeDocument/2006/relationships" xmlns:p="http://schemas.openxmlformats.org/presentationml/2006/main">
+  <p:cSld>
+    <p:spTree>
+      <p:nvGrpSpPr>
+        <p:cNvPr id="1" name=""/>
+        <p:cNvGrpSpPr/>
+        <p:nvPr/>
+      </p:nvGrpSpPr>
+      <p:grpSpPr>
+        <a:xfrm>
+          <a:off x="0" y="0"/>
+          <a:ext cx="0" cy="0"/>
+          <a:chOff x="0" y="0"/>
+          <a:chExt cx="0" cy="0"/>
+        </a:xfrm>
+      </p:grpSpPr>
+      <p:sp>
+        <p:nvSpPr>
+          <p:cNvPr id="4" name="Slide Number Placeholder 3"/>
+          <p:cNvSpPr>
+            <a:spLocks noGrp="1"/>
+          </p:cNvSpPr>
+          <p:nvPr>
+            <p:ph type="sldNum" sz="quarter" idx="12"/>
+          </p:nvPr>
+        </p:nvSpPr>
+        <p:spPr/>
+        <p:txBody>
+          <a:bodyPr>
+            <a:normAutofit lnSpcReduction="10000"/>
+          </a:bodyPr>
+          <a:lstStyle/>
+          <a:p>
+            <a:fld id="{3DAF9783-BC0E-C649-838D-61F838C67253}" type="slidenum">
+              <a:rPr lang="en-US" smtClean="0"/>
+              <a:t>25</a:t>
+            </a:fld>
+            <a:endParaRPr lang="en-US"/>
+          </a:p>
+        </p:txBody>
+      </p:sp>
+      <p:sp>
+        <p:nvSpPr>
+          <p:cNvPr id="5" name="Title 1">
+            <a:extLst>
+              <a:ext uri="{FF2B5EF4-FFF2-40B4-BE49-F238E27FC236}">
+                <a16:creationId xmlns:a16="http://schemas.microsoft.com/office/drawing/2014/main" id="{3AC41146-1857-1400-EE30-AE66F64DCE11}"/>
+              </a:ext>
+            </a:extLst>
+          </p:cNvPr>
+          <p:cNvSpPr txBox="1">
+            <a:spLocks/>
+          </p:cNvSpPr>
+          <p:nvPr/>
+        </p:nvSpPr>
+        <p:spPr>
+          <a:xfrm>
+            <a:off x="609600" y="272077"/>
+            <a:ext cx="10439400" cy="624840"/>
+          </a:xfrm>
+          <a:prstGeom prst="rect">
+            <a:avLst/>
+          </a:prstGeom>
+        </p:spPr>
+        <p:txBody>
+          <a:bodyPr vert="horz" lIns="91440" tIns="45720" rIns="91440" bIns="45720" rtlCol="0" anchor="b">
+            <a:noAutofit/>
+          </a:bodyPr>
+          <a:lstStyle>
+            <a:lvl1pPr algn="l" defTabSz="914400" rtl="0" eaLnBrk="1" latinLnBrk="0" hangingPunct="1">
+              <a:lnSpc>
+                <a:spcPct val="90000"/>
+              </a:lnSpc>
+              <a:spcBef>
+                <a:spcPct val="0"/>
+              </a:spcBef>
+              <a:buNone/>
+              <a:defRPr sz="4400" kern="1200" spc="-50" baseline="0">
+                <a:solidFill>
+                  <a:schemeClr val="tx1"/>
+                </a:solidFill>
+                <a:latin typeface="Times New Roman" panose="02020603050405020304" pitchFamily="18" charset="0"/>
+                <a:ea typeface="+mj-ea"/>
+                <a:cs typeface="+mj-cs"/>
+              </a:defRPr>
+            </a:lvl1pPr>
+          </a:lstStyle>
+          <a:p>
+            <a:r>
+              <a:rPr lang="en-US" sz="3600" dirty="0">
+                <a:cs typeface="Times New Roman" panose="02020603050405020304" pitchFamily="18" charset="0"/>
+              </a:rPr>
+              <a:t>Modeling Approaches</a:t>
+            </a:r>
+          </a:p>
+        </p:txBody>
+      </p:sp>
+      <p:sp>
+        <p:nvSpPr>
+          <p:cNvPr id="3" name="Content Placeholder 2">
+            <a:extLst>
+              <a:ext uri="{FF2B5EF4-FFF2-40B4-BE49-F238E27FC236}">
+                <a16:creationId xmlns:a16="http://schemas.microsoft.com/office/drawing/2014/main" id="{2D3116C4-FF2A-E999-69ED-BE3BF3633C31}"/>
+              </a:ext>
+            </a:extLst>
+          </p:cNvPr>
+          <p:cNvSpPr>
+            <a:spLocks noGrp="1"/>
+          </p:cNvSpPr>
+          <p:nvPr>
+            <p:ph idx="1"/>
+          </p:nvPr>
+        </p:nvSpPr>
+        <p:spPr>
+          <a:xfrm>
+            <a:off x="762000" y="896918"/>
+            <a:ext cx="10134600" cy="5283220"/>
+          </a:xfrm>
+        </p:spPr>
+        <p:txBody>
+          <a:bodyPr>
+            <a:normAutofit/>
+          </a:bodyPr>
+          <a:lstStyle/>
+          <a:p>
+            <a:pPr marL="342900" indent="-342900">
+              <a:buFont typeface="+mj-lt"/>
+              <a:buAutoNum type="arabicPeriod"/>
+            </a:pPr>
+            <a:r>
+              <a:rPr lang="en-CA" sz="2400" dirty="0">
+                <a:latin typeface="Aptos" panose="020B0004020202020204" pitchFamily="34" charset="0"/>
+              </a:rPr>
+              <a:t>“Baseline model”: health risk, risk preferences, plan characteristics</a:t>
+            </a:r>
+          </a:p>
+          <a:p>
+            <a:pPr marL="342900" indent="-342900">
+              <a:buFont typeface="+mj-lt"/>
+              <a:buAutoNum type="arabicPeriod"/>
+            </a:pPr>
+            <a:r>
+              <a:rPr lang="en-CA" sz="2400" dirty="0">
+                <a:latin typeface="Aptos" panose="020B0004020202020204" pitchFamily="34" charset="0"/>
+              </a:rPr>
+              <a:t>Add only one friction (inertia)</a:t>
+            </a:r>
+          </a:p>
+          <a:p>
+            <a:pPr marL="342900" indent="-342900">
+              <a:buFont typeface="+mj-lt"/>
+              <a:buAutoNum type="arabicPeriod"/>
+            </a:pPr>
+            <a:r>
+              <a:rPr lang="en-CA" sz="2400" dirty="0">
+                <a:latin typeface="Aptos" panose="020B0004020202020204" pitchFamily="34" charset="0"/>
+              </a:rPr>
+              <a:t>Add all other frictions (information friction, hassle costs)</a:t>
+            </a:r>
+          </a:p>
+          <a:p>
+            <a:pPr marL="342900" indent="-342900">
+              <a:buFont typeface="+mj-lt"/>
+              <a:buAutoNum type="arabicPeriod"/>
+            </a:pPr>
+            <a:r>
+              <a:rPr lang="en-CA" sz="2400" dirty="0">
+                <a:latin typeface="Aptos" panose="020B0004020202020204" pitchFamily="34" charset="0"/>
+              </a:rPr>
+              <a:t>Estimate a “types” model </a:t>
+            </a:r>
+          </a:p>
+          <a:p>
+            <a:pPr lvl="1"/>
+            <a:r>
+              <a:rPr lang="en-CA" sz="2200" dirty="0">
+                <a:latin typeface="Aptos" panose="020B0004020202020204" pitchFamily="34" charset="0"/>
+              </a:rPr>
+              <a:t>Consolidate all frictions to one dimension</a:t>
+            </a:r>
+          </a:p>
+          <a:p>
+            <a:pPr lvl="1"/>
+            <a:endParaRPr lang="en-CA" sz="2200" dirty="0">
+              <a:latin typeface="Aptos" panose="020B0004020202020204" pitchFamily="34" charset="0"/>
+            </a:endParaRPr>
+          </a:p>
+        </p:txBody>
+      </p:sp>
+      <p:pic>
+        <p:nvPicPr>
+          <p:cNvPr id="8" name="Picture 7">
+            <a:extLst>
+              <a:ext uri="{FF2B5EF4-FFF2-40B4-BE49-F238E27FC236}">
+                <a16:creationId xmlns:a16="http://schemas.microsoft.com/office/drawing/2014/main" id="{86CCD2BC-F7DA-4CB1-54DF-994464851D05}"/>
+              </a:ext>
+            </a:extLst>
+          </p:cNvPr>
+          <p:cNvPicPr>
+            <a:picLocks noChangeAspect="1"/>
+          </p:cNvPicPr>
+          <p:nvPr/>
+        </p:nvPicPr>
+        <p:blipFill>
+          <a:blip r:embed="rId3"/>
+          <a:stretch>
+            <a:fillRect/>
+          </a:stretch>
+        </p:blipFill>
+        <p:spPr>
+          <a:xfrm>
+            <a:off x="4376755" y="3276600"/>
+            <a:ext cx="6821408" cy="3581400"/>
+          </a:xfrm>
+          <a:prstGeom prst="rect">
+            <a:avLst/>
+          </a:prstGeom>
+        </p:spPr>
+      </p:pic>
+    </p:spTree>
+    <p:extLst>
+      <p:ext uri="{BB962C8B-B14F-4D97-AF65-F5344CB8AC3E}">
         <p14:creationId xmlns:p14="http://schemas.microsoft.com/office/powerpoint/2010/main" val="724116568"/>
       </p:ext>
     </p:extLst>
@@ -13318,7 +14414,7 @@
 </p:sld>
 </file>
 
-<file path=ppt/slides/slide24.xml><?xml version="1.0" encoding="utf-8"?>
+<file path=ppt/slides/slide26.xml><?xml version="1.0" encoding="utf-8"?>
 <p:sld xmlns:a="http://schemas.openxmlformats.org/drawingml/2006/main" xmlns:r="http://schemas.openxmlformats.org/officeDocument/2006/relationships" xmlns:p="http://schemas.openxmlformats.org/presentationml/2006/main">
   <p:cSld>
     <p:spTree>
@@ -14027,7 +15123,7 @@
           <a:p>
             <a:fld id="{3DAF9783-BC0E-C649-838D-61F838C67253}" type="slidenum">
               <a:rPr lang="en-US" smtClean="0"/>
-              <a:t>24</a:t>
+              <a:t>26</a:t>
             </a:fld>
             <a:endParaRPr lang="en-US"/>
           </a:p>
@@ -14102,7 +15198,7 @@
 </p:sld>
 </file>
 
-<file path=ppt/slides/slide25.xml><?xml version="1.0" encoding="utf-8"?>
+<file path=ppt/slides/slide27.xml><?xml version="1.0" encoding="utf-8"?>
 <p:sld xmlns:a="http://schemas.openxmlformats.org/drawingml/2006/main" xmlns:r="http://schemas.openxmlformats.org/officeDocument/2006/relationships" xmlns:p="http://schemas.openxmlformats.org/presentationml/2006/main">
   <p:cSld>
     <p:spTree>
@@ -14167,7 +15263,7 @@
           <a:p>
             <a:fld id="{3DAF9783-BC0E-C649-838D-61F838C67253}" type="slidenum">
               <a:rPr lang="en-US" smtClean="0"/>
-              <a:t>25</a:t>
+              <a:t>27</a:t>
             </a:fld>
             <a:endParaRPr lang="en-US"/>
           </a:p>
@@ -14239,7 +15335,7 @@
 </p:sld>
 </file>
 
-<file path=ppt/slides/slide26.xml><?xml version="1.0" encoding="utf-8"?>
+<file path=ppt/slides/slide28.xml><?xml version="1.0" encoding="utf-8"?>
 <p:sld xmlns:a="http://schemas.openxmlformats.org/drawingml/2006/main" xmlns:r="http://schemas.openxmlformats.org/officeDocument/2006/relationships" xmlns:p="http://schemas.openxmlformats.org/presentationml/2006/main">
   <p:cSld>
     <p:spTree>
@@ -15009,7 +16105,7 @@
           <a:p>
             <a:fld id="{3DAF9783-BC0E-C649-838D-61F838C67253}" type="slidenum">
               <a:rPr lang="en-US" smtClean="0"/>
-              <a:t>26</a:t>
+              <a:t>28</a:t>
             </a:fld>
             <a:endParaRPr lang="en-US"/>
           </a:p>
@@ -15084,7 +16180,7 @@
 </p:sld>
 </file>
 
-<file path=ppt/slides/slide27.xml><?xml version="1.0" encoding="utf-8"?>
+<file path=ppt/slides/slide29.xml><?xml version="1.0" encoding="utf-8"?>
 <p:sld xmlns:a="http://schemas.openxmlformats.org/drawingml/2006/main" xmlns:r="http://schemas.openxmlformats.org/officeDocument/2006/relationships" xmlns:p="http://schemas.openxmlformats.org/presentationml/2006/main">
   <p:cSld>
     <p:spTree>
@@ -15101,70 +16197,721 @@
           <a:chExt cx="0" cy="0"/>
         </a:xfrm>
       </p:grpSpPr>
-      <p:sp>
-        <p:nvSpPr>
-          <p:cNvPr id="3" name="Content Placeholder 2"/>
-          <p:cNvSpPr>
-            <a:spLocks noGrp="1"/>
-          </p:cNvSpPr>
-          <p:nvPr>
-            <p:ph idx="1"/>
-          </p:nvPr>
-        </p:nvSpPr>
-        <p:spPr>
-          <a:xfrm>
-            <a:off x="609600" y="896918"/>
-            <a:ext cx="10439400" cy="5283220"/>
-          </a:xfrm>
-        </p:spPr>
-        <p:txBody>
-          <a:bodyPr>
-            <a:noAutofit/>
-          </a:bodyPr>
-          <a:lstStyle/>
-          <a:p>
-            <a:pPr marL="274320" lvl="1" indent="0">
-              <a:buNone/>
-            </a:pPr>
-            <a:r>
-              <a:rPr lang="en-US" sz="2400" b="1" u="sng" dirty="0">
-                <a:solidFill>
-                  <a:schemeClr val="accent3">
-                    <a:lumMod val="75000"/>
-                  </a:schemeClr>
-                </a:solidFill>
-                <a:cs typeface="Times New Roman" panose="02020603050405020304" pitchFamily="18" charset="0"/>
-              </a:rPr>
-              <a:t>What if we just forced people into the best plan?</a:t>
-            </a:r>
-          </a:p>
-          <a:p>
-            <a:pPr marL="274320" lvl="1" indent="0">
-              <a:buNone/>
-            </a:pPr>
-            <a:endParaRPr lang="en-US" sz="2400" b="1" u="sng" dirty="0">
-              <a:solidFill>
-                <a:schemeClr val="accent3">
-                  <a:lumMod val="75000"/>
-                </a:schemeClr>
-              </a:solidFill>
-              <a:cs typeface="Times New Roman" panose="02020603050405020304" pitchFamily="18" charset="0"/>
-            </a:endParaRPr>
-          </a:p>
-          <a:p>
-            <a:pPr lvl="1"/>
-            <a:r>
-              <a:rPr lang="en-US" sz="2400" dirty="0">
-                <a:solidFill>
-                  <a:schemeClr val="tx1"/>
-                </a:solidFill>
-                <a:cs typeface="Times New Roman" panose="02020603050405020304" pitchFamily="18" charset="0"/>
-              </a:rPr>
-              <a:t>Even simpler – what if we just take away the PPO choice and give everyone the HDHP? </a:t>
-            </a:r>
-          </a:p>
-        </p:txBody>
-      </p:sp>
+      <mc:AlternateContent xmlns:mc="http://schemas.openxmlformats.org/markup-compatibility/2006">
+        <mc:Choice xmlns:a14="http://schemas.microsoft.com/office/drawing/2010/main" Requires="a14">
+          <p:sp>
+            <p:nvSpPr>
+              <p:cNvPr id="3" name="Content Placeholder 2"/>
+              <p:cNvSpPr>
+                <a:spLocks noGrp="1"/>
+              </p:cNvSpPr>
+              <p:nvPr>
+                <p:ph idx="1"/>
+              </p:nvPr>
+            </p:nvSpPr>
+            <p:spPr>
+              <a:xfrm>
+                <a:off x="609600" y="896918"/>
+                <a:ext cx="10439400" cy="5283220"/>
+              </a:xfrm>
+            </p:spPr>
+            <p:txBody>
+              <a:bodyPr>
+                <a:noAutofit/>
+              </a:bodyPr>
+              <a:lstStyle/>
+              <a:p>
+                <a:r>
+                  <a:rPr lang="en-US" sz="2400" dirty="0">
+                    <a:cs typeface="Times New Roman" panose="02020603050405020304" pitchFamily="18" charset="0"/>
+                  </a:rPr>
+                  <a:t>In practice, authors focus on two things for </a:t>
+                </a:r>
+                <a:r>
+                  <a:rPr lang="en-US" sz="2400" i="1" dirty="0">
+                    <a:cs typeface="Times New Roman" panose="02020603050405020304" pitchFamily="18" charset="0"/>
+                  </a:rPr>
+                  <a:t>ex-post</a:t>
+                </a:r>
+                <a:r>
+                  <a:rPr lang="en-US" sz="2400" dirty="0">
+                    <a:cs typeface="Times New Roman" panose="02020603050405020304" pitchFamily="18" charset="0"/>
+                  </a:rPr>
+                  <a:t> utility </a:t>
+                </a:r>
+                <a14:m>
+                  <m:oMath xmlns:m="http://schemas.openxmlformats.org/officeDocument/2006/math">
+                    <m:sSub>
+                      <m:sSubPr>
+                        <m:ctrlPr>
+                          <a:rPr lang="en-US" sz="2400" b="0" i="1" smtClean="0">
+                            <a:latin typeface="Cambria Math" panose="02040503050406030204" pitchFamily="18" charset="0"/>
+                            <a:cs typeface="Times New Roman" panose="02020603050405020304" pitchFamily="18" charset="0"/>
+                          </a:rPr>
+                        </m:ctrlPr>
+                      </m:sSubPr>
+                      <m:e>
+                        <m:r>
+                          <a:rPr lang="en-US" sz="2400" b="0" i="1" smtClean="0">
+                            <a:latin typeface="Cambria Math" panose="02040503050406030204" pitchFamily="18" charset="0"/>
+                            <a:cs typeface="Times New Roman" panose="02020603050405020304" pitchFamily="18" charset="0"/>
+                          </a:rPr>
+                          <m:t>𝑢</m:t>
+                        </m:r>
+                      </m:e>
+                      <m:sub>
+                        <m:r>
+                          <a:rPr lang="en-US" sz="2400" b="0" i="1" smtClean="0">
+                            <a:latin typeface="Cambria Math" panose="02040503050406030204" pitchFamily="18" charset="0"/>
+                            <a:cs typeface="Times New Roman" panose="02020603050405020304" pitchFamily="18" charset="0"/>
+                          </a:rPr>
+                          <m:t>𝑖</m:t>
+                        </m:r>
+                      </m:sub>
+                    </m:sSub>
+                    <m:d>
+                      <m:dPr>
+                        <m:ctrlPr>
+                          <a:rPr lang="en-US" sz="2400" b="0" i="1" smtClean="0">
+                            <a:latin typeface="Cambria Math" panose="02040503050406030204" pitchFamily="18" charset="0"/>
+                            <a:cs typeface="Times New Roman" panose="02020603050405020304" pitchFamily="18" charset="0"/>
+                          </a:rPr>
+                        </m:ctrlPr>
+                      </m:dPr>
+                      <m:e>
+                        <m:sSub>
+                          <m:sSubPr>
+                            <m:ctrlPr>
+                              <a:rPr lang="en-US" sz="2400" b="0" i="1" smtClean="0">
+                                <a:latin typeface="Cambria Math" panose="02040503050406030204" pitchFamily="18" charset="0"/>
+                                <a:cs typeface="Times New Roman" panose="02020603050405020304" pitchFamily="18" charset="0"/>
+                              </a:rPr>
+                            </m:ctrlPr>
+                          </m:sSubPr>
+                          <m:e>
+                            <m:r>
+                              <a:rPr lang="en-US" sz="2400" b="0" i="1" smtClean="0">
+                                <a:latin typeface="Cambria Math" panose="02040503050406030204" pitchFamily="18" charset="0"/>
+                                <a:cs typeface="Times New Roman" panose="02020603050405020304" pitchFamily="18" charset="0"/>
+                              </a:rPr>
+                              <m:t>𝑥</m:t>
+                            </m:r>
+                          </m:e>
+                          <m:sub>
+                            <m:r>
+                              <a:rPr lang="en-US" sz="2400" b="0" i="1" smtClean="0">
+                                <a:latin typeface="Cambria Math" panose="02040503050406030204" pitchFamily="18" charset="0"/>
+                                <a:cs typeface="Times New Roman" panose="02020603050405020304" pitchFamily="18" charset="0"/>
+                              </a:rPr>
+                              <m:t>𝑖𝑗</m:t>
+                            </m:r>
+                          </m:sub>
+                        </m:sSub>
+                      </m:e>
+                    </m:d>
+                  </m:oMath>
+                </a14:m>
+                <a:r>
+                  <a:rPr lang="en-US" sz="2400" dirty="0">
+                    <a:cs typeface="Times New Roman" panose="02020603050405020304" pitchFamily="18" charset="0"/>
+                  </a:rPr>
+                  <a:t>: </a:t>
+                </a:r>
+              </a:p>
+              <a:p>
+                <a:pPr marL="274320" lvl="1" indent="0">
+                  <a:buNone/>
+                </a:pPr>
+                <a14:m>
+                  <m:oMathPara xmlns:m="http://schemas.openxmlformats.org/officeDocument/2006/math">
+                    <m:oMathParaPr>
+                      <m:jc m:val="centerGroup"/>
+                    </m:oMathParaPr>
+                    <m:oMath xmlns:m="http://schemas.openxmlformats.org/officeDocument/2006/math">
+                      <m:sSub>
+                        <m:sSubPr>
+                          <m:ctrlPr>
+                            <a:rPr lang="en-US" sz="2400" b="0" i="1" smtClean="0">
+                              <a:latin typeface="Cambria Math" panose="02040503050406030204" pitchFamily="18" charset="0"/>
+                              <a:cs typeface="Times New Roman" panose="02020603050405020304" pitchFamily="18" charset="0"/>
+                            </a:rPr>
+                          </m:ctrlPr>
+                        </m:sSubPr>
+                        <m:e>
+                          <m:r>
+                            <a:rPr lang="en-US" sz="2400" b="0" i="1" smtClean="0">
+                              <a:latin typeface="Cambria Math" panose="02040503050406030204" pitchFamily="18" charset="0"/>
+                              <a:cs typeface="Times New Roman" panose="02020603050405020304" pitchFamily="18" charset="0"/>
+                            </a:rPr>
+                            <m:t>𝑥</m:t>
+                          </m:r>
+                        </m:e>
+                        <m:sub>
+                          <m:r>
+                            <a:rPr lang="en-US" sz="2400" b="0" i="1" smtClean="0">
+                              <a:latin typeface="Cambria Math" panose="02040503050406030204" pitchFamily="18" charset="0"/>
+                              <a:cs typeface="Times New Roman" panose="02020603050405020304" pitchFamily="18" charset="0"/>
+                            </a:rPr>
+                            <m:t>𝑖𝑗</m:t>
+                          </m:r>
+                        </m:sub>
+                      </m:sSub>
+                      <m:r>
+                        <a:rPr lang="en-US" sz="2400" b="0" i="1" smtClean="0">
+                          <a:latin typeface="Cambria Math" panose="02040503050406030204" pitchFamily="18" charset="0"/>
+                          <a:cs typeface="Times New Roman" panose="02020603050405020304" pitchFamily="18" charset="0"/>
+                        </a:rPr>
+                        <m:t>=</m:t>
+                      </m:r>
+                      <m:sSub>
+                        <m:sSubPr>
+                          <m:ctrlPr>
+                            <a:rPr lang="en-US" sz="2400" b="0" i="1" smtClean="0">
+                              <a:latin typeface="Cambria Math" panose="02040503050406030204" pitchFamily="18" charset="0"/>
+                              <a:cs typeface="Times New Roman" panose="02020603050405020304" pitchFamily="18" charset="0"/>
+                            </a:rPr>
+                          </m:ctrlPr>
+                        </m:sSubPr>
+                        <m:e>
+                          <m:r>
+                            <m:rPr>
+                              <m:sty m:val="p"/>
+                            </m:rPr>
+                            <a:rPr lang="en-US" sz="2400" b="0" i="0" smtClean="0">
+                              <a:latin typeface="Cambria Math" panose="02040503050406030204" pitchFamily="18" charset="0"/>
+                              <a:cs typeface="Times New Roman" panose="02020603050405020304" pitchFamily="18" charset="0"/>
+                            </a:rPr>
+                            <m:t>W</m:t>
+                          </m:r>
+                        </m:e>
+                        <m:sub>
+                          <m:r>
+                            <m:rPr>
+                              <m:sty m:val="p"/>
+                            </m:rPr>
+                            <a:rPr lang="en-US" sz="2400" b="0" i="0" smtClean="0">
+                              <a:latin typeface="Cambria Math" panose="02040503050406030204" pitchFamily="18" charset="0"/>
+                              <a:cs typeface="Times New Roman" panose="02020603050405020304" pitchFamily="18" charset="0"/>
+                            </a:rPr>
+                            <m:t>i</m:t>
+                          </m:r>
+                        </m:sub>
+                      </m:sSub>
+                      <m:r>
+                        <a:rPr lang="en-US" sz="2400" b="0" i="0" smtClean="0">
+                          <a:latin typeface="Cambria Math" panose="02040503050406030204" pitchFamily="18" charset="0"/>
+                          <a:cs typeface="Times New Roman" panose="02020603050405020304" pitchFamily="18" charset="0"/>
+                        </a:rPr>
+                        <m:t>−</m:t>
+                      </m:r>
+                      <m:sSub>
+                        <m:sSubPr>
+                          <m:ctrlPr>
+                            <a:rPr lang="en-US" sz="2400" b="0" i="1" smtClean="0">
+                              <a:latin typeface="Cambria Math" panose="02040503050406030204" pitchFamily="18" charset="0"/>
+                              <a:cs typeface="Times New Roman" panose="02020603050405020304" pitchFamily="18" charset="0"/>
+                            </a:rPr>
+                          </m:ctrlPr>
+                        </m:sSubPr>
+                        <m:e>
+                          <m:r>
+                            <m:rPr>
+                              <m:sty m:val="p"/>
+                            </m:rPr>
+                            <a:rPr lang="en-US" sz="2400" b="0" i="0" smtClean="0">
+                              <a:latin typeface="Cambria Math" panose="02040503050406030204" pitchFamily="18" charset="0"/>
+                              <a:cs typeface="Times New Roman" panose="02020603050405020304" pitchFamily="18" charset="0"/>
+                            </a:rPr>
+                            <m:t>P</m:t>
+                          </m:r>
+                        </m:e>
+                        <m:sub>
+                          <m:r>
+                            <m:rPr>
+                              <m:sty m:val="p"/>
+                            </m:rPr>
+                            <a:rPr lang="en-US" sz="2400" b="0" i="0" smtClean="0">
+                              <a:latin typeface="Cambria Math" panose="02040503050406030204" pitchFamily="18" charset="0"/>
+                              <a:cs typeface="Times New Roman" panose="02020603050405020304" pitchFamily="18" charset="0"/>
+                            </a:rPr>
+                            <m:t>ij</m:t>
+                          </m:r>
+                        </m:sub>
+                      </m:sSub>
+                      <m:r>
+                        <a:rPr lang="en-US" sz="2400" b="0" i="0" smtClean="0">
+                          <a:latin typeface="Cambria Math" panose="02040503050406030204" pitchFamily="18" charset="0"/>
+                          <a:cs typeface="Times New Roman" panose="02020603050405020304" pitchFamily="18" charset="0"/>
+                        </a:rPr>
+                        <m:t>−</m:t>
+                      </m:r>
+                      <m:r>
+                        <m:rPr>
+                          <m:sty m:val="p"/>
+                        </m:rPr>
+                        <a:rPr lang="en-US" sz="2400" b="0" i="0" smtClean="0">
+                          <a:latin typeface="Cambria Math" panose="02040503050406030204" pitchFamily="18" charset="0"/>
+                          <a:cs typeface="Times New Roman" panose="02020603050405020304" pitchFamily="18" charset="0"/>
+                        </a:rPr>
+                        <m:t>s</m:t>
+                      </m:r>
+                      <m:r>
+                        <a:rPr lang="en-US" sz="2400" b="0" i="0" smtClean="0">
+                          <a:latin typeface="Cambria Math" panose="02040503050406030204" pitchFamily="18" charset="0"/>
+                          <a:cs typeface="Times New Roman" panose="02020603050405020304" pitchFamily="18" charset="0"/>
+                        </a:rPr>
+                        <m:t>+</m:t>
+                      </m:r>
+                      <m:r>
+                        <a:rPr lang="en-US" sz="2400" b="0" i="1" smtClean="0">
+                          <a:latin typeface="Cambria Math" panose="02040503050406030204" pitchFamily="18" charset="0"/>
+                          <a:cs typeface="Times New Roman" panose="02020603050405020304" pitchFamily="18" charset="0"/>
+                        </a:rPr>
+                        <m:t>𝜂</m:t>
+                      </m:r>
+                      <m:d>
+                        <m:dPr>
+                          <m:ctrlPr>
+                            <a:rPr lang="en-US" sz="2400" b="0" i="1" smtClean="0">
+                              <a:latin typeface="Cambria Math" panose="02040503050406030204" pitchFamily="18" charset="0"/>
+                              <a:cs typeface="Times New Roman" panose="02020603050405020304" pitchFamily="18" charset="0"/>
+                            </a:rPr>
+                          </m:ctrlPr>
+                        </m:dPr>
+                        <m:e>
+                          <m:sSub>
+                            <m:sSubPr>
+                              <m:ctrlPr>
+                                <a:rPr lang="en-US" sz="2400" b="0" i="1" smtClean="0">
+                                  <a:latin typeface="Cambria Math" panose="02040503050406030204" pitchFamily="18" charset="0"/>
+                                  <a:cs typeface="Times New Roman" panose="02020603050405020304" pitchFamily="18" charset="0"/>
+                                </a:rPr>
+                              </m:ctrlPr>
+                            </m:sSubPr>
+                            <m:e>
+                              <m:r>
+                                <a:rPr lang="en-US" sz="2400" b="0" i="1" smtClean="0">
+                                  <a:latin typeface="Cambria Math" panose="02040503050406030204" pitchFamily="18" charset="0"/>
+                                  <a:cs typeface="Times New Roman" panose="02020603050405020304" pitchFamily="18" charset="0"/>
+                                </a:rPr>
+                                <m:t>𝐷</m:t>
+                              </m:r>
+                            </m:e>
+                            <m:sub>
+                              <m:r>
+                                <a:rPr lang="en-US" sz="2400" b="0" i="1" smtClean="0">
+                                  <a:latin typeface="Cambria Math" panose="02040503050406030204" pitchFamily="18" charset="0"/>
+                                  <a:cs typeface="Times New Roman" panose="02020603050405020304" pitchFamily="18" charset="0"/>
+                                </a:rPr>
+                                <m:t>𝑖</m:t>
+                              </m:r>
+                            </m:sub>
+                          </m:sSub>
+                        </m:e>
+                      </m:d>
+                      <m:r>
+                        <a:rPr lang="en-US" sz="2400" b="0" i="1" smtClean="0">
+                          <a:latin typeface="Cambria Math" panose="02040503050406030204" pitchFamily="18" charset="0"/>
+                          <a:cs typeface="Times New Roman" panose="02020603050405020304" pitchFamily="18" charset="0"/>
+                        </a:rPr>
+                        <m:t>𝕀</m:t>
+                      </m:r>
+                      <m:d>
+                        <m:dPr>
+                          <m:ctrlPr>
+                            <a:rPr lang="en-US" sz="2400" b="0" i="1" smtClean="0">
+                              <a:latin typeface="Cambria Math" panose="02040503050406030204" pitchFamily="18" charset="0"/>
+                              <a:cs typeface="Times New Roman" panose="02020603050405020304" pitchFamily="18" charset="0"/>
+                            </a:rPr>
+                          </m:ctrlPr>
+                        </m:dPr>
+                        <m:e>
+                          <m:sSub>
+                            <m:sSubPr>
+                              <m:ctrlPr>
+                                <a:rPr lang="en-US" sz="2400" b="0" i="1" smtClean="0">
+                                  <a:latin typeface="Cambria Math" panose="02040503050406030204" pitchFamily="18" charset="0"/>
+                                  <a:cs typeface="Times New Roman" panose="02020603050405020304" pitchFamily="18" charset="0"/>
+                                </a:rPr>
+                              </m:ctrlPr>
+                            </m:sSubPr>
+                            <m:e>
+                              <m:r>
+                                <a:rPr lang="en-US" sz="2400" b="0" i="1" smtClean="0">
+                                  <a:latin typeface="Cambria Math" panose="02040503050406030204" pitchFamily="18" charset="0"/>
+                                  <a:cs typeface="Times New Roman" panose="02020603050405020304" pitchFamily="18" charset="0"/>
+                                </a:rPr>
+                                <m:t>𝑗</m:t>
+                              </m:r>
+                            </m:e>
+                            <m:sub>
+                              <m:r>
+                                <a:rPr lang="en-US" sz="2400" b="0" i="1" smtClean="0">
+                                  <a:latin typeface="Cambria Math" panose="02040503050406030204" pitchFamily="18" charset="0"/>
+                                  <a:cs typeface="Times New Roman" panose="02020603050405020304" pitchFamily="18" charset="0"/>
+                                </a:rPr>
+                                <m:t>𝑡</m:t>
+                              </m:r>
+                            </m:sub>
+                          </m:sSub>
+                          <m:r>
+                            <a:rPr lang="en-US" sz="2400" b="0" i="1" smtClean="0">
+                              <a:latin typeface="Cambria Math" panose="02040503050406030204" pitchFamily="18" charset="0"/>
+                              <a:cs typeface="Times New Roman" panose="02020603050405020304" pitchFamily="18" charset="0"/>
+                            </a:rPr>
+                            <m:t>≠</m:t>
+                          </m:r>
+                          <m:sSub>
+                            <m:sSubPr>
+                              <m:ctrlPr>
+                                <a:rPr lang="en-US" sz="2400" b="0" i="1" smtClean="0">
+                                  <a:latin typeface="Cambria Math" panose="02040503050406030204" pitchFamily="18" charset="0"/>
+                                  <a:cs typeface="Times New Roman" panose="02020603050405020304" pitchFamily="18" charset="0"/>
+                                </a:rPr>
+                              </m:ctrlPr>
+                            </m:sSubPr>
+                            <m:e>
+                              <m:r>
+                                <a:rPr lang="en-US" sz="2400" b="0" i="1" smtClean="0">
+                                  <a:latin typeface="Cambria Math" panose="02040503050406030204" pitchFamily="18" charset="0"/>
+                                  <a:cs typeface="Times New Roman" panose="02020603050405020304" pitchFamily="18" charset="0"/>
+                                </a:rPr>
+                                <m:t>𝑗</m:t>
+                              </m:r>
+                            </m:e>
+                            <m:sub>
+                              <m:r>
+                                <a:rPr lang="en-US" sz="2400" b="0" i="1" smtClean="0">
+                                  <a:latin typeface="Cambria Math" panose="02040503050406030204" pitchFamily="18" charset="0"/>
+                                  <a:cs typeface="Times New Roman" panose="02020603050405020304" pitchFamily="18" charset="0"/>
+                                </a:rPr>
+                                <m:t>𝑡</m:t>
+                              </m:r>
+                              <m:r>
+                                <a:rPr lang="en-US" sz="2400" b="0" i="1" smtClean="0">
+                                  <a:latin typeface="Cambria Math" panose="02040503050406030204" pitchFamily="18" charset="0"/>
+                                  <a:cs typeface="Times New Roman" panose="02020603050405020304" pitchFamily="18" charset="0"/>
+                                </a:rPr>
+                                <m:t>−1</m:t>
+                              </m:r>
+                            </m:sub>
+                          </m:sSub>
+                        </m:e>
+                      </m:d>
+                      <m:r>
+                        <a:rPr lang="en-US" sz="2400" b="0" i="1" smtClean="0">
+                          <a:latin typeface="Cambria Math" panose="02040503050406030204" pitchFamily="18" charset="0"/>
+                          <a:cs typeface="Times New Roman" panose="02020603050405020304" pitchFamily="18" charset="0"/>
+                        </a:rPr>
+                        <m:t>+</m:t>
+                      </m:r>
+                      <m:sSubSup>
+                        <m:sSubSupPr>
+                          <m:ctrlPr>
+                            <a:rPr lang="en-US" sz="2400" b="1" i="1" smtClean="0">
+                              <a:latin typeface="Cambria Math" panose="02040503050406030204" pitchFamily="18" charset="0"/>
+                              <a:cs typeface="Times New Roman" panose="02020603050405020304" pitchFamily="18" charset="0"/>
+                            </a:rPr>
+                          </m:ctrlPr>
+                        </m:sSubSupPr>
+                        <m:e>
+                          <m:r>
+                            <a:rPr lang="en-US" sz="2400" b="1" i="1" smtClean="0">
+                              <a:latin typeface="Cambria Math" panose="02040503050406030204" pitchFamily="18" charset="0"/>
+                              <a:cs typeface="Times New Roman" panose="02020603050405020304" pitchFamily="18" charset="0"/>
+                            </a:rPr>
+                            <m:t>𝒁</m:t>
+                          </m:r>
+                        </m:e>
+                        <m:sub>
+                          <m:r>
+                            <a:rPr lang="en-US" sz="2400" b="1" i="1" smtClean="0">
+                              <a:latin typeface="Cambria Math" panose="02040503050406030204" pitchFamily="18" charset="0"/>
+                              <a:cs typeface="Times New Roman" panose="02020603050405020304" pitchFamily="18" charset="0"/>
+                            </a:rPr>
+                            <m:t>𝒊</m:t>
+                          </m:r>
+                        </m:sub>
+                        <m:sup>
+                          <m:r>
+                            <a:rPr lang="en-US" sz="2400" b="1" i="1" smtClean="0">
+                              <a:latin typeface="Cambria Math" panose="02040503050406030204" pitchFamily="18" charset="0"/>
+                              <a:cs typeface="Times New Roman" panose="02020603050405020304" pitchFamily="18" charset="0"/>
+                            </a:rPr>
+                            <m:t>′</m:t>
+                          </m:r>
+                        </m:sup>
+                      </m:sSubSup>
+                      <m:r>
+                        <a:rPr lang="en-US" sz="2400" b="0" i="1" smtClean="0">
+                          <a:latin typeface="Cambria Math" panose="02040503050406030204" pitchFamily="18" charset="0"/>
+                          <a:cs typeface="Times New Roman" panose="02020603050405020304" pitchFamily="18" charset="0"/>
+                        </a:rPr>
+                        <m:t>𝛽</m:t>
+                      </m:r>
+                      <m:r>
+                        <a:rPr lang="en-US" sz="2400" b="0" i="1" smtClean="0">
+                          <a:latin typeface="Cambria Math" panose="02040503050406030204" pitchFamily="18" charset="0"/>
+                          <a:cs typeface="Times New Roman" panose="02020603050405020304" pitchFamily="18" charset="0"/>
+                        </a:rPr>
+                        <m:t>𝕀</m:t>
+                      </m:r>
+                      <m:d>
+                        <m:dPr>
+                          <m:ctrlPr>
+                            <a:rPr lang="en-US" sz="2400" b="0" i="1" smtClean="0">
+                              <a:latin typeface="Cambria Math" panose="02040503050406030204" pitchFamily="18" charset="0"/>
+                              <a:cs typeface="Times New Roman" panose="02020603050405020304" pitchFamily="18" charset="0"/>
+                            </a:rPr>
+                          </m:ctrlPr>
+                        </m:dPr>
+                        <m:e>
+                          <m:r>
+                            <a:rPr lang="en-US" sz="2400" b="0" i="1" smtClean="0">
+                              <a:latin typeface="Cambria Math" panose="02040503050406030204" pitchFamily="18" charset="0"/>
+                              <a:cs typeface="Times New Roman" panose="02020603050405020304" pitchFamily="18" charset="0"/>
+                            </a:rPr>
+                            <m:t>𝐻𝐷𝐻</m:t>
+                          </m:r>
+                          <m:sSub>
+                            <m:sSubPr>
+                              <m:ctrlPr>
+                                <a:rPr lang="en-US" sz="2400" b="0" i="1" smtClean="0">
+                                  <a:latin typeface="Cambria Math" panose="02040503050406030204" pitchFamily="18" charset="0"/>
+                                  <a:cs typeface="Times New Roman" panose="02020603050405020304" pitchFamily="18" charset="0"/>
+                                </a:rPr>
+                              </m:ctrlPr>
+                            </m:sSubPr>
+                            <m:e>
+                              <m:r>
+                                <a:rPr lang="en-US" sz="2400" b="0" i="1" smtClean="0">
+                                  <a:latin typeface="Cambria Math" panose="02040503050406030204" pitchFamily="18" charset="0"/>
+                                  <a:cs typeface="Times New Roman" panose="02020603050405020304" pitchFamily="18" charset="0"/>
+                                </a:rPr>
+                                <m:t>𝑃</m:t>
+                              </m:r>
+                            </m:e>
+                            <m:sub>
+                              <m:r>
+                                <a:rPr lang="en-US" sz="2400" b="0" i="1" smtClean="0">
+                                  <a:latin typeface="Cambria Math" panose="02040503050406030204" pitchFamily="18" charset="0"/>
+                                  <a:cs typeface="Times New Roman" panose="02020603050405020304" pitchFamily="18" charset="0"/>
+                                </a:rPr>
+                                <m:t>𝑗</m:t>
+                              </m:r>
+                            </m:sub>
+                          </m:sSub>
+                        </m:e>
+                      </m:d>
+                      <m:r>
+                        <a:rPr lang="en-US" sz="2400" b="0" i="1" smtClean="0">
+                          <a:latin typeface="Cambria Math" panose="02040503050406030204" pitchFamily="18" charset="0"/>
+                          <a:cs typeface="Times New Roman" panose="02020603050405020304" pitchFamily="18" charset="0"/>
+                        </a:rPr>
+                        <m:t>+</m:t>
+                      </m:r>
+                      <m:sSub>
+                        <m:sSubPr>
+                          <m:ctrlPr>
+                            <a:rPr lang="en-US" sz="2400" b="0" i="1" smtClean="0">
+                              <a:latin typeface="Cambria Math" panose="02040503050406030204" pitchFamily="18" charset="0"/>
+                              <a:cs typeface="Times New Roman" panose="02020603050405020304" pitchFamily="18" charset="0"/>
+                            </a:rPr>
+                          </m:ctrlPr>
+                        </m:sSubPr>
+                        <m:e>
+                          <m:r>
+                            <a:rPr lang="en-US" sz="2400" b="0" i="1" smtClean="0">
+                              <a:latin typeface="Cambria Math" panose="02040503050406030204" pitchFamily="18" charset="0"/>
+                              <a:cs typeface="Times New Roman" panose="02020603050405020304" pitchFamily="18" charset="0"/>
+                            </a:rPr>
+                            <m:t>𝜀</m:t>
+                          </m:r>
+                        </m:e>
+                        <m:sub>
+                          <m:r>
+                            <a:rPr lang="en-US" sz="2400" b="0" i="1" smtClean="0">
+                              <a:latin typeface="Cambria Math" panose="02040503050406030204" pitchFamily="18" charset="0"/>
+                              <a:cs typeface="Times New Roman" panose="02020603050405020304" pitchFamily="18" charset="0"/>
+                            </a:rPr>
+                            <m:t>𝑖𝑗</m:t>
+                          </m:r>
+                          <m:r>
+                            <a:rPr lang="en-US" sz="2400" b="0" i="1" smtClean="0">
+                              <a:latin typeface="Cambria Math" panose="02040503050406030204" pitchFamily="18" charset="0"/>
+                              <a:cs typeface="Times New Roman" panose="02020603050405020304" pitchFamily="18" charset="0"/>
+                            </a:rPr>
+                            <m:t> </m:t>
+                          </m:r>
+                        </m:sub>
+                      </m:sSub>
+                    </m:oMath>
+                  </m:oMathPara>
+                </a14:m>
+                <a:endParaRPr lang="en-US" sz="2400" b="0" dirty="0">
+                  <a:cs typeface="Times New Roman" panose="02020603050405020304" pitchFamily="18" charset="0"/>
+                </a:endParaRPr>
+              </a:p>
+              <a:p>
+                <a:pPr marL="0" indent="0">
+                  <a:buNone/>
+                </a:pPr>
+                <a:r>
+                  <a:rPr lang="en-US" sz="2400" b="1" u="sng" dirty="0">
+                    <a:solidFill>
+                      <a:schemeClr val="accent2">
+                        <a:lumMod val="75000"/>
+                      </a:schemeClr>
+                    </a:solidFill>
+                    <a:cs typeface="Times New Roman" panose="02020603050405020304" pitchFamily="18" charset="0"/>
+                  </a:rPr>
+                  <a:t>What do we need for identification? </a:t>
+                </a:r>
+                <a:r>
+                  <a:rPr lang="en-US" sz="1600" dirty="0"/>
+                  <a:t>(How might these be violated? What would happen if they were?)</a:t>
+                </a:r>
+                <a:endParaRPr lang="en-US" sz="1600" b="1" u="sng" dirty="0">
+                  <a:solidFill>
+                    <a:schemeClr val="accent2">
+                      <a:lumMod val="75000"/>
+                    </a:schemeClr>
+                  </a:solidFill>
+                  <a:cs typeface="Times New Roman" panose="02020603050405020304" pitchFamily="18" charset="0"/>
+                </a:endParaRPr>
+              </a:p>
+              <a:p>
+                <a:r>
+                  <a:rPr lang="en-US" sz="2000" dirty="0"/>
+                  <a:t>Risk preferences γ are independent of friction measures Z. </a:t>
+                </a:r>
+              </a:p>
+              <a:p>
+                <a:r>
+                  <a:rPr lang="en-US" sz="2000" dirty="0"/>
+                  <a:t>Frictions shift utility by the same amount for all potential realizations of health expenditures from </a:t>
+                </a:r>
+                <a14:m>
+                  <m:oMath xmlns:m="http://schemas.openxmlformats.org/officeDocument/2006/math">
+                    <m:sSub>
+                      <m:sSubPr>
+                        <m:ctrlPr>
+                          <a:rPr lang="en-CA" sz="2000" b="0" i="1" smtClean="0">
+                            <a:latin typeface="Cambria Math" panose="02040503050406030204" pitchFamily="18" charset="0"/>
+                          </a:rPr>
+                        </m:ctrlPr>
+                      </m:sSubPr>
+                      <m:e>
+                        <m:r>
+                          <a:rPr lang="en-CA" sz="2000" b="0" i="1" smtClean="0">
+                            <a:latin typeface="Cambria Math" panose="02040503050406030204" pitchFamily="18" charset="0"/>
+                          </a:rPr>
+                          <m:t>𝐹</m:t>
+                        </m:r>
+                      </m:e>
+                      <m:sub>
+                        <m:r>
+                          <a:rPr lang="en-CA" sz="2000" b="0" i="1" smtClean="0">
+                            <a:latin typeface="Cambria Math" panose="02040503050406030204" pitchFamily="18" charset="0"/>
+                          </a:rPr>
+                          <m:t>𝑠</m:t>
+                        </m:r>
+                      </m:sub>
+                    </m:sSub>
+                    <m:d>
+                      <m:dPr>
+                        <m:ctrlPr>
+                          <a:rPr lang="en-CA" sz="2000" b="0" i="1" smtClean="0">
+                            <a:latin typeface="Cambria Math" panose="02040503050406030204" pitchFamily="18" charset="0"/>
+                          </a:rPr>
+                        </m:ctrlPr>
+                      </m:dPr>
+                      <m:e>
+                        <m:r>
+                          <a:rPr lang="en-CA" sz="2000" b="0" i="1" smtClean="0">
+                            <a:latin typeface="Cambria Math" panose="02040503050406030204" pitchFamily="18" charset="0"/>
+                          </a:rPr>
+                          <m:t>⋅</m:t>
+                        </m:r>
+                      </m:e>
+                    </m:d>
+                  </m:oMath>
+                </a14:m>
+                <a:r>
+                  <a:rPr lang="en-US" sz="2000" dirty="0"/>
+                  <a:t>. </a:t>
+                </a:r>
+              </a:p>
+              <a:p>
+                <a:r>
+                  <a:rPr lang="en-US" sz="2000" dirty="0"/>
+                  <a:t>No correlations between health risk and risk preferences. </a:t>
+                </a:r>
+              </a:p>
+              <a:p>
+                <a:r>
+                  <a:rPr lang="en-US" sz="2000" dirty="0">
+                    <a:cs typeface="Times New Roman" panose="02020603050405020304" pitchFamily="18" charset="0"/>
+                  </a:rPr>
+                  <a:t>No correlations between frictions and inertia (get around this through </a:t>
+                </a:r>
+                <a:r>
+                  <a:rPr lang="en-US" sz="2000" dirty="0" err="1">
+                    <a:cs typeface="Times New Roman" panose="02020603050405020304" pitchFamily="18" charset="0"/>
+                  </a:rPr>
+                  <a:t>subsetting</a:t>
+                </a:r>
+                <a:r>
+                  <a:rPr lang="en-US" sz="2000" dirty="0">
+                    <a:cs typeface="Times New Roman" panose="02020603050405020304" pitchFamily="18" charset="0"/>
+                  </a:rPr>
+                  <a:t> the model)</a:t>
+                </a:r>
+                <a:endParaRPr lang="en-US" sz="2200" dirty="0">
+                  <a:cs typeface="Times New Roman" panose="02020603050405020304" pitchFamily="18" charset="0"/>
+                </a:endParaRPr>
+              </a:p>
+            </p:txBody>
+          </p:sp>
+        </mc:Choice>
+        <mc:Fallback>
+          <p:sp>
+            <p:nvSpPr>
+              <p:cNvPr id="3" name="Content Placeholder 2"/>
+              <p:cNvSpPr>
+                <a:spLocks noGrp="1" noRot="1" noChangeAspect="1" noMove="1" noResize="1" noEditPoints="1" noAdjustHandles="1" noChangeArrowheads="1" noChangeShapeType="1" noTextEdit="1"/>
+              </p:cNvSpPr>
+              <p:nvPr>
+                <p:ph idx="1"/>
+              </p:nvPr>
+            </p:nvSpPr>
+            <p:spPr>
+              <a:xfrm>
+                <a:off x="609600" y="896918"/>
+                <a:ext cx="10439400" cy="5283220"/>
+              </a:xfrm>
+              <a:blipFill>
+                <a:blip r:embed="rId3"/>
+                <a:stretch>
+                  <a:fillRect l="-876" t="-807" r="-759"/>
+                </a:stretch>
+              </a:blipFill>
+            </p:spPr>
+            <p:txBody>
+              <a:bodyPr/>
+              <a:lstStyle/>
+              <a:p>
+                <a:r>
+                  <a:rPr lang="en-CA">
+                    <a:noFill/>
+                  </a:rPr>
+                  <a:t> </a:t>
+                </a:r>
+              </a:p>
+            </p:txBody>
+          </p:sp>
+        </mc:Fallback>
+      </mc:AlternateContent>
       <p:sp>
         <p:nvSpPr>
           <p:cNvPr id="4" name="Slide Number Placeholder 3"/>
@@ -15184,7 +16931,7 @@
           <a:p>
             <a:fld id="{3DAF9783-BC0E-C649-838D-61F838C67253}" type="slidenum">
               <a:rPr lang="en-US" smtClean="0"/>
-              <a:t>27</a:t>
+              <a:t>29</a:t>
             </a:fld>
             <a:endParaRPr lang="en-US"/>
           </a:p>
@@ -15241,7 +16988,7 @@
               <a:rPr lang="en-US" sz="3600" dirty="0">
                 <a:cs typeface="Times New Roman" panose="02020603050405020304" pitchFamily="18" charset="0"/>
               </a:rPr>
-              <a:t>Counterfactual Simulations</a:t>
+              <a:t>What does this look like? </a:t>
             </a:r>
           </a:p>
         </p:txBody>
@@ -15249,7 +16996,7 @@
     </p:spTree>
     <p:extLst>
       <p:ext uri="{BB962C8B-B14F-4D97-AF65-F5344CB8AC3E}">
-        <p14:creationId xmlns:p14="http://schemas.microsoft.com/office/powerpoint/2010/main" val="1869426437"/>
+        <p14:creationId xmlns:p14="http://schemas.microsoft.com/office/powerpoint/2010/main" val="3790368523"/>
       </p:ext>
     </p:extLst>
   </p:cSld>
@@ -15259,7 +17006,7 @@
 </p:sld>
 </file>
 
-<file path=ppt/slides/slide28.xml><?xml version="1.0" encoding="utf-8"?>
+<file path=ppt/slides/slide3.xml><?xml version="1.0" encoding="utf-8"?>
 <p:sld xmlns:a="http://schemas.openxmlformats.org/drawingml/2006/main" xmlns:r="http://schemas.openxmlformats.org/officeDocument/2006/relationships" xmlns:p="http://schemas.openxmlformats.org/presentationml/2006/main">
   <p:cSld>
     <p:spTree>
@@ -15278,6 +17025,579 @@
       </p:grpSpPr>
       <p:sp>
         <p:nvSpPr>
+          <p:cNvPr id="2" name="Title 1"/>
+          <p:cNvSpPr>
+            <a:spLocks noGrp="1"/>
+          </p:cNvSpPr>
+          <p:nvPr>
+            <p:ph type="title"/>
+          </p:nvPr>
+        </p:nvSpPr>
+        <p:spPr>
+          <a:xfrm>
+            <a:off x="609600" y="272078"/>
+            <a:ext cx="9220200" cy="624840"/>
+          </a:xfrm>
+        </p:spPr>
+        <p:txBody>
+          <a:bodyPr>
+            <a:normAutofit fontScale="90000"/>
+          </a:bodyPr>
+          <a:lstStyle/>
+          <a:p>
+            <a:r>
+              <a:rPr lang="en-US" dirty="0">
+                <a:solidFill>
+                  <a:schemeClr val="accent2">
+                    <a:lumMod val="75000"/>
+                  </a:schemeClr>
+                </a:solidFill>
+                <a:cs typeface="Times New Roman" panose="02020603050405020304" pitchFamily="18" charset="0"/>
+              </a:rPr>
+              <a:t>Last time: Individual Health Behaviors</a:t>
+            </a:r>
+            <a:endParaRPr lang="en-US" dirty="0">
+              <a:solidFill>
+                <a:schemeClr val="accent2">
+                  <a:lumMod val="75000"/>
+                </a:schemeClr>
+              </a:solidFill>
+              <a:latin typeface="Times New Roman" panose="02020603050405020304" pitchFamily="18" charset="0"/>
+              <a:cs typeface="Times New Roman" panose="02020603050405020304" pitchFamily="18" charset="0"/>
+            </a:endParaRPr>
+          </a:p>
+        </p:txBody>
+      </p:sp>
+      <p:sp>
+        <p:nvSpPr>
+          <p:cNvPr id="5" name="Content Placeholder 2">
+            <a:extLst>
+              <a:ext uri="{FF2B5EF4-FFF2-40B4-BE49-F238E27FC236}">
+                <a16:creationId xmlns:a16="http://schemas.microsoft.com/office/drawing/2014/main" id="{D52D31A3-19BE-0C56-23AB-F009C1779EED}"/>
+              </a:ext>
+            </a:extLst>
+          </p:cNvPr>
+          <p:cNvSpPr txBox="1">
+            <a:spLocks/>
+          </p:cNvSpPr>
+          <p:nvPr/>
+        </p:nvSpPr>
+        <p:spPr>
+          <a:xfrm>
+            <a:off x="876300" y="929575"/>
+            <a:ext cx="10439400" cy="5141388"/>
+          </a:xfrm>
+          <a:prstGeom prst="rect">
+            <a:avLst/>
+          </a:prstGeom>
+        </p:spPr>
+        <p:txBody>
+          <a:bodyPr vert="horz" lIns="91440" tIns="45720" rIns="91440" bIns="45720" rtlCol="0">
+            <a:noAutofit/>
+          </a:bodyPr>
+          <a:lstStyle>
+            <a:lvl1pPr marL="182880" indent="-182880" algn="l" defTabSz="914400" rtl="0" eaLnBrk="1" latinLnBrk="0" hangingPunct="1">
+              <a:lnSpc>
+                <a:spcPct val="95000"/>
+              </a:lnSpc>
+              <a:spcBef>
+                <a:spcPts val="1400"/>
+              </a:spcBef>
+              <a:spcAft>
+                <a:spcPts val="200"/>
+              </a:spcAft>
+              <a:buClr>
+                <a:schemeClr val="accent1"/>
+              </a:buClr>
+              <a:buSzPct val="80000"/>
+              <a:buFont typeface="Arial" pitchFamily="34" charset="0"/>
+              <a:buChar char="•"/>
+              <a:defRPr sz="1800" kern="1200" spc="10" baseline="0">
+                <a:solidFill>
+                  <a:schemeClr val="tx1"/>
+                </a:solidFill>
+                <a:latin typeface="Times New Roman" panose="02020603050405020304" pitchFamily="18" charset="0"/>
+                <a:ea typeface="+mn-ea"/>
+                <a:cs typeface="+mn-cs"/>
+              </a:defRPr>
+            </a:lvl1pPr>
+            <a:lvl2pPr marL="457200" indent="-182880" algn="l" defTabSz="914400" rtl="0" eaLnBrk="1" latinLnBrk="0" hangingPunct="1">
+              <a:lnSpc>
+                <a:spcPct val="90000"/>
+              </a:lnSpc>
+              <a:spcBef>
+                <a:spcPts val="300"/>
+              </a:spcBef>
+              <a:spcAft>
+                <a:spcPts val="300"/>
+              </a:spcAft>
+              <a:buClr>
+                <a:schemeClr val="accent1"/>
+              </a:buClr>
+              <a:buFont typeface="Wingdings 2" pitchFamily="18" charset="2"/>
+              <a:buChar char=""/>
+              <a:defRPr sz="1600" kern="1200">
+                <a:solidFill>
+                  <a:schemeClr val="tx1">
+                    <a:lumMod val="85000"/>
+                    <a:lumOff val="15000"/>
+                  </a:schemeClr>
+                </a:solidFill>
+                <a:latin typeface="Times New Roman" panose="02020603050405020304" pitchFamily="18" charset="0"/>
+                <a:ea typeface="+mn-ea"/>
+                <a:cs typeface="+mn-cs"/>
+              </a:defRPr>
+            </a:lvl2pPr>
+            <a:lvl3pPr marL="731520" indent="-182880" algn="l" defTabSz="914400" rtl="0" eaLnBrk="1" latinLnBrk="0" hangingPunct="1">
+              <a:lnSpc>
+                <a:spcPct val="90000"/>
+              </a:lnSpc>
+              <a:spcBef>
+                <a:spcPts val="300"/>
+              </a:spcBef>
+              <a:spcAft>
+                <a:spcPts val="300"/>
+              </a:spcAft>
+              <a:buClr>
+                <a:schemeClr val="accent1"/>
+              </a:buClr>
+              <a:buFont typeface="Wingdings 2" pitchFamily="18" charset="2"/>
+              <a:buChar char=""/>
+              <a:defRPr sz="1400" kern="1200">
+                <a:solidFill>
+                  <a:schemeClr val="tx1">
+                    <a:lumMod val="85000"/>
+                    <a:lumOff val="15000"/>
+                  </a:schemeClr>
+                </a:solidFill>
+                <a:latin typeface="Times New Roman" panose="02020603050405020304" pitchFamily="18" charset="0"/>
+                <a:ea typeface="+mn-ea"/>
+                <a:cs typeface="+mn-cs"/>
+              </a:defRPr>
+            </a:lvl3pPr>
+            <a:lvl4pPr marL="1005840" indent="-182880" algn="l" defTabSz="914400" rtl="0" eaLnBrk="1" latinLnBrk="0" hangingPunct="1">
+              <a:lnSpc>
+                <a:spcPct val="90000"/>
+              </a:lnSpc>
+              <a:spcBef>
+                <a:spcPts val="300"/>
+              </a:spcBef>
+              <a:spcAft>
+                <a:spcPts val="300"/>
+              </a:spcAft>
+              <a:buClr>
+                <a:schemeClr val="accent1"/>
+              </a:buClr>
+              <a:buFont typeface="Wingdings 2" pitchFamily="18" charset="2"/>
+              <a:buChar char=""/>
+              <a:defRPr sz="1400" kern="1200">
+                <a:solidFill>
+                  <a:schemeClr val="tx1">
+                    <a:lumMod val="85000"/>
+                    <a:lumOff val="15000"/>
+                  </a:schemeClr>
+                </a:solidFill>
+                <a:latin typeface="Times New Roman" panose="02020603050405020304" pitchFamily="18" charset="0"/>
+                <a:ea typeface="+mn-ea"/>
+                <a:cs typeface="+mn-cs"/>
+              </a:defRPr>
+            </a:lvl4pPr>
+            <a:lvl5pPr marL="1280160" indent="-182880" algn="l" defTabSz="914400" rtl="0" eaLnBrk="1" latinLnBrk="0" hangingPunct="1">
+              <a:lnSpc>
+                <a:spcPct val="90000"/>
+              </a:lnSpc>
+              <a:spcBef>
+                <a:spcPts val="300"/>
+              </a:spcBef>
+              <a:spcAft>
+                <a:spcPts val="300"/>
+              </a:spcAft>
+              <a:buClr>
+                <a:schemeClr val="accent1"/>
+              </a:buClr>
+              <a:buFont typeface="Wingdings 2" pitchFamily="18" charset="2"/>
+              <a:buChar char=""/>
+              <a:defRPr sz="1400" kern="1200">
+                <a:solidFill>
+                  <a:schemeClr val="tx1">
+                    <a:lumMod val="85000"/>
+                    <a:lumOff val="15000"/>
+                  </a:schemeClr>
+                </a:solidFill>
+                <a:latin typeface="Times New Roman" panose="02020603050405020304" pitchFamily="18" charset="0"/>
+                <a:ea typeface="+mn-ea"/>
+                <a:cs typeface="+mn-cs"/>
+              </a:defRPr>
+            </a:lvl5pPr>
+            <a:lvl6pPr marL="1600000" indent="-228600" algn="l" defTabSz="914400" rtl="0" eaLnBrk="1" latinLnBrk="0" hangingPunct="1">
+              <a:lnSpc>
+                <a:spcPct val="90000"/>
+              </a:lnSpc>
+              <a:spcBef>
+                <a:spcPts val="300"/>
+              </a:spcBef>
+              <a:spcAft>
+                <a:spcPts val="300"/>
+              </a:spcAft>
+              <a:buClr>
+                <a:schemeClr val="accent1"/>
+              </a:buClr>
+              <a:buFont typeface="Wingdings 2" pitchFamily="18" charset="2"/>
+              <a:buChar char=""/>
+              <a:defRPr sz="1400" kern="1200">
+                <a:solidFill>
+                  <a:schemeClr val="tx1">
+                    <a:lumMod val="85000"/>
+                    <a:lumOff val="15000"/>
+                  </a:schemeClr>
+                </a:solidFill>
+                <a:latin typeface="+mn-lt"/>
+                <a:ea typeface="+mn-ea"/>
+                <a:cs typeface="+mn-cs"/>
+              </a:defRPr>
+            </a:lvl6pPr>
+            <a:lvl7pPr marL="1900000" indent="-228600" algn="l" defTabSz="914400" rtl="0" eaLnBrk="1" latinLnBrk="0" hangingPunct="1">
+              <a:lnSpc>
+                <a:spcPct val="90000"/>
+              </a:lnSpc>
+              <a:spcBef>
+                <a:spcPts val="300"/>
+              </a:spcBef>
+              <a:spcAft>
+                <a:spcPts val="300"/>
+              </a:spcAft>
+              <a:buClr>
+                <a:schemeClr val="accent1"/>
+              </a:buClr>
+              <a:buFont typeface="Wingdings 2" pitchFamily="18" charset="2"/>
+              <a:buChar char=""/>
+              <a:defRPr sz="1400" kern="1200">
+                <a:solidFill>
+                  <a:schemeClr val="tx1">
+                    <a:lumMod val="85000"/>
+                    <a:lumOff val="15000"/>
+                  </a:schemeClr>
+                </a:solidFill>
+                <a:latin typeface="+mn-lt"/>
+                <a:ea typeface="+mn-ea"/>
+                <a:cs typeface="+mn-cs"/>
+              </a:defRPr>
+            </a:lvl7pPr>
+            <a:lvl8pPr marL="2200000" indent="-228600" algn="l" defTabSz="914400" rtl="0" eaLnBrk="1" latinLnBrk="0" hangingPunct="1">
+              <a:lnSpc>
+                <a:spcPct val="90000"/>
+              </a:lnSpc>
+              <a:spcBef>
+                <a:spcPts val="300"/>
+              </a:spcBef>
+              <a:spcAft>
+                <a:spcPts val="300"/>
+              </a:spcAft>
+              <a:buClr>
+                <a:schemeClr val="accent1"/>
+              </a:buClr>
+              <a:buFont typeface="Wingdings 2" pitchFamily="18" charset="2"/>
+              <a:buChar char=""/>
+              <a:defRPr sz="1400" kern="1200">
+                <a:solidFill>
+                  <a:schemeClr val="tx1">
+                    <a:lumMod val="85000"/>
+                    <a:lumOff val="15000"/>
+                  </a:schemeClr>
+                </a:solidFill>
+                <a:latin typeface="+mn-lt"/>
+                <a:ea typeface="+mn-ea"/>
+                <a:cs typeface="+mn-cs"/>
+              </a:defRPr>
+            </a:lvl8pPr>
+            <a:lvl9pPr marL="2500000" indent="-228600" algn="l" defTabSz="914400" rtl="0" eaLnBrk="1" latinLnBrk="0" hangingPunct="1">
+              <a:lnSpc>
+                <a:spcPct val="90000"/>
+              </a:lnSpc>
+              <a:spcBef>
+                <a:spcPts val="300"/>
+              </a:spcBef>
+              <a:spcAft>
+                <a:spcPts val="300"/>
+              </a:spcAft>
+              <a:buClr>
+                <a:schemeClr val="accent1"/>
+              </a:buClr>
+              <a:buFont typeface="Wingdings 2" pitchFamily="18" charset="2"/>
+              <a:buChar char=""/>
+              <a:defRPr sz="1400" kern="1200">
+                <a:solidFill>
+                  <a:schemeClr val="tx1">
+                    <a:lumMod val="85000"/>
+                    <a:lumOff val="15000"/>
+                  </a:schemeClr>
+                </a:solidFill>
+                <a:latin typeface="+mn-lt"/>
+                <a:ea typeface="+mn-ea"/>
+                <a:cs typeface="+mn-cs"/>
+              </a:defRPr>
+            </a:lvl9pPr>
+          </a:lstStyle>
+          <a:p>
+            <a:r>
+              <a:rPr lang="en-US" sz="2400" dirty="0">
+                <a:cs typeface="Times New Roman" panose="02020603050405020304" pitchFamily="18" charset="0"/>
+              </a:rPr>
+              <a:t>Patients act weird! How should we think about this positively? Normatively?</a:t>
+            </a:r>
+          </a:p>
+          <a:p>
+            <a:r>
+              <a:rPr lang="en-US" sz="2400" dirty="0">
+                <a:cs typeface="Times New Roman" panose="02020603050405020304" pitchFamily="18" charset="0"/>
+              </a:rPr>
+              <a:t>How to write a “niche” model </a:t>
+            </a:r>
+          </a:p>
+          <a:p>
+            <a:r>
+              <a:rPr lang="en-US" sz="2400" dirty="0">
+                <a:cs typeface="Times New Roman" panose="02020603050405020304" pitchFamily="18" charset="0"/>
+              </a:rPr>
+              <a:t>3 Core Examples:</a:t>
+            </a:r>
+          </a:p>
+          <a:p>
+            <a:pPr lvl="1"/>
+            <a:r>
+              <a:rPr lang="en-US" sz="2200" dirty="0">
+                <a:cs typeface="Times New Roman" panose="02020603050405020304" pitchFamily="18" charset="0"/>
+              </a:rPr>
+              <a:t>Addiction (Becker and Murphy)</a:t>
+            </a:r>
+          </a:p>
+          <a:p>
+            <a:pPr lvl="1"/>
+            <a:r>
+              <a:rPr lang="en-US" sz="2200" dirty="0">
+                <a:cs typeface="Times New Roman" panose="02020603050405020304" pitchFamily="18" charset="0"/>
+              </a:rPr>
+              <a:t>Screening/Preventive care decisions (Oster et al.) </a:t>
+            </a:r>
+          </a:p>
+          <a:p>
+            <a:pPr lvl="1"/>
+            <a:r>
+              <a:rPr lang="en-US" sz="2200" dirty="0">
+                <a:cs typeface="Times New Roman" panose="02020603050405020304" pitchFamily="18" charset="0"/>
+              </a:rPr>
+              <a:t>Plan choices (Abaluck and Gruber)</a:t>
+            </a:r>
+          </a:p>
+        </p:txBody>
+      </p:sp>
+    </p:spTree>
+    <p:extLst>
+      <p:ext uri="{BB962C8B-B14F-4D97-AF65-F5344CB8AC3E}">
+        <p14:creationId xmlns:p14="http://schemas.microsoft.com/office/powerpoint/2010/main" val="3746653845"/>
+      </p:ext>
+    </p:extLst>
+  </p:cSld>
+  <p:clrMapOvr>
+    <a:masterClrMapping/>
+  </p:clrMapOvr>
+</p:sld>
+</file>
+
+<file path=ppt/slides/slide30.xml><?xml version="1.0" encoding="utf-8"?>
+<p:sld xmlns:a="http://schemas.openxmlformats.org/drawingml/2006/main" xmlns:r="http://schemas.openxmlformats.org/officeDocument/2006/relationships" xmlns:p="http://schemas.openxmlformats.org/presentationml/2006/main">
+  <p:cSld>
+    <p:spTree>
+      <p:nvGrpSpPr>
+        <p:cNvPr id="1" name=""/>
+        <p:cNvGrpSpPr/>
+        <p:nvPr/>
+      </p:nvGrpSpPr>
+      <p:grpSpPr>
+        <a:xfrm>
+          <a:off x="0" y="0"/>
+          <a:ext cx="0" cy="0"/>
+          <a:chOff x="0" y="0"/>
+          <a:chExt cx="0" cy="0"/>
+        </a:xfrm>
+      </p:grpSpPr>
+      <p:sp>
+        <p:nvSpPr>
+          <p:cNvPr id="3" name="Content Placeholder 2"/>
+          <p:cNvSpPr>
+            <a:spLocks noGrp="1"/>
+          </p:cNvSpPr>
+          <p:nvPr>
+            <p:ph idx="1"/>
+          </p:nvPr>
+        </p:nvSpPr>
+        <p:spPr>
+          <a:xfrm>
+            <a:off x="609600" y="896918"/>
+            <a:ext cx="10439400" cy="5283220"/>
+          </a:xfrm>
+        </p:spPr>
+        <p:txBody>
+          <a:bodyPr>
+            <a:noAutofit/>
+          </a:bodyPr>
+          <a:lstStyle/>
+          <a:p>
+            <a:pPr marL="274320" lvl="1" indent="0">
+              <a:buNone/>
+            </a:pPr>
+            <a:r>
+              <a:rPr lang="en-US" sz="2400" b="1" u="sng" dirty="0">
+                <a:solidFill>
+                  <a:schemeClr val="accent3">
+                    <a:lumMod val="75000"/>
+                  </a:schemeClr>
+                </a:solidFill>
+                <a:cs typeface="Times New Roman" panose="02020603050405020304" pitchFamily="18" charset="0"/>
+              </a:rPr>
+              <a:t>What if we just forced people into the best plan?</a:t>
+            </a:r>
+          </a:p>
+          <a:p>
+            <a:pPr marL="274320" lvl="1" indent="0">
+              <a:buNone/>
+            </a:pPr>
+            <a:endParaRPr lang="en-US" sz="2400" b="1" u="sng" dirty="0">
+              <a:solidFill>
+                <a:schemeClr val="accent3">
+                  <a:lumMod val="75000"/>
+                </a:schemeClr>
+              </a:solidFill>
+              <a:cs typeface="Times New Roman" panose="02020603050405020304" pitchFamily="18" charset="0"/>
+            </a:endParaRPr>
+          </a:p>
+          <a:p>
+            <a:pPr lvl="1"/>
+            <a:r>
+              <a:rPr lang="en-US" sz="2400" dirty="0">
+                <a:solidFill>
+                  <a:schemeClr val="tx1"/>
+                </a:solidFill>
+                <a:cs typeface="Times New Roman" panose="02020603050405020304" pitchFamily="18" charset="0"/>
+              </a:rPr>
+              <a:t>Even simpler – what if we just take away the PPO choice and give everyone the HDHP? </a:t>
+            </a:r>
+          </a:p>
+        </p:txBody>
+      </p:sp>
+      <p:sp>
+        <p:nvSpPr>
+          <p:cNvPr id="4" name="Slide Number Placeholder 3"/>
+          <p:cNvSpPr>
+            <a:spLocks noGrp="1"/>
+          </p:cNvSpPr>
+          <p:nvPr>
+            <p:ph type="sldNum" sz="quarter" idx="12"/>
+          </p:nvPr>
+        </p:nvSpPr>
+        <p:spPr/>
+        <p:txBody>
+          <a:bodyPr>
+            <a:normAutofit lnSpcReduction="10000"/>
+          </a:bodyPr>
+          <a:lstStyle/>
+          <a:p>
+            <a:fld id="{3DAF9783-BC0E-C649-838D-61F838C67253}" type="slidenum">
+              <a:rPr lang="en-US" smtClean="0"/>
+              <a:t>30</a:t>
+            </a:fld>
+            <a:endParaRPr lang="en-US"/>
+          </a:p>
+        </p:txBody>
+      </p:sp>
+      <p:sp>
+        <p:nvSpPr>
+          <p:cNvPr id="5" name="Title 1">
+            <a:extLst>
+              <a:ext uri="{FF2B5EF4-FFF2-40B4-BE49-F238E27FC236}">
+                <a16:creationId xmlns:a16="http://schemas.microsoft.com/office/drawing/2014/main" id="{3AC41146-1857-1400-EE30-AE66F64DCE11}"/>
+              </a:ext>
+            </a:extLst>
+          </p:cNvPr>
+          <p:cNvSpPr txBox="1">
+            <a:spLocks/>
+          </p:cNvSpPr>
+          <p:nvPr/>
+        </p:nvSpPr>
+        <p:spPr>
+          <a:xfrm>
+            <a:off x="609600" y="272077"/>
+            <a:ext cx="10439400" cy="624840"/>
+          </a:xfrm>
+          <a:prstGeom prst="rect">
+            <a:avLst/>
+          </a:prstGeom>
+        </p:spPr>
+        <p:txBody>
+          <a:bodyPr vert="horz" lIns="91440" tIns="45720" rIns="91440" bIns="45720" rtlCol="0" anchor="b">
+            <a:noAutofit/>
+          </a:bodyPr>
+          <a:lstStyle>
+            <a:lvl1pPr algn="l" defTabSz="914400" rtl="0" eaLnBrk="1" latinLnBrk="0" hangingPunct="1">
+              <a:lnSpc>
+                <a:spcPct val="90000"/>
+              </a:lnSpc>
+              <a:spcBef>
+                <a:spcPct val="0"/>
+              </a:spcBef>
+              <a:buNone/>
+              <a:defRPr sz="4400" kern="1200" spc="-50" baseline="0">
+                <a:solidFill>
+                  <a:schemeClr val="tx1"/>
+                </a:solidFill>
+                <a:latin typeface="Times New Roman" panose="02020603050405020304" pitchFamily="18" charset="0"/>
+                <a:ea typeface="+mj-ea"/>
+                <a:cs typeface="+mj-cs"/>
+              </a:defRPr>
+            </a:lvl1pPr>
+          </a:lstStyle>
+          <a:p>
+            <a:r>
+              <a:rPr lang="en-US" sz="3600" dirty="0">
+                <a:cs typeface="Times New Roman" panose="02020603050405020304" pitchFamily="18" charset="0"/>
+              </a:rPr>
+              <a:t>Counterfactual Simulations</a:t>
+            </a:r>
+          </a:p>
+        </p:txBody>
+      </p:sp>
+    </p:spTree>
+    <p:extLst>
+      <p:ext uri="{BB962C8B-B14F-4D97-AF65-F5344CB8AC3E}">
+        <p14:creationId xmlns:p14="http://schemas.microsoft.com/office/powerpoint/2010/main" val="1869426437"/>
+      </p:ext>
+    </p:extLst>
+  </p:cSld>
+  <p:clrMapOvr>
+    <a:masterClrMapping/>
+  </p:clrMapOvr>
+</p:sld>
+</file>
+
+<file path=ppt/slides/slide31.xml><?xml version="1.0" encoding="utf-8"?>
+<p:sld xmlns:a="http://schemas.openxmlformats.org/drawingml/2006/main" xmlns:r="http://schemas.openxmlformats.org/officeDocument/2006/relationships" xmlns:p="http://schemas.openxmlformats.org/presentationml/2006/main">
+  <p:cSld>
+    <p:spTree>
+      <p:nvGrpSpPr>
+        <p:cNvPr id="1" name=""/>
+        <p:cNvGrpSpPr/>
+        <p:nvPr/>
+      </p:nvGrpSpPr>
+      <p:grpSpPr>
+        <a:xfrm>
+          <a:off x="0" y="0"/>
+          <a:ext cx="0" cy="0"/>
+          <a:chOff x="0" y="0"/>
+          <a:chExt cx="0" cy="0"/>
+        </a:xfrm>
+      </p:grpSpPr>
+      <p:sp>
+        <p:nvSpPr>
           <p:cNvPr id="3" name="Content Placeholder 2"/>
           <p:cNvSpPr>
             <a:spLocks noGrp="1"/>
@@ -15329,7 +17649,7 @@
           <a:p>
             <a:fld id="{3DAF9783-BC0E-C649-838D-61F838C67253}" type="slidenum">
               <a:rPr lang="en-US" smtClean="0"/>
-              <a:t>28</a:t>
+              <a:t>31</a:t>
             </a:fld>
             <a:endParaRPr lang="en-US"/>
           </a:p>
@@ -15434,7 +17754,182 @@
 </p:sld>
 </file>
 
-<file path=ppt/slides/slide29.xml><?xml version="1.0" encoding="utf-8"?>
+<file path=ppt/slides/slide32.xml><?xml version="1.0" encoding="utf-8"?>
+<p:sld xmlns:a="http://schemas.openxmlformats.org/drawingml/2006/main" xmlns:r="http://schemas.openxmlformats.org/officeDocument/2006/relationships" xmlns:p="http://schemas.openxmlformats.org/presentationml/2006/main">
+  <p:cSld>
+    <p:spTree>
+      <p:nvGrpSpPr>
+        <p:cNvPr id="1" name=""/>
+        <p:cNvGrpSpPr/>
+        <p:nvPr/>
+      </p:nvGrpSpPr>
+      <p:grpSpPr>
+        <a:xfrm>
+          <a:off x="0" y="0"/>
+          <a:ext cx="0" cy="0"/>
+          <a:chOff x="0" y="0"/>
+          <a:chExt cx="0" cy="0"/>
+        </a:xfrm>
+      </p:grpSpPr>
+      <p:sp>
+        <p:nvSpPr>
+          <p:cNvPr id="3" name="Content Placeholder 2"/>
+          <p:cNvSpPr>
+            <a:spLocks noGrp="1"/>
+          </p:cNvSpPr>
+          <p:nvPr>
+            <p:ph idx="1"/>
+          </p:nvPr>
+        </p:nvSpPr>
+        <p:spPr>
+          <a:xfrm>
+            <a:off x="609600" y="896918"/>
+            <a:ext cx="10439400" cy="5283220"/>
+          </a:xfrm>
+        </p:spPr>
+        <p:txBody>
+          <a:bodyPr>
+            <a:noAutofit/>
+          </a:bodyPr>
+          <a:lstStyle/>
+          <a:p>
+            <a:pPr marL="274320" lvl="1" indent="0">
+              <a:buNone/>
+            </a:pPr>
+            <a:endParaRPr lang="en-US" sz="2400" dirty="0">
+              <a:solidFill>
+                <a:schemeClr val="tx1"/>
+              </a:solidFill>
+              <a:cs typeface="Times New Roman" panose="02020603050405020304" pitchFamily="18" charset="0"/>
+            </a:endParaRPr>
+          </a:p>
+        </p:txBody>
+      </p:sp>
+      <p:sp>
+        <p:nvSpPr>
+          <p:cNvPr id="4" name="Slide Number Placeholder 3"/>
+          <p:cNvSpPr>
+            <a:spLocks noGrp="1"/>
+          </p:cNvSpPr>
+          <p:nvPr>
+            <p:ph type="sldNum" sz="quarter" idx="12"/>
+          </p:nvPr>
+        </p:nvSpPr>
+        <p:spPr/>
+        <p:txBody>
+          <a:bodyPr>
+            <a:normAutofit lnSpcReduction="10000"/>
+          </a:bodyPr>
+          <a:lstStyle/>
+          <a:p>
+            <a:fld id="{3DAF9783-BC0E-C649-838D-61F838C67253}" type="slidenum">
+              <a:rPr lang="en-US" smtClean="0"/>
+              <a:t>32</a:t>
+            </a:fld>
+            <a:endParaRPr lang="en-US"/>
+          </a:p>
+        </p:txBody>
+      </p:sp>
+      <p:sp>
+        <p:nvSpPr>
+          <p:cNvPr id="5" name="Title 1">
+            <a:extLst>
+              <a:ext uri="{FF2B5EF4-FFF2-40B4-BE49-F238E27FC236}">
+                <a16:creationId xmlns:a16="http://schemas.microsoft.com/office/drawing/2014/main" id="{3AC41146-1857-1400-EE30-AE66F64DCE11}"/>
+              </a:ext>
+            </a:extLst>
+          </p:cNvPr>
+          <p:cNvSpPr txBox="1">
+            <a:spLocks/>
+          </p:cNvSpPr>
+          <p:nvPr/>
+        </p:nvSpPr>
+        <p:spPr>
+          <a:xfrm>
+            <a:off x="609600" y="272077"/>
+            <a:ext cx="10439400" cy="624840"/>
+          </a:xfrm>
+          <a:prstGeom prst="rect">
+            <a:avLst/>
+          </a:prstGeom>
+        </p:spPr>
+        <p:txBody>
+          <a:bodyPr vert="horz" lIns="91440" tIns="45720" rIns="91440" bIns="45720" rtlCol="0" anchor="b">
+            <a:noAutofit/>
+          </a:bodyPr>
+          <a:lstStyle>
+            <a:lvl1pPr algn="l" defTabSz="914400" rtl="0" eaLnBrk="1" latinLnBrk="0" hangingPunct="1">
+              <a:lnSpc>
+                <a:spcPct val="90000"/>
+              </a:lnSpc>
+              <a:spcBef>
+                <a:spcPct val="0"/>
+              </a:spcBef>
+              <a:buNone/>
+              <a:defRPr sz="4400" kern="1200" spc="-50" baseline="0">
+                <a:solidFill>
+                  <a:schemeClr val="tx1"/>
+                </a:solidFill>
+                <a:latin typeface="Times New Roman" panose="02020603050405020304" pitchFamily="18" charset="0"/>
+                <a:ea typeface="+mj-ea"/>
+                <a:cs typeface="+mj-cs"/>
+              </a:defRPr>
+            </a:lvl1pPr>
+          </a:lstStyle>
+          <a:p>
+            <a:r>
+              <a:rPr lang="en-US" sz="3600" dirty="0">
+                <a:cs typeface="Times New Roman" panose="02020603050405020304" pitchFamily="18" charset="0"/>
+              </a:rPr>
+              <a:t>Counterfactual Simulations</a:t>
+            </a:r>
+          </a:p>
+        </p:txBody>
+      </p:sp>
+      <p:pic>
+        <p:nvPicPr>
+          <p:cNvPr id="7" name="Picture 6">
+            <a:extLst>
+              <a:ext uri="{FF2B5EF4-FFF2-40B4-BE49-F238E27FC236}">
+                <a16:creationId xmlns:a16="http://schemas.microsoft.com/office/drawing/2014/main" id="{063F802F-CC0D-D980-0416-68DC71B83C1B}"/>
+              </a:ext>
+            </a:extLst>
+          </p:cNvPr>
+          <p:cNvPicPr>
+            <a:picLocks noChangeAspect="1"/>
+          </p:cNvPicPr>
+          <p:nvPr/>
+        </p:nvPicPr>
+        <p:blipFill>
+          <a:blip r:embed="rId3"/>
+          <a:stretch>
+            <a:fillRect/>
+          </a:stretch>
+        </p:blipFill>
+        <p:spPr>
+          <a:xfrm>
+            <a:off x="365760" y="870335"/>
+            <a:ext cx="8930640" cy="5328001"/>
+          </a:xfrm>
+          <a:prstGeom prst="rect">
+            <a:avLst/>
+          </a:prstGeom>
+        </p:spPr>
+      </p:pic>
+    </p:spTree>
+    <p:extLst>
+      <p:ext uri="{BB962C8B-B14F-4D97-AF65-F5344CB8AC3E}">
+        <p14:creationId xmlns:p14="http://schemas.microsoft.com/office/powerpoint/2010/main" val="3501483492"/>
+      </p:ext>
+    </p:extLst>
+  </p:cSld>
+  <p:clrMapOvr>
+    <a:masterClrMapping/>
+  </p:clrMapOvr>
+</p:sld>
+</file>
+
+<file path=ppt/slides/slide33.xml><?xml version="1.0" encoding="utf-8"?>
 <p:sld xmlns:a="http://schemas.openxmlformats.org/drawingml/2006/main" xmlns:r="http://schemas.openxmlformats.org/officeDocument/2006/relationships" xmlns:p="http://schemas.openxmlformats.org/presentationml/2006/main">
   <p:cSld>
     <p:spTree>
@@ -15793,405 +18288,7 @@
 </p:sld>
 </file>
 
-<file path=ppt/slides/slide3.xml><?xml version="1.0" encoding="utf-8"?>
-<p:sld xmlns:a="http://schemas.openxmlformats.org/drawingml/2006/main" xmlns:r="http://schemas.openxmlformats.org/officeDocument/2006/relationships" xmlns:p="http://schemas.openxmlformats.org/presentationml/2006/main">
-  <p:cSld>
-    <p:spTree>
-      <p:nvGrpSpPr>
-        <p:cNvPr id="1" name=""/>
-        <p:cNvGrpSpPr/>
-        <p:nvPr/>
-      </p:nvGrpSpPr>
-      <p:grpSpPr>
-        <a:xfrm>
-          <a:off x="0" y="0"/>
-          <a:ext cx="0" cy="0"/>
-          <a:chOff x="0" y="0"/>
-          <a:chExt cx="0" cy="0"/>
-        </a:xfrm>
-      </p:grpSpPr>
-      <p:sp>
-        <p:nvSpPr>
-          <p:cNvPr id="2" name="Title 1"/>
-          <p:cNvSpPr>
-            <a:spLocks noGrp="1"/>
-          </p:cNvSpPr>
-          <p:nvPr>
-            <p:ph type="title"/>
-          </p:nvPr>
-        </p:nvSpPr>
-        <p:spPr>
-          <a:xfrm>
-            <a:off x="609600" y="272078"/>
-            <a:ext cx="9220200" cy="624840"/>
-          </a:xfrm>
-        </p:spPr>
-        <p:txBody>
-          <a:bodyPr>
-            <a:normAutofit fontScale="90000"/>
-          </a:bodyPr>
-          <a:lstStyle/>
-          <a:p>
-            <a:r>
-              <a:rPr lang="en-US" dirty="0">
-                <a:solidFill>
-                  <a:schemeClr val="accent2">
-                    <a:lumMod val="75000"/>
-                  </a:schemeClr>
-                </a:solidFill>
-                <a:cs typeface="Times New Roman" panose="02020603050405020304" pitchFamily="18" charset="0"/>
-              </a:rPr>
-              <a:t>Last time: Individual Health Behaviors</a:t>
-            </a:r>
-            <a:endParaRPr lang="en-US" dirty="0">
-              <a:solidFill>
-                <a:schemeClr val="accent2">
-                  <a:lumMod val="75000"/>
-                </a:schemeClr>
-              </a:solidFill>
-              <a:latin typeface="Times New Roman" panose="02020603050405020304" pitchFamily="18" charset="0"/>
-              <a:cs typeface="Times New Roman" panose="02020603050405020304" pitchFamily="18" charset="0"/>
-            </a:endParaRPr>
-          </a:p>
-        </p:txBody>
-      </p:sp>
-      <p:sp>
-        <p:nvSpPr>
-          <p:cNvPr id="5" name="Content Placeholder 2">
-            <a:extLst>
-              <a:ext uri="{FF2B5EF4-FFF2-40B4-BE49-F238E27FC236}">
-                <a16:creationId xmlns:a16="http://schemas.microsoft.com/office/drawing/2014/main" id="{D52D31A3-19BE-0C56-23AB-F009C1779EED}"/>
-              </a:ext>
-            </a:extLst>
-          </p:cNvPr>
-          <p:cNvSpPr txBox="1">
-            <a:spLocks/>
-          </p:cNvSpPr>
-          <p:nvPr/>
-        </p:nvSpPr>
-        <p:spPr>
-          <a:xfrm>
-            <a:off x="876300" y="929575"/>
-            <a:ext cx="10439400" cy="5141388"/>
-          </a:xfrm>
-          <a:prstGeom prst="rect">
-            <a:avLst/>
-          </a:prstGeom>
-        </p:spPr>
-        <p:txBody>
-          <a:bodyPr vert="horz" lIns="91440" tIns="45720" rIns="91440" bIns="45720" rtlCol="0">
-            <a:noAutofit/>
-          </a:bodyPr>
-          <a:lstStyle>
-            <a:lvl1pPr marL="182880" indent="-182880" algn="l" defTabSz="914400" rtl="0" eaLnBrk="1" latinLnBrk="0" hangingPunct="1">
-              <a:lnSpc>
-                <a:spcPct val="95000"/>
-              </a:lnSpc>
-              <a:spcBef>
-                <a:spcPts val="1400"/>
-              </a:spcBef>
-              <a:spcAft>
-                <a:spcPts val="200"/>
-              </a:spcAft>
-              <a:buClr>
-                <a:schemeClr val="accent1"/>
-              </a:buClr>
-              <a:buSzPct val="80000"/>
-              <a:buFont typeface="Arial" pitchFamily="34" charset="0"/>
-              <a:buChar char="•"/>
-              <a:defRPr sz="1800" kern="1200" spc="10" baseline="0">
-                <a:solidFill>
-                  <a:schemeClr val="tx1"/>
-                </a:solidFill>
-                <a:latin typeface="Times New Roman" panose="02020603050405020304" pitchFamily="18" charset="0"/>
-                <a:ea typeface="+mn-ea"/>
-                <a:cs typeface="+mn-cs"/>
-              </a:defRPr>
-            </a:lvl1pPr>
-            <a:lvl2pPr marL="457200" indent="-182880" algn="l" defTabSz="914400" rtl="0" eaLnBrk="1" latinLnBrk="0" hangingPunct="1">
-              <a:lnSpc>
-                <a:spcPct val="90000"/>
-              </a:lnSpc>
-              <a:spcBef>
-                <a:spcPts val="300"/>
-              </a:spcBef>
-              <a:spcAft>
-                <a:spcPts val="300"/>
-              </a:spcAft>
-              <a:buClr>
-                <a:schemeClr val="accent1"/>
-              </a:buClr>
-              <a:buFont typeface="Wingdings 2" pitchFamily="18" charset="2"/>
-              <a:buChar char=""/>
-              <a:defRPr sz="1600" kern="1200">
-                <a:solidFill>
-                  <a:schemeClr val="tx1">
-                    <a:lumMod val="85000"/>
-                    <a:lumOff val="15000"/>
-                  </a:schemeClr>
-                </a:solidFill>
-                <a:latin typeface="Times New Roman" panose="02020603050405020304" pitchFamily="18" charset="0"/>
-                <a:ea typeface="+mn-ea"/>
-                <a:cs typeface="+mn-cs"/>
-              </a:defRPr>
-            </a:lvl2pPr>
-            <a:lvl3pPr marL="731520" indent="-182880" algn="l" defTabSz="914400" rtl="0" eaLnBrk="1" latinLnBrk="0" hangingPunct="1">
-              <a:lnSpc>
-                <a:spcPct val="90000"/>
-              </a:lnSpc>
-              <a:spcBef>
-                <a:spcPts val="300"/>
-              </a:spcBef>
-              <a:spcAft>
-                <a:spcPts val="300"/>
-              </a:spcAft>
-              <a:buClr>
-                <a:schemeClr val="accent1"/>
-              </a:buClr>
-              <a:buFont typeface="Wingdings 2" pitchFamily="18" charset="2"/>
-              <a:buChar char=""/>
-              <a:defRPr sz="1400" kern="1200">
-                <a:solidFill>
-                  <a:schemeClr val="tx1">
-                    <a:lumMod val="85000"/>
-                    <a:lumOff val="15000"/>
-                  </a:schemeClr>
-                </a:solidFill>
-                <a:latin typeface="Times New Roman" panose="02020603050405020304" pitchFamily="18" charset="0"/>
-                <a:ea typeface="+mn-ea"/>
-                <a:cs typeface="+mn-cs"/>
-              </a:defRPr>
-            </a:lvl3pPr>
-            <a:lvl4pPr marL="1005840" indent="-182880" algn="l" defTabSz="914400" rtl="0" eaLnBrk="1" latinLnBrk="0" hangingPunct="1">
-              <a:lnSpc>
-                <a:spcPct val="90000"/>
-              </a:lnSpc>
-              <a:spcBef>
-                <a:spcPts val="300"/>
-              </a:spcBef>
-              <a:spcAft>
-                <a:spcPts val="300"/>
-              </a:spcAft>
-              <a:buClr>
-                <a:schemeClr val="accent1"/>
-              </a:buClr>
-              <a:buFont typeface="Wingdings 2" pitchFamily="18" charset="2"/>
-              <a:buChar char=""/>
-              <a:defRPr sz="1400" kern="1200">
-                <a:solidFill>
-                  <a:schemeClr val="tx1">
-                    <a:lumMod val="85000"/>
-                    <a:lumOff val="15000"/>
-                  </a:schemeClr>
-                </a:solidFill>
-                <a:latin typeface="Times New Roman" panose="02020603050405020304" pitchFamily="18" charset="0"/>
-                <a:ea typeface="+mn-ea"/>
-                <a:cs typeface="+mn-cs"/>
-              </a:defRPr>
-            </a:lvl4pPr>
-            <a:lvl5pPr marL="1280160" indent="-182880" algn="l" defTabSz="914400" rtl="0" eaLnBrk="1" latinLnBrk="0" hangingPunct="1">
-              <a:lnSpc>
-                <a:spcPct val="90000"/>
-              </a:lnSpc>
-              <a:spcBef>
-                <a:spcPts val="300"/>
-              </a:spcBef>
-              <a:spcAft>
-                <a:spcPts val="300"/>
-              </a:spcAft>
-              <a:buClr>
-                <a:schemeClr val="accent1"/>
-              </a:buClr>
-              <a:buFont typeface="Wingdings 2" pitchFamily="18" charset="2"/>
-              <a:buChar char=""/>
-              <a:defRPr sz="1400" kern="1200">
-                <a:solidFill>
-                  <a:schemeClr val="tx1">
-                    <a:lumMod val="85000"/>
-                    <a:lumOff val="15000"/>
-                  </a:schemeClr>
-                </a:solidFill>
-                <a:latin typeface="Times New Roman" panose="02020603050405020304" pitchFamily="18" charset="0"/>
-                <a:ea typeface="+mn-ea"/>
-                <a:cs typeface="+mn-cs"/>
-              </a:defRPr>
-            </a:lvl5pPr>
-            <a:lvl6pPr marL="1600000" indent="-228600" algn="l" defTabSz="914400" rtl="0" eaLnBrk="1" latinLnBrk="0" hangingPunct="1">
-              <a:lnSpc>
-                <a:spcPct val="90000"/>
-              </a:lnSpc>
-              <a:spcBef>
-                <a:spcPts val="300"/>
-              </a:spcBef>
-              <a:spcAft>
-                <a:spcPts val="300"/>
-              </a:spcAft>
-              <a:buClr>
-                <a:schemeClr val="accent1"/>
-              </a:buClr>
-              <a:buFont typeface="Wingdings 2" pitchFamily="18" charset="2"/>
-              <a:buChar char=""/>
-              <a:defRPr sz="1400" kern="1200">
-                <a:solidFill>
-                  <a:schemeClr val="tx1">
-                    <a:lumMod val="85000"/>
-                    <a:lumOff val="15000"/>
-                  </a:schemeClr>
-                </a:solidFill>
-                <a:latin typeface="+mn-lt"/>
-                <a:ea typeface="+mn-ea"/>
-                <a:cs typeface="+mn-cs"/>
-              </a:defRPr>
-            </a:lvl6pPr>
-            <a:lvl7pPr marL="1900000" indent="-228600" algn="l" defTabSz="914400" rtl="0" eaLnBrk="1" latinLnBrk="0" hangingPunct="1">
-              <a:lnSpc>
-                <a:spcPct val="90000"/>
-              </a:lnSpc>
-              <a:spcBef>
-                <a:spcPts val="300"/>
-              </a:spcBef>
-              <a:spcAft>
-                <a:spcPts val="300"/>
-              </a:spcAft>
-              <a:buClr>
-                <a:schemeClr val="accent1"/>
-              </a:buClr>
-              <a:buFont typeface="Wingdings 2" pitchFamily="18" charset="2"/>
-              <a:buChar char=""/>
-              <a:defRPr sz="1400" kern="1200">
-                <a:solidFill>
-                  <a:schemeClr val="tx1">
-                    <a:lumMod val="85000"/>
-                    <a:lumOff val="15000"/>
-                  </a:schemeClr>
-                </a:solidFill>
-                <a:latin typeface="+mn-lt"/>
-                <a:ea typeface="+mn-ea"/>
-                <a:cs typeface="+mn-cs"/>
-              </a:defRPr>
-            </a:lvl7pPr>
-            <a:lvl8pPr marL="2200000" indent="-228600" algn="l" defTabSz="914400" rtl="0" eaLnBrk="1" latinLnBrk="0" hangingPunct="1">
-              <a:lnSpc>
-                <a:spcPct val="90000"/>
-              </a:lnSpc>
-              <a:spcBef>
-                <a:spcPts val="300"/>
-              </a:spcBef>
-              <a:spcAft>
-                <a:spcPts val="300"/>
-              </a:spcAft>
-              <a:buClr>
-                <a:schemeClr val="accent1"/>
-              </a:buClr>
-              <a:buFont typeface="Wingdings 2" pitchFamily="18" charset="2"/>
-              <a:buChar char=""/>
-              <a:defRPr sz="1400" kern="1200">
-                <a:solidFill>
-                  <a:schemeClr val="tx1">
-                    <a:lumMod val="85000"/>
-                    <a:lumOff val="15000"/>
-                  </a:schemeClr>
-                </a:solidFill>
-                <a:latin typeface="+mn-lt"/>
-                <a:ea typeface="+mn-ea"/>
-                <a:cs typeface="+mn-cs"/>
-              </a:defRPr>
-            </a:lvl8pPr>
-            <a:lvl9pPr marL="2500000" indent="-228600" algn="l" defTabSz="914400" rtl="0" eaLnBrk="1" latinLnBrk="0" hangingPunct="1">
-              <a:lnSpc>
-                <a:spcPct val="90000"/>
-              </a:lnSpc>
-              <a:spcBef>
-                <a:spcPts val="300"/>
-              </a:spcBef>
-              <a:spcAft>
-                <a:spcPts val="300"/>
-              </a:spcAft>
-              <a:buClr>
-                <a:schemeClr val="accent1"/>
-              </a:buClr>
-              <a:buFont typeface="Wingdings 2" pitchFamily="18" charset="2"/>
-              <a:buChar char=""/>
-              <a:defRPr sz="1400" kern="1200">
-                <a:solidFill>
-                  <a:schemeClr val="tx1">
-                    <a:lumMod val="85000"/>
-                    <a:lumOff val="15000"/>
-                  </a:schemeClr>
-                </a:solidFill>
-                <a:latin typeface="+mn-lt"/>
-                <a:ea typeface="+mn-ea"/>
-                <a:cs typeface="+mn-cs"/>
-              </a:defRPr>
-            </a:lvl9pPr>
-          </a:lstStyle>
-          <a:p>
-            <a:r>
-              <a:rPr lang="en-US" sz="2400" dirty="0">
-                <a:cs typeface="Times New Roman" panose="02020603050405020304" pitchFamily="18" charset="0"/>
-              </a:rPr>
-              <a:t>Patients act weird! How should we think about this positively? Normatively?</a:t>
-            </a:r>
-          </a:p>
-          <a:p>
-            <a:r>
-              <a:rPr lang="en-US" sz="2400" dirty="0">
-                <a:cs typeface="Times New Roman" panose="02020603050405020304" pitchFamily="18" charset="0"/>
-              </a:rPr>
-              <a:t>How to write a “niche” model </a:t>
-            </a:r>
-          </a:p>
-          <a:p>
-            <a:r>
-              <a:rPr lang="en-US" sz="2400" dirty="0">
-                <a:cs typeface="Times New Roman" panose="02020603050405020304" pitchFamily="18" charset="0"/>
-              </a:rPr>
-              <a:t>3 Core Examples:</a:t>
-            </a:r>
-          </a:p>
-          <a:p>
-            <a:pPr lvl="1"/>
-            <a:r>
-              <a:rPr lang="en-US" sz="2200" dirty="0">
-                <a:cs typeface="Times New Roman" panose="02020603050405020304" pitchFamily="18" charset="0"/>
-              </a:rPr>
-              <a:t>Addiction (Becker and Murphy)</a:t>
-            </a:r>
-          </a:p>
-          <a:p>
-            <a:pPr lvl="1"/>
-            <a:r>
-              <a:rPr lang="en-US" sz="2200" dirty="0">
-                <a:cs typeface="Times New Roman" panose="02020603050405020304" pitchFamily="18" charset="0"/>
-              </a:rPr>
-              <a:t>Screening/Preventive care decisions (Oster et al.) </a:t>
-            </a:r>
-          </a:p>
-          <a:p>
-            <a:pPr lvl="1"/>
-            <a:r>
-              <a:rPr lang="en-US" sz="2200" dirty="0">
-                <a:cs typeface="Times New Roman" panose="02020603050405020304" pitchFamily="18" charset="0"/>
-              </a:rPr>
-              <a:t>Plan choices (Abaluck and Gruber)</a:t>
-            </a:r>
-          </a:p>
-        </p:txBody>
-      </p:sp>
-    </p:spTree>
-    <p:extLst>
-      <p:ext uri="{BB962C8B-B14F-4D97-AF65-F5344CB8AC3E}">
-        <p14:creationId xmlns:p14="http://schemas.microsoft.com/office/powerpoint/2010/main" val="3746653845"/>
-      </p:ext>
-    </p:extLst>
-  </p:cSld>
-  <p:clrMapOvr>
-    <a:masterClrMapping/>
-  </p:clrMapOvr>
-</p:sld>
-</file>
-
-<file path=ppt/slides/slide30.xml><?xml version="1.0" encoding="utf-8"?>
+<file path=ppt/slides/slide34.xml><?xml version="1.0" encoding="utf-8"?>
 <p:sld xmlns:a="http://schemas.openxmlformats.org/drawingml/2006/main" xmlns:r="http://schemas.openxmlformats.org/officeDocument/2006/relationships" xmlns:p="http://schemas.openxmlformats.org/presentationml/2006/main">
   <p:cSld>
     <p:spTree>
@@ -16452,7 +18549,7 @@
           <a:p>
             <a:fld id="{3DAF9783-BC0E-C649-838D-61F838C67253}" type="slidenum">
               <a:rPr lang="en-US" smtClean="0"/>
-              <a:t>30</a:t>
+              <a:t>34</a:t>
             </a:fld>
             <a:endParaRPr lang="en-US"/>
           </a:p>
@@ -16527,7 +18624,7 @@
 </p:sld>
 </file>
 
-<file path=ppt/slides/slide31.xml><?xml version="1.0" encoding="utf-8"?>
+<file path=ppt/slides/slide35.xml><?xml version="1.0" encoding="utf-8"?>
 <p:sld xmlns:a="http://schemas.openxmlformats.org/drawingml/2006/main" xmlns:r="http://schemas.openxmlformats.org/officeDocument/2006/relationships" xmlns:p="http://schemas.openxmlformats.org/presentationml/2006/main">
   <p:cSld>
     <p:spTree>
@@ -16974,7 +19071,7 @@
           <a:p>
             <a:fld id="{3DAF9783-BC0E-C649-838D-61F838C67253}" type="slidenum">
               <a:rPr lang="en-US" smtClean="0"/>
-              <a:t>31</a:t>
+              <a:t>35</a:t>
             </a:fld>
             <a:endParaRPr lang="en-US"/>
           </a:p>
@@ -17049,7 +19146,7 @@
 </p:sld>
 </file>
 
-<file path=ppt/slides/slide32.xml><?xml version="1.0" encoding="utf-8"?>
+<file path=ppt/slides/slide36.xml><?xml version="1.0" encoding="utf-8"?>
 <p:sld xmlns:a="http://schemas.openxmlformats.org/drawingml/2006/main" xmlns:r="http://schemas.openxmlformats.org/officeDocument/2006/relationships" xmlns:p="http://schemas.openxmlformats.org/presentationml/2006/main">
   <p:cSld>
     <p:spTree>
@@ -17066,8 +19163,8 @@
           <a:chExt cx="0" cy="0"/>
         </a:xfrm>
       </p:grpSpPr>
-      <mc:AlternateContent xmlns:mc="http://schemas.openxmlformats.org/markup-compatibility/2006" xmlns:a14="http://schemas.microsoft.com/office/drawing/2010/main">
-        <mc:Choice Requires="a14">
+      <mc:AlternateContent xmlns:mc="http://schemas.openxmlformats.org/markup-compatibility/2006">
+        <mc:Choice xmlns:a14="http://schemas.microsoft.com/office/drawing/2010/main" Requires="a14">
           <p:sp>
             <p:nvSpPr>
               <p:cNvPr id="3" name="Content Placeholder 2"/>
@@ -17427,7 +19524,18 @@
                     </a:solidFill>
                     <a:cs typeface="Times New Roman" panose="02020603050405020304" pitchFamily="18" charset="0"/>
                   </a:rPr>
-                  <a:t> “Behavioral hazard”</a:t>
+                  <a:t> </a:t>
+                </a:r>
+                <a:r>
+                  <a:rPr lang="en-US" sz="2400" b="1" u="sng" dirty="0">
+                    <a:solidFill>
+                      <a:schemeClr val="accent3">
+                        <a:lumMod val="75000"/>
+                      </a:schemeClr>
+                    </a:solidFill>
+                    <a:cs typeface="Times New Roman" panose="02020603050405020304" pitchFamily="18" charset="0"/>
+                  </a:rPr>
+                  <a:t>“Behavioral hazard”</a:t>
                 </a:r>
               </a:p>
               <a:p>
@@ -17590,7 +19698,7 @@
             </p:txBody>
           </p:sp>
         </mc:Choice>
-        <mc:Fallback xmlns="">
+        <mc:Fallback>
           <p:sp>
             <p:nvSpPr>
               <p:cNvPr id="3" name="Content Placeholder 2"/>
@@ -17618,7 +19726,7 @@
               <a:lstStyle/>
               <a:p>
                 <a:r>
-                  <a:rPr lang="en-US">
+                  <a:rPr lang="en-CA">
                     <a:noFill/>
                   </a:rPr>
                   <a:t> </a:t>
@@ -17647,7 +19755,7 @@
           <a:p>
             <a:fld id="{3DAF9783-BC0E-C649-838D-61F838C67253}" type="slidenum">
               <a:rPr lang="en-US" smtClean="0"/>
-              <a:t>32</a:t>
+              <a:t>36</a:t>
             </a:fld>
             <a:endParaRPr lang="en-US"/>
           </a:p>
@@ -17722,7 +19830,7 @@
 </p:sld>
 </file>
 
-<file path=ppt/slides/slide33.xml><?xml version="1.0" encoding="utf-8"?>
+<file path=ppt/slides/slide37.xml><?xml version="1.0" encoding="utf-8"?>
 <p:sld xmlns:a="http://schemas.openxmlformats.org/drawingml/2006/main" xmlns:r="http://schemas.openxmlformats.org/officeDocument/2006/relationships" xmlns:p="http://schemas.openxmlformats.org/presentationml/2006/main">
   <p:cSld>
     <p:spTree>
@@ -17787,7 +19895,7 @@
           <a:p>
             <a:fld id="{3DAF9783-BC0E-C649-838D-61F838C67253}" type="slidenum">
               <a:rPr lang="en-US" smtClean="0"/>
-              <a:t>33</a:t>
+              <a:t>37</a:t>
             </a:fld>
             <a:endParaRPr lang="en-US"/>
           </a:p>
@@ -17862,7 +19970,7 @@
 </p:sld>
 </file>
 
-<file path=ppt/slides/slide34.xml><?xml version="1.0" encoding="utf-8"?>
+<file path=ppt/slides/slide38.xml><?xml version="1.0" encoding="utf-8"?>
 <p:sld xmlns:a="http://schemas.openxmlformats.org/drawingml/2006/main" xmlns:r="http://schemas.openxmlformats.org/officeDocument/2006/relationships" xmlns:p="http://schemas.openxmlformats.org/presentationml/2006/main">
   <p:cSld>
     <p:spTree>
@@ -17898,7 +20006,7 @@
           <a:p>
             <a:fld id="{3DAF9783-BC0E-C649-838D-61F838C67253}" type="slidenum">
               <a:rPr lang="en-US" smtClean="0"/>
-              <a:t>34</a:t>
+              <a:t>38</a:t>
             </a:fld>
             <a:endParaRPr lang="en-US"/>
           </a:p>
@@ -18028,7 +20136,7 @@
 </p:sld>
 </file>
 
-<file path=ppt/slides/slide35.xml><?xml version="1.0" encoding="utf-8"?>
+<file path=ppt/slides/slide39.xml><?xml version="1.0" encoding="utf-8"?>
 <p:sld xmlns:a="http://schemas.openxmlformats.org/drawingml/2006/main" xmlns:r="http://schemas.openxmlformats.org/officeDocument/2006/relationships" xmlns:p="http://schemas.openxmlformats.org/presentationml/2006/main">
   <p:cSld>
     <p:spTree>
@@ -18064,7 +20172,7 @@
           <a:p>
             <a:fld id="{3DAF9783-BC0E-C649-838D-61F838C67253}" type="slidenum">
               <a:rPr lang="en-US" smtClean="0"/>
-              <a:t>35</a:t>
+              <a:t>39</a:t>
             </a:fld>
             <a:endParaRPr lang="en-US"/>
           </a:p>
@@ -18185,354 +20293,6 @@
     <p:extLst>
       <p:ext uri="{BB962C8B-B14F-4D97-AF65-F5344CB8AC3E}">
         <p14:creationId xmlns:p14="http://schemas.microsoft.com/office/powerpoint/2010/main" val="3594905558"/>
-      </p:ext>
-    </p:extLst>
-  </p:cSld>
-  <p:clrMapOvr>
-    <a:masterClrMapping/>
-  </p:clrMapOvr>
-</p:sld>
-</file>
-
-<file path=ppt/slides/slide36.xml><?xml version="1.0" encoding="utf-8"?>
-<p:sld xmlns:a="http://schemas.openxmlformats.org/drawingml/2006/main" xmlns:r="http://schemas.openxmlformats.org/officeDocument/2006/relationships" xmlns:p="http://schemas.openxmlformats.org/presentationml/2006/main">
-  <p:cSld>
-    <p:spTree>
-      <p:nvGrpSpPr>
-        <p:cNvPr id="1" name=""/>
-        <p:cNvGrpSpPr/>
-        <p:nvPr/>
-      </p:nvGrpSpPr>
-      <p:grpSpPr>
-        <a:xfrm>
-          <a:off x="0" y="0"/>
-          <a:ext cx="0" cy="0"/>
-          <a:chOff x="0" y="0"/>
-          <a:chExt cx="0" cy="0"/>
-        </a:xfrm>
-      </p:grpSpPr>
-      <p:sp>
-        <p:nvSpPr>
-          <p:cNvPr id="5" name="Title 1">
-            <a:extLst>
-              <a:ext uri="{FF2B5EF4-FFF2-40B4-BE49-F238E27FC236}">
-                <a16:creationId xmlns:a16="http://schemas.microsoft.com/office/drawing/2014/main" id="{3AC41146-1857-1400-EE30-AE66F64DCE11}"/>
-              </a:ext>
-            </a:extLst>
-          </p:cNvPr>
-          <p:cNvSpPr txBox="1">
-            <a:spLocks/>
-          </p:cNvSpPr>
-          <p:nvPr/>
-        </p:nvSpPr>
-        <p:spPr>
-          <a:xfrm>
-            <a:off x="609600" y="272077"/>
-            <a:ext cx="10439400" cy="624840"/>
-          </a:xfrm>
-          <a:prstGeom prst="rect">
-            <a:avLst/>
-          </a:prstGeom>
-        </p:spPr>
-        <p:txBody>
-          <a:bodyPr vert="horz" lIns="91440" tIns="45720" rIns="91440" bIns="45720" rtlCol="0" anchor="b">
-            <a:noAutofit/>
-          </a:bodyPr>
-          <a:lstStyle>
-            <a:lvl1pPr algn="l" defTabSz="914400" rtl="0" eaLnBrk="1" latinLnBrk="0" hangingPunct="1">
-              <a:lnSpc>
-                <a:spcPct val="90000"/>
-              </a:lnSpc>
-              <a:spcBef>
-                <a:spcPct val="0"/>
-              </a:spcBef>
-              <a:buNone/>
-              <a:defRPr sz="4400" kern="1200" spc="-50" baseline="0">
-                <a:solidFill>
-                  <a:schemeClr val="tx1"/>
-                </a:solidFill>
-                <a:latin typeface="Times New Roman" panose="02020603050405020304" pitchFamily="18" charset="0"/>
-                <a:ea typeface="+mj-ea"/>
-                <a:cs typeface="+mj-cs"/>
-              </a:defRPr>
-            </a:lvl1pPr>
-          </a:lstStyle>
-          <a:p>
-            <a:r>
-              <a:rPr lang="en-US" sz="3600" dirty="0">
-                <a:cs typeface="Times New Roman" panose="02020603050405020304" pitchFamily="18" charset="0"/>
-              </a:rPr>
-              <a:t>Behavioral Hazard Summarized</a:t>
-            </a:r>
-          </a:p>
-        </p:txBody>
-      </p:sp>
-      <p:pic>
-        <p:nvPicPr>
-          <p:cNvPr id="7" name="Picture 6">
-            <a:extLst>
-              <a:ext uri="{FF2B5EF4-FFF2-40B4-BE49-F238E27FC236}">
-                <a16:creationId xmlns:a16="http://schemas.microsoft.com/office/drawing/2014/main" id="{5159E0C4-2B4E-A61F-1ABE-E1947BE48B0F}"/>
-              </a:ext>
-            </a:extLst>
-          </p:cNvPr>
-          <p:cNvPicPr>
-            <a:picLocks noChangeAspect="1"/>
-          </p:cNvPicPr>
-          <p:nvPr/>
-        </p:nvPicPr>
-        <p:blipFill>
-          <a:blip r:embed="rId3"/>
-          <a:stretch>
-            <a:fillRect/>
-          </a:stretch>
-        </p:blipFill>
-        <p:spPr>
-          <a:xfrm>
-            <a:off x="304800" y="934495"/>
-            <a:ext cx="7162800" cy="5695629"/>
-          </a:xfrm>
-          <a:prstGeom prst="rect">
-            <a:avLst/>
-          </a:prstGeom>
-        </p:spPr>
-      </p:pic>
-      <mc:AlternateContent xmlns:mc="http://schemas.openxmlformats.org/markup-compatibility/2006" xmlns:a14="http://schemas.microsoft.com/office/drawing/2010/main">
-        <mc:Choice Requires="a14">
-          <p:sp>
-            <p:nvSpPr>
-              <p:cNvPr id="3" name="Content Placeholder 2">
-                <a:extLst>
-                  <a:ext uri="{FF2B5EF4-FFF2-40B4-BE49-F238E27FC236}">
-                    <a16:creationId xmlns:a16="http://schemas.microsoft.com/office/drawing/2014/main" id="{46961F7F-3C5C-23ED-DAAD-C22498C3DDCC}"/>
-                  </a:ext>
-                </a:extLst>
-              </p:cNvPr>
-              <p:cNvSpPr>
-                <a:spLocks noGrp="1"/>
-              </p:cNvSpPr>
-              <p:nvPr>
-                <p:ph idx="1"/>
-              </p:nvPr>
-            </p:nvSpPr>
-            <p:spPr>
-              <a:xfrm>
-                <a:off x="6858000" y="484508"/>
-                <a:ext cx="4267200" cy="5992492"/>
-              </a:xfrm>
-            </p:spPr>
-            <p:txBody>
-              <a:bodyPr>
-                <a:normAutofit/>
-              </a:bodyPr>
-              <a:lstStyle/>
-              <a:p>
-                <a:pPr marL="0" indent="0">
-                  <a:buNone/>
-                </a:pPr>
-                <a:r>
-                  <a:rPr lang="en-US" sz="2400" dirty="0"/>
-                  <a:t>With behavioral hazard: </a:t>
-                </a:r>
-              </a:p>
-              <a:p>
-                <a:pPr marL="457200" indent="-457200">
-                  <a:buFont typeface="+mj-lt"/>
-                  <a:buAutoNum type="arabicPeriod"/>
-                </a:pPr>
-                <a:r>
-                  <a:rPr lang="en-US" sz="2400" dirty="0"/>
-                  <a:t>The marginal patient doesn’t value treatment at copay (</a:t>
-                </a:r>
-                <a14:m>
-                  <m:oMath xmlns:m="http://schemas.openxmlformats.org/officeDocument/2006/math">
-                    <m:r>
-                      <a:rPr lang="en-US" sz="2400" b="0" i="1" smtClean="0">
-                        <a:latin typeface="Cambria Math" panose="02040503050406030204" pitchFamily="18" charset="0"/>
-                      </a:rPr>
-                      <m:t>𝑀𝐵</m:t>
-                    </m:r>
-                    <m:r>
-                      <a:rPr lang="en-US" sz="2400" b="0" i="1" smtClean="0">
-                        <a:latin typeface="Cambria Math" panose="02040503050406030204" pitchFamily="18" charset="0"/>
-                      </a:rPr>
-                      <m:t>≠</m:t>
-                    </m:r>
-                    <m:r>
-                      <a:rPr lang="en-US" sz="2400" b="0" i="1" smtClean="0">
-                        <a:latin typeface="Cambria Math" panose="02040503050406030204" pitchFamily="18" charset="0"/>
-                      </a:rPr>
-                      <m:t>𝑀𝐶</m:t>
-                    </m:r>
-                    <m:r>
-                      <a:rPr lang="en-US" sz="2400" b="0" i="1" smtClean="0">
-                        <a:latin typeface="Cambria Math" panose="02040503050406030204" pitchFamily="18" charset="0"/>
-                      </a:rPr>
-                      <m:t>)</m:t>
-                    </m:r>
-                  </m:oMath>
-                </a14:m>
-                <a:endParaRPr lang="en-US" sz="2400" dirty="0"/>
-              </a:p>
-              <a:p>
-                <a:pPr marL="457200" indent="-457200">
-                  <a:buFont typeface="+mj-lt"/>
-                  <a:buAutoNum type="arabicPeriod"/>
-                </a:pPr>
-                <a:r>
-                  <a:rPr lang="en-US" sz="2400" dirty="0"/>
-                  <a:t>Demand responses are not just made up of moral hazard responses</a:t>
-                </a:r>
-              </a:p>
-              <a:p>
-                <a:pPr marL="457200" indent="-457200">
-                  <a:buFont typeface="+mj-lt"/>
-                  <a:buAutoNum type="arabicPeriod"/>
-                </a:pPr>
-                <a:r>
-                  <a:rPr lang="en-US" sz="2400" dirty="0"/>
-                  <a:t>Measuring health responses characterizes who is at the margin. </a:t>
-                </a:r>
-              </a:p>
-            </p:txBody>
-          </p:sp>
-        </mc:Choice>
-        <mc:Fallback xmlns="">
-          <p:sp>
-            <p:nvSpPr>
-              <p:cNvPr id="3" name="Content Placeholder 2">
-                <a:extLst>
-                  <a:ext uri="{FF2B5EF4-FFF2-40B4-BE49-F238E27FC236}">
-                    <a16:creationId xmlns:a16="http://schemas.microsoft.com/office/drawing/2014/main" id="{46961F7F-3C5C-23ED-DAAD-C22498C3DDCC}"/>
-                  </a:ext>
-                </a:extLst>
-              </p:cNvPr>
-              <p:cNvSpPr>
-                <a:spLocks noGrp="1" noRot="1" noChangeAspect="1" noMove="1" noResize="1" noEditPoints="1" noAdjustHandles="1" noChangeArrowheads="1" noChangeShapeType="1" noTextEdit="1"/>
-              </p:cNvSpPr>
-              <p:nvPr>
-                <p:ph idx="1"/>
-              </p:nvPr>
-            </p:nvSpPr>
-            <p:spPr>
-              <a:xfrm>
-                <a:off x="6858000" y="484508"/>
-                <a:ext cx="4267200" cy="5992492"/>
-              </a:xfrm>
-              <a:blipFill>
-                <a:blip r:embed="rId4"/>
-                <a:stretch>
-                  <a:fillRect l="-2143" t="-1118" r="-3143"/>
-                </a:stretch>
-              </a:blipFill>
-            </p:spPr>
-            <p:txBody>
-              <a:bodyPr/>
-              <a:lstStyle/>
-              <a:p>
-                <a:r>
-                  <a:rPr lang="en-US">
-                    <a:noFill/>
-                  </a:rPr>
-                  <a:t> </a:t>
-                </a:r>
-              </a:p>
-            </p:txBody>
-          </p:sp>
-        </mc:Fallback>
-      </mc:AlternateContent>
-    </p:spTree>
-    <p:extLst>
-      <p:ext uri="{BB962C8B-B14F-4D97-AF65-F5344CB8AC3E}">
-        <p14:creationId xmlns:p14="http://schemas.microsoft.com/office/powerpoint/2010/main" val="722902852"/>
-      </p:ext>
-    </p:extLst>
-  </p:cSld>
-  <p:clrMapOvr>
-    <a:masterClrMapping/>
-  </p:clrMapOvr>
-</p:sld>
-</file>
-
-<file path=ppt/slides/slide37.xml><?xml version="1.0" encoding="utf-8"?>
-<p:sld xmlns:a="http://schemas.openxmlformats.org/drawingml/2006/main" xmlns:r="http://schemas.openxmlformats.org/officeDocument/2006/relationships" xmlns:p="http://schemas.openxmlformats.org/presentationml/2006/main">
-  <p:cSld>
-    <p:spTree>
-      <p:nvGrpSpPr>
-        <p:cNvPr id="1" name=""/>
-        <p:cNvGrpSpPr/>
-        <p:nvPr/>
-      </p:nvGrpSpPr>
-      <p:grpSpPr>
-        <a:xfrm>
-          <a:off x="0" y="0"/>
-          <a:ext cx="0" cy="0"/>
-          <a:chOff x="0" y="0"/>
-          <a:chExt cx="0" cy="0"/>
-        </a:xfrm>
-      </p:grpSpPr>
-      <p:sp>
-        <p:nvSpPr>
-          <p:cNvPr id="4" name="Title 3">
-            <a:extLst>
-              <a:ext uri="{FF2B5EF4-FFF2-40B4-BE49-F238E27FC236}">
-                <a16:creationId xmlns:a16="http://schemas.microsoft.com/office/drawing/2014/main" id="{3959A64B-5C9A-4A9B-BA45-ADECED2E51D9}"/>
-              </a:ext>
-            </a:extLst>
-          </p:cNvPr>
-          <p:cNvSpPr>
-            <a:spLocks noGrp="1"/>
-          </p:cNvSpPr>
-          <p:nvPr>
-            <p:ph type="ctrTitle"/>
-          </p:nvPr>
-        </p:nvSpPr>
-        <p:spPr>
-          <a:xfrm>
-            <a:off x="1261872" y="758952"/>
-            <a:ext cx="10625328" cy="4041648"/>
-          </a:xfrm>
-        </p:spPr>
-        <p:txBody>
-          <a:bodyPr/>
-          <a:lstStyle/>
-          <a:p>
-            <a:r>
-              <a:rPr lang="en-US" dirty="0"/>
-              <a:t>Presentations</a:t>
-            </a:r>
-          </a:p>
-        </p:txBody>
-      </p:sp>
-      <p:sp>
-        <p:nvSpPr>
-          <p:cNvPr id="5" name="Subtitle 4">
-            <a:extLst>
-              <a:ext uri="{FF2B5EF4-FFF2-40B4-BE49-F238E27FC236}">
-                <a16:creationId xmlns:a16="http://schemas.microsoft.com/office/drawing/2014/main" id="{D52D9252-3DD8-4D35-8070-32332FBE25E4}"/>
-              </a:ext>
-            </a:extLst>
-          </p:cNvPr>
-          <p:cNvSpPr>
-            <a:spLocks noGrp="1"/>
-          </p:cNvSpPr>
-          <p:nvPr>
-            <p:ph type="subTitle" idx="1"/>
-          </p:nvPr>
-        </p:nvSpPr>
-        <p:spPr/>
-        <p:txBody>
-          <a:bodyPr/>
-          <a:lstStyle/>
-          <a:p>
-            <a:endParaRPr lang="en-US" dirty="0"/>
-          </a:p>
-        </p:txBody>
-      </p:sp>
-    </p:spTree>
-    <p:extLst>
-      <p:ext uri="{BB962C8B-B14F-4D97-AF65-F5344CB8AC3E}">
-        <p14:creationId xmlns:p14="http://schemas.microsoft.com/office/powerpoint/2010/main" val="1905963770"/>
       </p:ext>
     </p:extLst>
   </p:cSld>
@@ -18961,6 +20721,354 @@
     <p:extLst>
       <p:ext uri="{BB962C8B-B14F-4D97-AF65-F5344CB8AC3E}">
         <p14:creationId xmlns:p14="http://schemas.microsoft.com/office/powerpoint/2010/main" val="3125092156"/>
+      </p:ext>
+    </p:extLst>
+  </p:cSld>
+  <p:clrMapOvr>
+    <a:masterClrMapping/>
+  </p:clrMapOvr>
+</p:sld>
+</file>
+
+<file path=ppt/slides/slide40.xml><?xml version="1.0" encoding="utf-8"?>
+<p:sld xmlns:a="http://schemas.openxmlformats.org/drawingml/2006/main" xmlns:r="http://schemas.openxmlformats.org/officeDocument/2006/relationships" xmlns:p="http://schemas.openxmlformats.org/presentationml/2006/main">
+  <p:cSld>
+    <p:spTree>
+      <p:nvGrpSpPr>
+        <p:cNvPr id="1" name=""/>
+        <p:cNvGrpSpPr/>
+        <p:nvPr/>
+      </p:nvGrpSpPr>
+      <p:grpSpPr>
+        <a:xfrm>
+          <a:off x="0" y="0"/>
+          <a:ext cx="0" cy="0"/>
+          <a:chOff x="0" y="0"/>
+          <a:chExt cx="0" cy="0"/>
+        </a:xfrm>
+      </p:grpSpPr>
+      <p:sp>
+        <p:nvSpPr>
+          <p:cNvPr id="5" name="Title 1">
+            <a:extLst>
+              <a:ext uri="{FF2B5EF4-FFF2-40B4-BE49-F238E27FC236}">
+                <a16:creationId xmlns:a16="http://schemas.microsoft.com/office/drawing/2014/main" id="{3AC41146-1857-1400-EE30-AE66F64DCE11}"/>
+              </a:ext>
+            </a:extLst>
+          </p:cNvPr>
+          <p:cNvSpPr txBox="1">
+            <a:spLocks/>
+          </p:cNvSpPr>
+          <p:nvPr/>
+        </p:nvSpPr>
+        <p:spPr>
+          <a:xfrm>
+            <a:off x="609600" y="272077"/>
+            <a:ext cx="10439400" cy="624840"/>
+          </a:xfrm>
+          <a:prstGeom prst="rect">
+            <a:avLst/>
+          </a:prstGeom>
+        </p:spPr>
+        <p:txBody>
+          <a:bodyPr vert="horz" lIns="91440" tIns="45720" rIns="91440" bIns="45720" rtlCol="0" anchor="b">
+            <a:noAutofit/>
+          </a:bodyPr>
+          <a:lstStyle>
+            <a:lvl1pPr algn="l" defTabSz="914400" rtl="0" eaLnBrk="1" latinLnBrk="0" hangingPunct="1">
+              <a:lnSpc>
+                <a:spcPct val="90000"/>
+              </a:lnSpc>
+              <a:spcBef>
+                <a:spcPct val="0"/>
+              </a:spcBef>
+              <a:buNone/>
+              <a:defRPr sz="4400" kern="1200" spc="-50" baseline="0">
+                <a:solidFill>
+                  <a:schemeClr val="tx1"/>
+                </a:solidFill>
+                <a:latin typeface="Times New Roman" panose="02020603050405020304" pitchFamily="18" charset="0"/>
+                <a:ea typeface="+mj-ea"/>
+                <a:cs typeface="+mj-cs"/>
+              </a:defRPr>
+            </a:lvl1pPr>
+          </a:lstStyle>
+          <a:p>
+            <a:r>
+              <a:rPr lang="en-US" sz="3600" dirty="0">
+                <a:cs typeface="Times New Roman" panose="02020603050405020304" pitchFamily="18" charset="0"/>
+              </a:rPr>
+              <a:t>Behavioral Hazard Summarized</a:t>
+            </a:r>
+          </a:p>
+        </p:txBody>
+      </p:sp>
+      <p:pic>
+        <p:nvPicPr>
+          <p:cNvPr id="7" name="Picture 6">
+            <a:extLst>
+              <a:ext uri="{FF2B5EF4-FFF2-40B4-BE49-F238E27FC236}">
+                <a16:creationId xmlns:a16="http://schemas.microsoft.com/office/drawing/2014/main" id="{5159E0C4-2B4E-A61F-1ABE-E1947BE48B0F}"/>
+              </a:ext>
+            </a:extLst>
+          </p:cNvPr>
+          <p:cNvPicPr>
+            <a:picLocks noChangeAspect="1"/>
+          </p:cNvPicPr>
+          <p:nvPr/>
+        </p:nvPicPr>
+        <p:blipFill>
+          <a:blip r:embed="rId3"/>
+          <a:stretch>
+            <a:fillRect/>
+          </a:stretch>
+        </p:blipFill>
+        <p:spPr>
+          <a:xfrm>
+            <a:off x="304800" y="934495"/>
+            <a:ext cx="7162800" cy="5695629"/>
+          </a:xfrm>
+          <a:prstGeom prst="rect">
+            <a:avLst/>
+          </a:prstGeom>
+        </p:spPr>
+      </p:pic>
+      <mc:AlternateContent xmlns:mc="http://schemas.openxmlformats.org/markup-compatibility/2006" xmlns:a14="http://schemas.microsoft.com/office/drawing/2010/main">
+        <mc:Choice Requires="a14">
+          <p:sp>
+            <p:nvSpPr>
+              <p:cNvPr id="3" name="Content Placeholder 2">
+                <a:extLst>
+                  <a:ext uri="{FF2B5EF4-FFF2-40B4-BE49-F238E27FC236}">
+                    <a16:creationId xmlns:a16="http://schemas.microsoft.com/office/drawing/2014/main" id="{46961F7F-3C5C-23ED-DAAD-C22498C3DDCC}"/>
+                  </a:ext>
+                </a:extLst>
+              </p:cNvPr>
+              <p:cNvSpPr>
+                <a:spLocks noGrp="1"/>
+              </p:cNvSpPr>
+              <p:nvPr>
+                <p:ph idx="1"/>
+              </p:nvPr>
+            </p:nvSpPr>
+            <p:spPr>
+              <a:xfrm>
+                <a:off x="6858000" y="484508"/>
+                <a:ext cx="4267200" cy="5992492"/>
+              </a:xfrm>
+            </p:spPr>
+            <p:txBody>
+              <a:bodyPr>
+                <a:normAutofit/>
+              </a:bodyPr>
+              <a:lstStyle/>
+              <a:p>
+                <a:pPr marL="0" indent="0">
+                  <a:buNone/>
+                </a:pPr>
+                <a:r>
+                  <a:rPr lang="en-US" sz="2400" dirty="0"/>
+                  <a:t>With behavioral hazard: </a:t>
+                </a:r>
+              </a:p>
+              <a:p>
+                <a:pPr marL="457200" indent="-457200">
+                  <a:buFont typeface="+mj-lt"/>
+                  <a:buAutoNum type="arabicPeriod"/>
+                </a:pPr>
+                <a:r>
+                  <a:rPr lang="en-US" sz="2400" dirty="0"/>
+                  <a:t>The marginal patient doesn’t value treatment at copay (</a:t>
+                </a:r>
+                <a14:m>
+                  <m:oMath xmlns:m="http://schemas.openxmlformats.org/officeDocument/2006/math">
+                    <m:r>
+                      <a:rPr lang="en-US" sz="2400" b="0" i="1" smtClean="0">
+                        <a:latin typeface="Cambria Math" panose="02040503050406030204" pitchFamily="18" charset="0"/>
+                      </a:rPr>
+                      <m:t>𝑀𝐵</m:t>
+                    </m:r>
+                    <m:r>
+                      <a:rPr lang="en-US" sz="2400" b="0" i="1" smtClean="0">
+                        <a:latin typeface="Cambria Math" panose="02040503050406030204" pitchFamily="18" charset="0"/>
+                      </a:rPr>
+                      <m:t>≠</m:t>
+                    </m:r>
+                    <m:r>
+                      <a:rPr lang="en-US" sz="2400" b="0" i="1" smtClean="0">
+                        <a:latin typeface="Cambria Math" panose="02040503050406030204" pitchFamily="18" charset="0"/>
+                      </a:rPr>
+                      <m:t>𝑀𝐶</m:t>
+                    </m:r>
+                    <m:r>
+                      <a:rPr lang="en-US" sz="2400" b="0" i="1" smtClean="0">
+                        <a:latin typeface="Cambria Math" panose="02040503050406030204" pitchFamily="18" charset="0"/>
+                      </a:rPr>
+                      <m:t>)</m:t>
+                    </m:r>
+                  </m:oMath>
+                </a14:m>
+                <a:endParaRPr lang="en-US" sz="2400" dirty="0"/>
+              </a:p>
+              <a:p>
+                <a:pPr marL="457200" indent="-457200">
+                  <a:buFont typeface="+mj-lt"/>
+                  <a:buAutoNum type="arabicPeriod"/>
+                </a:pPr>
+                <a:r>
+                  <a:rPr lang="en-US" sz="2400" dirty="0"/>
+                  <a:t>Demand responses are not just made up of moral hazard responses</a:t>
+                </a:r>
+              </a:p>
+              <a:p>
+                <a:pPr marL="457200" indent="-457200">
+                  <a:buFont typeface="+mj-lt"/>
+                  <a:buAutoNum type="arabicPeriod"/>
+                </a:pPr>
+                <a:r>
+                  <a:rPr lang="en-US" sz="2400" dirty="0"/>
+                  <a:t>Measuring health responses characterizes who is at the margin. </a:t>
+                </a:r>
+              </a:p>
+            </p:txBody>
+          </p:sp>
+        </mc:Choice>
+        <mc:Fallback xmlns="">
+          <p:sp>
+            <p:nvSpPr>
+              <p:cNvPr id="3" name="Content Placeholder 2">
+                <a:extLst>
+                  <a:ext uri="{FF2B5EF4-FFF2-40B4-BE49-F238E27FC236}">
+                    <a16:creationId xmlns:a16="http://schemas.microsoft.com/office/drawing/2014/main" id="{46961F7F-3C5C-23ED-DAAD-C22498C3DDCC}"/>
+                  </a:ext>
+                </a:extLst>
+              </p:cNvPr>
+              <p:cNvSpPr>
+                <a:spLocks noGrp="1" noRot="1" noChangeAspect="1" noMove="1" noResize="1" noEditPoints="1" noAdjustHandles="1" noChangeArrowheads="1" noChangeShapeType="1" noTextEdit="1"/>
+              </p:cNvSpPr>
+              <p:nvPr>
+                <p:ph idx="1"/>
+              </p:nvPr>
+            </p:nvSpPr>
+            <p:spPr>
+              <a:xfrm>
+                <a:off x="6858000" y="484508"/>
+                <a:ext cx="4267200" cy="5992492"/>
+              </a:xfrm>
+              <a:blipFill>
+                <a:blip r:embed="rId4"/>
+                <a:stretch>
+                  <a:fillRect l="-2143" t="-1118" r="-3143"/>
+                </a:stretch>
+              </a:blipFill>
+            </p:spPr>
+            <p:txBody>
+              <a:bodyPr/>
+              <a:lstStyle/>
+              <a:p>
+                <a:r>
+                  <a:rPr lang="en-US">
+                    <a:noFill/>
+                  </a:rPr>
+                  <a:t> </a:t>
+                </a:r>
+              </a:p>
+            </p:txBody>
+          </p:sp>
+        </mc:Fallback>
+      </mc:AlternateContent>
+    </p:spTree>
+    <p:extLst>
+      <p:ext uri="{BB962C8B-B14F-4D97-AF65-F5344CB8AC3E}">
+        <p14:creationId xmlns:p14="http://schemas.microsoft.com/office/powerpoint/2010/main" val="722902852"/>
+      </p:ext>
+    </p:extLst>
+  </p:cSld>
+  <p:clrMapOvr>
+    <a:masterClrMapping/>
+  </p:clrMapOvr>
+</p:sld>
+</file>
+
+<file path=ppt/slides/slide41.xml><?xml version="1.0" encoding="utf-8"?>
+<p:sld xmlns:a="http://schemas.openxmlformats.org/drawingml/2006/main" xmlns:r="http://schemas.openxmlformats.org/officeDocument/2006/relationships" xmlns:p="http://schemas.openxmlformats.org/presentationml/2006/main">
+  <p:cSld>
+    <p:spTree>
+      <p:nvGrpSpPr>
+        <p:cNvPr id="1" name=""/>
+        <p:cNvGrpSpPr/>
+        <p:nvPr/>
+      </p:nvGrpSpPr>
+      <p:grpSpPr>
+        <a:xfrm>
+          <a:off x="0" y="0"/>
+          <a:ext cx="0" cy="0"/>
+          <a:chOff x="0" y="0"/>
+          <a:chExt cx="0" cy="0"/>
+        </a:xfrm>
+      </p:grpSpPr>
+      <p:sp>
+        <p:nvSpPr>
+          <p:cNvPr id="4" name="Title 3">
+            <a:extLst>
+              <a:ext uri="{FF2B5EF4-FFF2-40B4-BE49-F238E27FC236}">
+                <a16:creationId xmlns:a16="http://schemas.microsoft.com/office/drawing/2014/main" id="{3959A64B-5C9A-4A9B-BA45-ADECED2E51D9}"/>
+              </a:ext>
+            </a:extLst>
+          </p:cNvPr>
+          <p:cNvSpPr>
+            <a:spLocks noGrp="1"/>
+          </p:cNvSpPr>
+          <p:nvPr>
+            <p:ph type="ctrTitle"/>
+          </p:nvPr>
+        </p:nvSpPr>
+        <p:spPr>
+          <a:xfrm>
+            <a:off x="1261872" y="758952"/>
+            <a:ext cx="10625328" cy="4041648"/>
+          </a:xfrm>
+        </p:spPr>
+        <p:txBody>
+          <a:bodyPr/>
+          <a:lstStyle/>
+          <a:p>
+            <a:r>
+              <a:rPr lang="en-US" dirty="0"/>
+              <a:t>Presentations</a:t>
+            </a:r>
+          </a:p>
+        </p:txBody>
+      </p:sp>
+      <p:sp>
+        <p:nvSpPr>
+          <p:cNvPr id="5" name="Subtitle 4">
+            <a:extLst>
+              <a:ext uri="{FF2B5EF4-FFF2-40B4-BE49-F238E27FC236}">
+                <a16:creationId xmlns:a16="http://schemas.microsoft.com/office/drawing/2014/main" id="{D52D9252-3DD8-4D35-8070-32332FBE25E4}"/>
+              </a:ext>
+            </a:extLst>
+          </p:cNvPr>
+          <p:cNvSpPr>
+            <a:spLocks noGrp="1"/>
+          </p:cNvSpPr>
+          <p:nvPr>
+            <p:ph type="subTitle" idx="1"/>
+          </p:nvPr>
+        </p:nvSpPr>
+        <p:spPr/>
+        <p:txBody>
+          <a:bodyPr/>
+          <a:lstStyle/>
+          <a:p>
+            <a:endParaRPr lang="en-US" dirty="0"/>
+          </a:p>
+        </p:txBody>
+      </p:sp>
+    </p:spTree>
+    <p:extLst>
+      <p:ext uri="{BB962C8B-B14F-4D97-AF65-F5344CB8AC3E}">
+        <p14:creationId xmlns:p14="http://schemas.microsoft.com/office/powerpoint/2010/main" val="1905963770"/>
       </p:ext>
     </p:extLst>
   </p:cSld>

</xml_diff>